<commit_message>
Exclusive Economic Zone and Flag of Convenience
</commit_message>
<xml_diff>
--- a/Schema Extensions/IES Model Extension Documentation.pptx
+++ b/Schema Extensions/IES Model Extension Documentation.pptx
@@ -26,56 +26,58 @@
     <p:sldId id="279" r:id="rId20"/>
     <p:sldId id="280" r:id="rId21"/>
     <p:sldId id="281" r:id="rId22"/>
+    <p:sldId id="282" r:id="rId23"/>
+    <p:sldId id="283" r:id="rId24"/>
   </p:sldIdLst>
   <p:sldSz cx="12192000" cy="6858000"/>
   <p:notesSz cx="6858000" cy="9144000"/>
   <p:embeddedFontLst>
     <p:embeddedFont>
       <p:font typeface="Calibri" panose="020F0502020204030204" pitchFamily="34" charset="0"/>
-      <p:regular r:id="rId23"/>
-      <p:bold r:id="rId24"/>
-      <p:italic r:id="rId25"/>
-      <p:boldItalic r:id="rId26"/>
+      <p:regular r:id="rId25"/>
+      <p:bold r:id="rId26"/>
+      <p:italic r:id="rId27"/>
+      <p:boldItalic r:id="rId28"/>
     </p:embeddedFont>
     <p:embeddedFont>
       <p:font typeface="Calibri Light" panose="020F0302020204030204" pitchFamily="34" charset="0"/>
-      <p:regular r:id="rId27"/>
-      <p:italic r:id="rId28"/>
+      <p:regular r:id="rId29"/>
+      <p:italic r:id="rId30"/>
     </p:embeddedFont>
     <p:embeddedFont>
       <p:font typeface="Consolas" panose="020B0609020204030204" pitchFamily="49" charset="0"/>
-      <p:regular r:id="rId29"/>
-      <p:bold r:id="rId30"/>
-      <p:italic r:id="rId31"/>
-      <p:boldItalic r:id="rId32"/>
+      <p:regular r:id="rId31"/>
+      <p:bold r:id="rId32"/>
+      <p:italic r:id="rId33"/>
+      <p:boldItalic r:id="rId34"/>
     </p:embeddedFont>
     <p:embeddedFont>
       <p:font typeface="Libre Barcode 39 Text" pitchFamily="2" charset="0"/>
-      <p:regular r:id="rId33"/>
+      <p:regular r:id="rId35"/>
     </p:embeddedFont>
     <p:embeddedFont>
       <p:font typeface="Roboto" panose="02000000000000000000" pitchFamily="2" charset="0"/>
-      <p:regular r:id="rId34"/>
-      <p:bold r:id="rId35"/>
-      <p:italic r:id="rId36"/>
-      <p:boldItalic r:id="rId37"/>
+      <p:regular r:id="rId36"/>
+      <p:bold r:id="rId37"/>
+      <p:italic r:id="rId38"/>
+      <p:boldItalic r:id="rId39"/>
     </p:embeddedFont>
     <p:embeddedFont>
       <p:font typeface="Roboto Light" panose="02000000000000000000" pitchFamily="2" charset="0"/>
-      <p:regular r:id="rId38"/>
-      <p:italic r:id="rId39"/>
+      <p:regular r:id="rId40"/>
+      <p:italic r:id="rId41"/>
     </p:embeddedFont>
     <p:embeddedFont>
       <p:font typeface="Roboto Mono" pitchFamily="2" charset="0"/>
-      <p:regular r:id="rId40"/>
-      <p:bold r:id="rId41"/>
-      <p:italic r:id="rId42"/>
-      <p:boldItalic r:id="rId43"/>
+      <p:regular r:id="rId42"/>
+      <p:bold r:id="rId43"/>
+      <p:italic r:id="rId44"/>
+      <p:boldItalic r:id="rId45"/>
     </p:embeddedFont>
     <p:embeddedFont>
       <p:font typeface="Roboto Thin" panose="02000000000000000000" pitchFamily="2" charset="0"/>
-      <p:regular r:id="rId44"/>
-      <p:italic r:id="rId45"/>
+      <p:regular r:id="rId46"/>
+      <p:italic r:id="rId47"/>
     </p:embeddedFont>
   </p:embeddedFontLst>
   <p:defaultTextStyle>
@@ -328,7 +330,7 @@
           <a:p>
             <a:fld id="{9C217E9C-8F4D-924D-9E3C-AB228D9DE283}" type="datetimeFigureOut">
               <a:rPr lang="en-GB" smtClean="0"/>
-              <a:t>08/04/2021</a:t>
+              <a:t>05/05/2021</a:t>
             </a:fld>
             <a:endParaRPr lang="en-GB"/>
           </a:p>
@@ -526,7 +528,7 @@
           <a:p>
             <a:fld id="{9C217E9C-8F4D-924D-9E3C-AB228D9DE283}" type="datetimeFigureOut">
               <a:rPr lang="en-GB" smtClean="0"/>
-              <a:t>08/04/2021</a:t>
+              <a:t>05/05/2021</a:t>
             </a:fld>
             <a:endParaRPr lang="en-GB"/>
           </a:p>
@@ -734,7 +736,7 @@
           <a:p>
             <a:fld id="{9C217E9C-8F4D-924D-9E3C-AB228D9DE283}" type="datetimeFigureOut">
               <a:rPr lang="en-GB" smtClean="0"/>
-              <a:t>08/04/2021</a:t>
+              <a:t>05/05/2021</a:t>
             </a:fld>
             <a:endParaRPr lang="en-GB"/>
           </a:p>
@@ -932,7 +934,7 @@
           <a:p>
             <a:fld id="{9C217E9C-8F4D-924D-9E3C-AB228D9DE283}" type="datetimeFigureOut">
               <a:rPr lang="en-GB" smtClean="0"/>
-              <a:t>08/04/2021</a:t>
+              <a:t>05/05/2021</a:t>
             </a:fld>
             <a:endParaRPr lang="en-GB"/>
           </a:p>
@@ -1207,7 +1209,7 @@
           <a:p>
             <a:fld id="{9C217E9C-8F4D-924D-9E3C-AB228D9DE283}" type="datetimeFigureOut">
               <a:rPr lang="en-GB" smtClean="0"/>
-              <a:t>08/04/2021</a:t>
+              <a:t>05/05/2021</a:t>
             </a:fld>
             <a:endParaRPr lang="en-GB"/>
           </a:p>
@@ -1472,7 +1474,7 @@
           <a:p>
             <a:fld id="{9C217E9C-8F4D-924D-9E3C-AB228D9DE283}" type="datetimeFigureOut">
               <a:rPr lang="en-GB" smtClean="0"/>
-              <a:t>08/04/2021</a:t>
+              <a:t>05/05/2021</a:t>
             </a:fld>
             <a:endParaRPr lang="en-GB"/>
           </a:p>
@@ -1884,7 +1886,7 @@
           <a:p>
             <a:fld id="{9C217E9C-8F4D-924D-9E3C-AB228D9DE283}" type="datetimeFigureOut">
               <a:rPr lang="en-GB" smtClean="0"/>
-              <a:t>08/04/2021</a:t>
+              <a:t>05/05/2021</a:t>
             </a:fld>
             <a:endParaRPr lang="en-GB"/>
           </a:p>
@@ -2025,7 +2027,7 @@
           <a:p>
             <a:fld id="{9C217E9C-8F4D-924D-9E3C-AB228D9DE283}" type="datetimeFigureOut">
               <a:rPr lang="en-GB" smtClean="0"/>
-              <a:t>08/04/2021</a:t>
+              <a:t>05/05/2021</a:t>
             </a:fld>
             <a:endParaRPr lang="en-GB"/>
           </a:p>
@@ -2138,7 +2140,7 @@
           <a:p>
             <a:fld id="{9C217E9C-8F4D-924D-9E3C-AB228D9DE283}" type="datetimeFigureOut">
               <a:rPr lang="en-GB" smtClean="0"/>
-              <a:t>08/04/2021</a:t>
+              <a:t>05/05/2021</a:t>
             </a:fld>
             <a:endParaRPr lang="en-GB"/>
           </a:p>
@@ -2449,7 +2451,7 @@
           <a:p>
             <a:fld id="{9C217E9C-8F4D-924D-9E3C-AB228D9DE283}" type="datetimeFigureOut">
               <a:rPr lang="en-GB" smtClean="0"/>
-              <a:t>08/04/2021</a:t>
+              <a:t>05/05/2021</a:t>
             </a:fld>
             <a:endParaRPr lang="en-GB"/>
           </a:p>
@@ -2737,7 +2739,7 @@
           <a:p>
             <a:fld id="{9C217E9C-8F4D-924D-9E3C-AB228D9DE283}" type="datetimeFigureOut">
               <a:rPr lang="en-GB" smtClean="0"/>
-              <a:t>08/04/2021</a:t>
+              <a:t>05/05/2021</a:t>
             </a:fld>
             <a:endParaRPr lang="en-GB"/>
           </a:p>
@@ -2978,7 +2980,7 @@
           <a:p>
             <a:fld id="{9C217E9C-8F4D-924D-9E3C-AB228D9DE283}" type="datetimeFigureOut">
               <a:rPr lang="en-GB" smtClean="0"/>
-              <a:t>08/04/2021</a:t>
+              <a:t>05/05/2021</a:t>
             </a:fld>
             <a:endParaRPr lang="en-GB"/>
           </a:p>
@@ -3420,7 +3422,7 @@
           </a:ln>
           <a:extLst>
             <a:ext uri="{C572A759-6A51-4108-AA02-DFA0A04FC94B}">
-              <ma14:wrappingTextBoxFlag xmlns:ma14="http://schemas.microsoft.com/office/mac/drawingml/2011/main" xmlns="" val="1"/>
+              <ma14:wrappingTextBoxFlag xmlns="" xmlns:ma14="http://schemas.microsoft.com/office/mac/drawingml/2011/main" val="1"/>
             </a:ext>
           </a:extLst>
         </p:spPr>
@@ -25873,19 +25875,8 @@
                 <a:latin typeface="Roboto" panose="02000000000000000000" pitchFamily="2" charset="0"/>
                 <a:ea typeface="Roboto" panose="02000000000000000000" pitchFamily="2" charset="0"/>
               </a:rPr>
-              <a:t>The Latitude and Longitude are then handled the same way as </a:t>
-            </a:r>
-            <a:r>
-              <a:rPr lang="en-GB">
-                <a:latin typeface="Roboto" panose="02000000000000000000" pitchFamily="2" charset="0"/>
-                <a:ea typeface="Roboto" panose="02000000000000000000" pitchFamily="2" charset="0"/>
-              </a:rPr>
-              <a:t>previous examples. </a:t>
-            </a:r>
-            <a:endParaRPr lang="en-GB" dirty="0">
-              <a:latin typeface="Roboto" panose="02000000000000000000" pitchFamily="2" charset="0"/>
-              <a:ea typeface="Roboto" panose="02000000000000000000" pitchFamily="2" charset="0"/>
-            </a:endParaRPr>
+              <a:t>The Latitude and Longitude are then handled the same way as previous examples. </a:t>
+            </a:r>
           </a:p>
         </p:txBody>
       </p:sp>
@@ -27562,6 +27553,4523 @@
     <p:extLst>
       <p:ext uri="{BB962C8B-B14F-4D97-AF65-F5344CB8AC3E}">
         <p14:creationId xmlns:p14="http://schemas.microsoft.com/office/powerpoint/2010/main" val="2651201477"/>
+      </p:ext>
+    </p:extLst>
+  </p:cSld>
+  <p:clrMapOvr>
+    <a:masterClrMapping/>
+  </p:clrMapOvr>
+</p:sld>
+</file>
+
+<file path=ppt/slides/slide22.xml><?xml version="1.0" encoding="utf-8"?>
+<p:sld xmlns:a="http://schemas.openxmlformats.org/drawingml/2006/main" xmlns:r="http://schemas.openxmlformats.org/officeDocument/2006/relationships" xmlns:p="http://schemas.openxmlformats.org/presentationml/2006/main">
+  <p:cSld>
+    <p:spTree>
+      <p:nvGrpSpPr>
+        <p:cNvPr id="1" name=""/>
+        <p:cNvGrpSpPr/>
+        <p:nvPr/>
+      </p:nvGrpSpPr>
+      <p:grpSpPr>
+        <a:xfrm>
+          <a:off x="0" y="0"/>
+          <a:ext cx="0" cy="0"/>
+          <a:chOff x="0" y="0"/>
+          <a:chExt cx="0" cy="0"/>
+        </a:xfrm>
+      </p:grpSpPr>
+      <p:sp>
+        <p:nvSpPr>
+          <p:cNvPr id="2" name="TextBox 1">
+            <a:extLst>
+              <a:ext uri="{FF2B5EF4-FFF2-40B4-BE49-F238E27FC236}">
+                <a16:creationId xmlns:a16="http://schemas.microsoft.com/office/drawing/2014/main" id="{00E26050-3128-7043-AD8B-D2951C404EA3}"/>
+              </a:ext>
+            </a:extLst>
+          </p:cNvPr>
+          <p:cNvSpPr txBox="1"/>
+          <p:nvPr/>
+        </p:nvSpPr>
+        <p:spPr>
+          <a:xfrm>
+            <a:off x="263309" y="239371"/>
+            <a:ext cx="3575018" cy="461665"/>
+          </a:xfrm>
+          <a:prstGeom prst="rect">
+            <a:avLst/>
+          </a:prstGeom>
+          <a:noFill/>
+        </p:spPr>
+        <p:txBody>
+          <a:bodyPr wrap="none" rtlCol="0">
+            <a:spAutoFit/>
+          </a:bodyPr>
+          <a:lstStyle/>
+          <a:p>
+            <a:r>
+              <a:rPr lang="en-GB" sz="2400" dirty="0">
+                <a:solidFill>
+                  <a:srgbClr val="0070C0"/>
+                </a:solidFill>
+                <a:latin typeface="Roboto Thin" panose="02000000000000000000" pitchFamily="2" charset="0"/>
+                <a:ea typeface="Roboto Thin" panose="02000000000000000000" pitchFamily="2" charset="0"/>
+              </a:rPr>
+              <a:t>Exclusive Economic Zone</a:t>
+            </a:r>
+          </a:p>
+        </p:txBody>
+      </p:sp>
+      <p:sp>
+        <p:nvSpPr>
+          <p:cNvPr id="3" name="Rounded Rectangle 2">
+            <a:extLst>
+              <a:ext uri="{FF2B5EF4-FFF2-40B4-BE49-F238E27FC236}">
+                <a16:creationId xmlns:a16="http://schemas.microsoft.com/office/drawing/2014/main" id="{ECB80B5C-69E0-754D-B045-69B7126FB58F}"/>
+              </a:ext>
+            </a:extLst>
+          </p:cNvPr>
+          <p:cNvSpPr/>
+          <p:nvPr/>
+        </p:nvSpPr>
+        <p:spPr>
+          <a:xfrm>
+            <a:off x="1317922" y="2262306"/>
+            <a:ext cx="1267290" cy="252313"/>
+          </a:xfrm>
+          <a:prstGeom prst="roundRect">
+            <a:avLst>
+              <a:gd name="adj" fmla="val 3508"/>
+            </a:avLst>
+          </a:prstGeom>
+          <a:solidFill>
+            <a:srgbClr val="ECEC00"/>
+          </a:solidFill>
+          <a:ln>
+            <a:solidFill>
+              <a:schemeClr val="tx1">
+                <a:lumMod val="85000"/>
+                <a:lumOff val="15000"/>
+              </a:schemeClr>
+            </a:solidFill>
+          </a:ln>
+        </p:spPr>
+        <p:style>
+          <a:lnRef idx="2">
+            <a:schemeClr val="accent1">
+              <a:shade val="50000"/>
+            </a:schemeClr>
+          </a:lnRef>
+          <a:fillRef idx="1">
+            <a:schemeClr val="accent1"/>
+          </a:fillRef>
+          <a:effectRef idx="0">
+            <a:schemeClr val="accent1"/>
+          </a:effectRef>
+          <a:fontRef idx="minor">
+            <a:schemeClr val="lt1"/>
+          </a:fontRef>
+        </p:style>
+        <p:txBody>
+          <a:bodyPr lIns="0" rIns="0" rtlCol="0" anchor="ctr"/>
+          <a:lstStyle/>
+          <a:p>
+            <a:pPr algn="ctr"/>
+            <a:r>
+              <a:rPr lang="en-GB" sz="500" dirty="0">
+                <a:solidFill>
+                  <a:schemeClr val="tx1">
+                    <a:lumMod val="85000"/>
+                    <a:lumOff val="15000"/>
+                  </a:schemeClr>
+                </a:solidFill>
+                <a:latin typeface="Consolas" panose="020B0609020204030204" pitchFamily="49" charset="0"/>
+                <a:cs typeface="Consolas" panose="020B0609020204030204" pitchFamily="49" charset="0"/>
+              </a:rPr>
+              <a:t>&lt;&lt;</a:t>
+            </a:r>
+            <a:r>
+              <a:rPr lang="en-GB" sz="500" dirty="0" err="1">
+                <a:solidFill>
+                  <a:schemeClr val="tx1">
+                    <a:lumMod val="85000"/>
+                    <a:lumOff val="15000"/>
+                  </a:schemeClr>
+                </a:solidFill>
+                <a:latin typeface="Consolas" panose="020B0609020204030204" pitchFamily="49" charset="0"/>
+                <a:cs typeface="Consolas" panose="020B0609020204030204" pitchFamily="49" charset="0"/>
+              </a:rPr>
+              <a:t>rdfsClass</a:t>
+            </a:r>
+            <a:r>
+              <a:rPr lang="en-GB" sz="500" dirty="0">
+                <a:solidFill>
+                  <a:schemeClr val="tx1">
+                    <a:lumMod val="85000"/>
+                    <a:lumOff val="15000"/>
+                  </a:schemeClr>
+                </a:solidFill>
+                <a:latin typeface="Consolas" panose="020B0609020204030204" pitchFamily="49" charset="0"/>
+                <a:cs typeface="Consolas" panose="020B0609020204030204" pitchFamily="49" charset="0"/>
+              </a:rPr>
+              <a:t>&gt;&gt;</a:t>
+            </a:r>
+          </a:p>
+          <a:p>
+            <a:pPr algn="ctr"/>
+            <a:r>
+              <a:rPr lang="en-GB" sz="600" b="1" dirty="0" err="1">
+                <a:solidFill>
+                  <a:schemeClr val="tx1">
+                    <a:lumMod val="85000"/>
+                    <a:lumOff val="15000"/>
+                  </a:schemeClr>
+                </a:solidFill>
+                <a:latin typeface="Consolas" panose="020B0609020204030204" pitchFamily="49" charset="0"/>
+                <a:cs typeface="Consolas" panose="020B0609020204030204" pitchFamily="49" charset="0"/>
+              </a:rPr>
+              <a:t>ExclusiveEconomicZone</a:t>
+            </a:r>
+            <a:endParaRPr lang="en-GB" sz="600" b="1" dirty="0">
+              <a:solidFill>
+                <a:schemeClr val="tx1">
+                  <a:lumMod val="85000"/>
+                  <a:lumOff val="15000"/>
+                </a:schemeClr>
+              </a:solidFill>
+              <a:latin typeface="Consolas" panose="020B0609020204030204" pitchFamily="49" charset="0"/>
+              <a:cs typeface="Consolas" panose="020B0609020204030204" pitchFamily="49" charset="0"/>
+            </a:endParaRPr>
+          </a:p>
+        </p:txBody>
+      </p:sp>
+      <p:pic>
+        <p:nvPicPr>
+          <p:cNvPr id="4" name="Picture 2" descr="Location Diagram">
+            <a:extLst>
+              <a:ext uri="{FF2B5EF4-FFF2-40B4-BE49-F238E27FC236}">
+                <a16:creationId xmlns:a16="http://schemas.microsoft.com/office/drawing/2014/main" id="{F92416F3-34A7-9A43-8981-A8E14E361438}"/>
+              </a:ext>
+            </a:extLst>
+          </p:cNvPr>
+          <p:cNvPicPr>
+            <a:picLocks noChangeAspect="1" noChangeArrowheads="1"/>
+          </p:cNvPicPr>
+          <p:nvPr/>
+        </p:nvPicPr>
+        <p:blipFill rotWithShape="1">
+          <a:blip r:embed="rId2">
+            <a:extLst>
+              <a:ext uri="{28A0092B-C50C-407E-A947-70E740481C1C}">
+                <a14:useLocalDpi xmlns:a14="http://schemas.microsoft.com/office/drawing/2010/main" val="0"/>
+              </a:ext>
+            </a:extLst>
+          </a:blip>
+          <a:srcRect l="1" t="22867" r="55741" b="65697"/>
+          <a:stretch/>
+        </p:blipFill>
+        <p:spPr bwMode="auto">
+          <a:xfrm>
+            <a:off x="325329" y="1158558"/>
+            <a:ext cx="2055819" cy="784301"/>
+          </a:xfrm>
+          <a:prstGeom prst="rect">
+            <a:avLst/>
+          </a:prstGeom>
+          <a:noFill/>
+          <a:extLst>
+            <a:ext uri="{909E8E84-426E-40DD-AFC4-6F175D3DCCD1}">
+              <a14:hiddenFill xmlns:a14="http://schemas.microsoft.com/office/drawing/2010/main">
+                <a:solidFill>
+                  <a:srgbClr val="FFFFFF"/>
+                </a:solidFill>
+              </a14:hiddenFill>
+            </a:ext>
+          </a:extLst>
+        </p:spPr>
+      </p:pic>
+      <p:cxnSp>
+        <p:nvCxnSpPr>
+          <p:cNvPr id="5" name="Elbow Connector 14">
+            <a:extLst>
+              <a:ext uri="{FF2B5EF4-FFF2-40B4-BE49-F238E27FC236}">
+                <a16:creationId xmlns:a16="http://schemas.microsoft.com/office/drawing/2014/main" id="{5E0742D6-6484-634A-A269-ACBD7AECB621}"/>
+              </a:ext>
+            </a:extLst>
+          </p:cNvPr>
+          <p:cNvCxnSpPr>
+            <a:cxnSpLocks/>
+            <a:stCxn id="6" idx="3"/>
+            <a:endCxn id="3" idx="0"/>
+          </p:cNvCxnSpPr>
+          <p:nvPr/>
+        </p:nvCxnSpPr>
+        <p:spPr>
+          <a:xfrm rot="5400000">
+            <a:off x="1791968" y="2102459"/>
+            <a:ext cx="319446" cy="248"/>
+          </a:xfrm>
+          <a:prstGeom prst="bentConnector3">
+            <a:avLst>
+              <a:gd name="adj1" fmla="val 50000"/>
+            </a:avLst>
+          </a:prstGeom>
+          <a:solidFill>
+            <a:schemeClr val="bg1">
+              <a:lumMod val="75000"/>
+            </a:schemeClr>
+          </a:solidFill>
+          <a:ln w="12700">
+            <a:solidFill>
+              <a:srgbClr val="0432FF"/>
+            </a:solidFill>
+          </a:ln>
+        </p:spPr>
+        <p:style>
+          <a:lnRef idx="2">
+            <a:schemeClr val="accent1">
+              <a:shade val="50000"/>
+            </a:schemeClr>
+          </a:lnRef>
+          <a:fillRef idx="1">
+            <a:schemeClr val="accent1"/>
+          </a:fillRef>
+          <a:effectRef idx="0">
+            <a:schemeClr val="accent1"/>
+          </a:effectRef>
+          <a:fontRef idx="minor">
+            <a:schemeClr val="lt1"/>
+          </a:fontRef>
+        </p:style>
+      </p:cxnSp>
+      <p:sp>
+        <p:nvSpPr>
+          <p:cNvPr id="6" name="Triangle 5">
+            <a:extLst>
+              <a:ext uri="{FF2B5EF4-FFF2-40B4-BE49-F238E27FC236}">
+                <a16:creationId xmlns:a16="http://schemas.microsoft.com/office/drawing/2014/main" id="{3AA90995-AA8E-1E47-B38C-EF50F411A6FE}"/>
+              </a:ext>
+            </a:extLst>
+          </p:cNvPr>
+          <p:cNvSpPr/>
+          <p:nvPr/>
+        </p:nvSpPr>
+        <p:spPr>
+          <a:xfrm>
+            <a:off x="1918259" y="1833590"/>
+            <a:ext cx="67112" cy="109270"/>
+          </a:xfrm>
+          <a:prstGeom prst="triangle">
+            <a:avLst/>
+          </a:prstGeom>
+          <a:solidFill>
+            <a:schemeClr val="bg1">
+              <a:lumMod val="75000"/>
+            </a:schemeClr>
+          </a:solidFill>
+          <a:ln w="19050">
+            <a:solidFill>
+              <a:srgbClr val="0432FF"/>
+            </a:solidFill>
+          </a:ln>
+        </p:spPr>
+        <p:style>
+          <a:lnRef idx="2">
+            <a:schemeClr val="accent1">
+              <a:shade val="50000"/>
+            </a:schemeClr>
+          </a:lnRef>
+          <a:fillRef idx="1">
+            <a:schemeClr val="accent1"/>
+          </a:fillRef>
+          <a:effectRef idx="0">
+            <a:schemeClr val="accent1"/>
+          </a:effectRef>
+          <a:fontRef idx="minor">
+            <a:schemeClr val="lt1"/>
+          </a:fontRef>
+        </p:style>
+        <p:txBody>
+          <a:bodyPr rtlCol="0" anchor="ctr"/>
+          <a:lstStyle/>
+          <a:p>
+            <a:pPr algn="ctr"/>
+            <a:endParaRPr lang="en-GB" dirty="0"/>
+          </a:p>
+        </p:txBody>
+      </p:sp>
+      <p:sp>
+        <p:nvSpPr>
+          <p:cNvPr id="8" name="Rounded Rectangle 7">
+            <a:extLst>
+              <a:ext uri="{FF2B5EF4-FFF2-40B4-BE49-F238E27FC236}">
+                <a16:creationId xmlns:a16="http://schemas.microsoft.com/office/drawing/2014/main" id="{B288FB57-6546-7344-8031-C20A7C523491}"/>
+              </a:ext>
+            </a:extLst>
+          </p:cNvPr>
+          <p:cNvSpPr/>
+          <p:nvPr/>
+        </p:nvSpPr>
+        <p:spPr>
+          <a:xfrm>
+            <a:off x="2983151" y="2266005"/>
+            <a:ext cx="813284" cy="252313"/>
+          </a:xfrm>
+          <a:prstGeom prst="roundRect">
+            <a:avLst>
+              <a:gd name="adj" fmla="val 3508"/>
+            </a:avLst>
+          </a:prstGeom>
+          <a:solidFill>
+            <a:srgbClr val="ECEC00"/>
+          </a:solidFill>
+          <a:ln>
+            <a:solidFill>
+              <a:schemeClr val="tx1">
+                <a:lumMod val="85000"/>
+                <a:lumOff val="15000"/>
+              </a:schemeClr>
+            </a:solidFill>
+          </a:ln>
+        </p:spPr>
+        <p:style>
+          <a:lnRef idx="2">
+            <a:schemeClr val="accent1">
+              <a:shade val="50000"/>
+            </a:schemeClr>
+          </a:lnRef>
+          <a:fillRef idx="1">
+            <a:schemeClr val="accent1"/>
+          </a:fillRef>
+          <a:effectRef idx="0">
+            <a:schemeClr val="accent1"/>
+          </a:effectRef>
+          <a:fontRef idx="minor">
+            <a:schemeClr val="lt1"/>
+          </a:fontRef>
+        </p:style>
+        <p:txBody>
+          <a:bodyPr lIns="0" rIns="0" rtlCol="0" anchor="ctr"/>
+          <a:lstStyle/>
+          <a:p>
+            <a:pPr algn="ctr"/>
+            <a:r>
+              <a:rPr lang="en-GB" sz="500" dirty="0">
+                <a:solidFill>
+                  <a:schemeClr val="tx1">
+                    <a:lumMod val="85000"/>
+                    <a:lumOff val="15000"/>
+                  </a:schemeClr>
+                </a:solidFill>
+                <a:latin typeface="Consolas" panose="020B0609020204030204" pitchFamily="49" charset="0"/>
+                <a:cs typeface="Consolas" panose="020B0609020204030204" pitchFamily="49" charset="0"/>
+              </a:rPr>
+              <a:t>&lt;&lt;</a:t>
+            </a:r>
+            <a:r>
+              <a:rPr lang="en-GB" sz="500" dirty="0" err="1">
+                <a:solidFill>
+                  <a:schemeClr val="tx1">
+                    <a:lumMod val="85000"/>
+                    <a:lumOff val="15000"/>
+                  </a:schemeClr>
+                </a:solidFill>
+                <a:latin typeface="Consolas" panose="020B0609020204030204" pitchFamily="49" charset="0"/>
+                <a:cs typeface="Consolas" panose="020B0609020204030204" pitchFamily="49" charset="0"/>
+              </a:rPr>
+              <a:t>rdfsClass</a:t>
+            </a:r>
+            <a:r>
+              <a:rPr lang="en-GB" sz="500" dirty="0">
+                <a:solidFill>
+                  <a:schemeClr val="tx1">
+                    <a:lumMod val="85000"/>
+                    <a:lumOff val="15000"/>
+                  </a:schemeClr>
+                </a:solidFill>
+                <a:latin typeface="Consolas" panose="020B0609020204030204" pitchFamily="49" charset="0"/>
+                <a:cs typeface="Consolas" panose="020B0609020204030204" pitchFamily="49" charset="0"/>
+              </a:rPr>
+              <a:t>&gt;&gt;</a:t>
+            </a:r>
+          </a:p>
+          <a:p>
+            <a:pPr algn="ctr"/>
+            <a:r>
+              <a:rPr lang="en-GB" sz="600" b="1" dirty="0">
+                <a:solidFill>
+                  <a:schemeClr val="tx1">
+                    <a:lumMod val="85000"/>
+                    <a:lumOff val="15000"/>
+                  </a:schemeClr>
+                </a:solidFill>
+                <a:latin typeface="Consolas" panose="020B0609020204030204" pitchFamily="49" charset="0"/>
+                <a:cs typeface="Consolas" panose="020B0609020204030204" pitchFamily="49" charset="0"/>
+              </a:rPr>
+              <a:t>Vessel</a:t>
+            </a:r>
+          </a:p>
+        </p:txBody>
+      </p:sp>
+      <p:sp>
+        <p:nvSpPr>
+          <p:cNvPr id="10" name="Rounded Rectangle 9">
+            <a:extLst>
+              <a:ext uri="{FF2B5EF4-FFF2-40B4-BE49-F238E27FC236}">
+                <a16:creationId xmlns:a16="http://schemas.microsoft.com/office/drawing/2014/main" id="{8304BFA2-B4FA-5A4F-9DEA-8F30A0F73ADC}"/>
+              </a:ext>
+            </a:extLst>
+          </p:cNvPr>
+          <p:cNvSpPr/>
+          <p:nvPr/>
+        </p:nvSpPr>
+        <p:spPr>
+          <a:xfrm>
+            <a:off x="2978364" y="1707433"/>
+            <a:ext cx="813284" cy="252313"/>
+          </a:xfrm>
+          <a:prstGeom prst="roundRect">
+            <a:avLst>
+              <a:gd name="adj" fmla="val 3508"/>
+            </a:avLst>
+          </a:prstGeom>
+          <a:solidFill>
+            <a:schemeClr val="accent4"/>
+          </a:solidFill>
+          <a:ln>
+            <a:solidFill>
+              <a:schemeClr val="tx1">
+                <a:lumMod val="85000"/>
+                <a:lumOff val="15000"/>
+              </a:schemeClr>
+            </a:solidFill>
+          </a:ln>
+        </p:spPr>
+        <p:style>
+          <a:lnRef idx="2">
+            <a:schemeClr val="accent1">
+              <a:shade val="50000"/>
+            </a:schemeClr>
+          </a:lnRef>
+          <a:fillRef idx="1">
+            <a:schemeClr val="accent1"/>
+          </a:fillRef>
+          <a:effectRef idx="0">
+            <a:schemeClr val="accent1"/>
+          </a:effectRef>
+          <a:fontRef idx="minor">
+            <a:schemeClr val="lt1"/>
+          </a:fontRef>
+        </p:style>
+        <p:txBody>
+          <a:bodyPr lIns="0" rIns="0" rtlCol="0" anchor="ctr"/>
+          <a:lstStyle/>
+          <a:p>
+            <a:pPr algn="ctr"/>
+            <a:r>
+              <a:rPr lang="en-GB" sz="500" dirty="0">
+                <a:solidFill>
+                  <a:schemeClr val="tx1">
+                    <a:lumMod val="85000"/>
+                    <a:lumOff val="15000"/>
+                  </a:schemeClr>
+                </a:solidFill>
+                <a:latin typeface="Consolas" panose="020B0609020204030204" pitchFamily="49" charset="0"/>
+                <a:cs typeface="Consolas" panose="020B0609020204030204" pitchFamily="49" charset="0"/>
+              </a:rPr>
+              <a:t>&lt;&lt;</a:t>
+            </a:r>
+            <a:r>
+              <a:rPr lang="en-GB" sz="500" dirty="0" err="1">
+                <a:solidFill>
+                  <a:schemeClr val="tx1">
+                    <a:lumMod val="85000"/>
+                    <a:lumOff val="15000"/>
+                  </a:schemeClr>
+                </a:solidFill>
+                <a:latin typeface="Consolas" panose="020B0609020204030204" pitchFamily="49" charset="0"/>
+                <a:cs typeface="Consolas" panose="020B0609020204030204" pitchFamily="49" charset="0"/>
+              </a:rPr>
+              <a:t>rdfsClass</a:t>
+            </a:r>
+            <a:r>
+              <a:rPr lang="en-GB" sz="500" dirty="0">
+                <a:solidFill>
+                  <a:schemeClr val="tx1">
+                    <a:lumMod val="85000"/>
+                    <a:lumOff val="15000"/>
+                  </a:schemeClr>
+                </a:solidFill>
+                <a:latin typeface="Consolas" panose="020B0609020204030204" pitchFamily="49" charset="0"/>
+                <a:cs typeface="Consolas" panose="020B0609020204030204" pitchFamily="49" charset="0"/>
+              </a:rPr>
+              <a:t>&gt;&gt;</a:t>
+            </a:r>
+          </a:p>
+          <a:p>
+            <a:pPr algn="ctr"/>
+            <a:r>
+              <a:rPr lang="en-GB" sz="600" b="1" dirty="0" err="1">
+                <a:solidFill>
+                  <a:schemeClr val="tx1">
+                    <a:lumMod val="85000"/>
+                    <a:lumOff val="15000"/>
+                  </a:schemeClr>
+                </a:solidFill>
+                <a:latin typeface="Consolas" panose="020B0609020204030204" pitchFamily="49" charset="0"/>
+                <a:cs typeface="Consolas" panose="020B0609020204030204" pitchFamily="49" charset="0"/>
+              </a:rPr>
+              <a:t>VesselState</a:t>
+            </a:r>
+            <a:endParaRPr lang="en-GB" sz="600" b="1" dirty="0">
+              <a:solidFill>
+                <a:schemeClr val="tx1">
+                  <a:lumMod val="85000"/>
+                  <a:lumOff val="15000"/>
+                </a:schemeClr>
+              </a:solidFill>
+              <a:latin typeface="Consolas" panose="020B0609020204030204" pitchFamily="49" charset="0"/>
+              <a:cs typeface="Consolas" panose="020B0609020204030204" pitchFamily="49" charset="0"/>
+            </a:endParaRPr>
+          </a:p>
+        </p:txBody>
+      </p:sp>
+      <p:sp>
+        <p:nvSpPr>
+          <p:cNvPr id="11" name="Triangle 10">
+            <a:extLst>
+              <a:ext uri="{FF2B5EF4-FFF2-40B4-BE49-F238E27FC236}">
+                <a16:creationId xmlns:a16="http://schemas.microsoft.com/office/drawing/2014/main" id="{21C7EC0B-15BE-C04D-8347-761CE2261D0C}"/>
+              </a:ext>
+            </a:extLst>
+          </p:cNvPr>
+          <p:cNvSpPr/>
+          <p:nvPr/>
+        </p:nvSpPr>
+        <p:spPr>
+          <a:xfrm>
+            <a:off x="3351450" y="1959746"/>
+            <a:ext cx="67112" cy="109270"/>
+          </a:xfrm>
+          <a:prstGeom prst="triangle">
+            <a:avLst/>
+          </a:prstGeom>
+          <a:solidFill>
+            <a:schemeClr val="bg1">
+              <a:lumMod val="75000"/>
+            </a:schemeClr>
+          </a:solidFill>
+          <a:ln w="19050">
+            <a:solidFill>
+              <a:srgbClr val="0432FF"/>
+            </a:solidFill>
+          </a:ln>
+        </p:spPr>
+        <p:style>
+          <a:lnRef idx="2">
+            <a:schemeClr val="accent1">
+              <a:shade val="50000"/>
+            </a:schemeClr>
+          </a:lnRef>
+          <a:fillRef idx="1">
+            <a:schemeClr val="accent1"/>
+          </a:fillRef>
+          <a:effectRef idx="0">
+            <a:schemeClr val="accent1"/>
+          </a:effectRef>
+          <a:fontRef idx="minor">
+            <a:schemeClr val="lt1"/>
+          </a:fontRef>
+        </p:style>
+        <p:txBody>
+          <a:bodyPr rtlCol="0" anchor="ctr"/>
+          <a:lstStyle/>
+          <a:p>
+            <a:pPr algn="ctr"/>
+            <a:endParaRPr lang="en-GB" dirty="0"/>
+          </a:p>
+        </p:txBody>
+      </p:sp>
+      <p:cxnSp>
+        <p:nvCxnSpPr>
+          <p:cNvPr id="12" name="Elbow Connector 14">
+            <a:extLst>
+              <a:ext uri="{FF2B5EF4-FFF2-40B4-BE49-F238E27FC236}">
+                <a16:creationId xmlns:a16="http://schemas.microsoft.com/office/drawing/2014/main" id="{06E85111-0F73-B045-BB09-78B15194D7F0}"/>
+              </a:ext>
+            </a:extLst>
+          </p:cNvPr>
+          <p:cNvCxnSpPr>
+            <a:cxnSpLocks/>
+            <a:stCxn id="11" idx="3"/>
+            <a:endCxn id="8" idx="0"/>
+          </p:cNvCxnSpPr>
+          <p:nvPr/>
+        </p:nvCxnSpPr>
+        <p:spPr>
+          <a:xfrm rot="16200000" flipH="1">
+            <a:off x="3288905" y="2165116"/>
+            <a:ext cx="196989" cy="4787"/>
+          </a:xfrm>
+          <a:prstGeom prst="bentConnector3">
+            <a:avLst>
+              <a:gd name="adj1" fmla="val 50000"/>
+            </a:avLst>
+          </a:prstGeom>
+          <a:solidFill>
+            <a:schemeClr val="bg1">
+              <a:lumMod val="75000"/>
+            </a:schemeClr>
+          </a:solidFill>
+          <a:ln w="12700">
+            <a:solidFill>
+              <a:srgbClr val="0432FF"/>
+            </a:solidFill>
+          </a:ln>
+        </p:spPr>
+        <p:style>
+          <a:lnRef idx="2">
+            <a:schemeClr val="accent1">
+              <a:shade val="50000"/>
+            </a:schemeClr>
+          </a:lnRef>
+          <a:fillRef idx="1">
+            <a:schemeClr val="accent1"/>
+          </a:fillRef>
+          <a:effectRef idx="0">
+            <a:schemeClr val="accent1"/>
+          </a:effectRef>
+          <a:fontRef idx="minor">
+            <a:schemeClr val="lt1"/>
+          </a:fontRef>
+        </p:style>
+      </p:cxnSp>
+      <p:cxnSp>
+        <p:nvCxnSpPr>
+          <p:cNvPr id="17" name="Straight Arrow Connector 16">
+            <a:extLst>
+              <a:ext uri="{FF2B5EF4-FFF2-40B4-BE49-F238E27FC236}">
+                <a16:creationId xmlns:a16="http://schemas.microsoft.com/office/drawing/2014/main" id="{319EB58D-7118-164F-897E-2846D4087CD7}"/>
+              </a:ext>
+            </a:extLst>
+          </p:cNvPr>
+          <p:cNvCxnSpPr>
+            <a:cxnSpLocks/>
+            <a:stCxn id="16" idx="6"/>
+            <a:endCxn id="15" idx="2"/>
+          </p:cNvCxnSpPr>
+          <p:nvPr/>
+        </p:nvCxnSpPr>
+        <p:spPr>
+          <a:xfrm>
+            <a:off x="6850362" y="2866046"/>
+            <a:ext cx="1230885" cy="0"/>
+          </a:xfrm>
+          <a:prstGeom prst="straightConnector1">
+            <a:avLst/>
+          </a:prstGeom>
+          <a:ln w="22225">
+            <a:solidFill>
+              <a:schemeClr val="tx1"/>
+            </a:solidFill>
+            <a:tailEnd type="arrow"/>
+          </a:ln>
+        </p:spPr>
+        <p:style>
+          <a:lnRef idx="1">
+            <a:schemeClr val="accent1"/>
+          </a:lnRef>
+          <a:fillRef idx="0">
+            <a:schemeClr val="accent1"/>
+          </a:fillRef>
+          <a:effectRef idx="0">
+            <a:schemeClr val="accent1"/>
+          </a:effectRef>
+          <a:fontRef idx="minor">
+            <a:schemeClr val="tx1"/>
+          </a:fontRef>
+        </p:style>
+      </p:cxnSp>
+      <p:sp>
+        <p:nvSpPr>
+          <p:cNvPr id="18" name="TextBox 17">
+            <a:extLst>
+              <a:ext uri="{FF2B5EF4-FFF2-40B4-BE49-F238E27FC236}">
+                <a16:creationId xmlns:a16="http://schemas.microsoft.com/office/drawing/2014/main" id="{37A3B8BC-F520-4E42-A348-CA25084FFD93}"/>
+              </a:ext>
+            </a:extLst>
+          </p:cNvPr>
+          <p:cNvSpPr txBox="1"/>
+          <p:nvPr/>
+        </p:nvSpPr>
+        <p:spPr>
+          <a:xfrm>
+            <a:off x="6968258" y="2695452"/>
+            <a:ext cx="914033" cy="215444"/>
+          </a:xfrm>
+          <a:prstGeom prst="rect">
+            <a:avLst/>
+          </a:prstGeom>
+          <a:noFill/>
+        </p:spPr>
+        <p:txBody>
+          <a:bodyPr wrap="none" rtlCol="0">
+            <a:spAutoFit/>
+          </a:bodyPr>
+          <a:lstStyle/>
+          <a:p>
+            <a:r>
+              <a:rPr lang="en-GB" sz="800" dirty="0" err="1">
+                <a:latin typeface="Consolas" panose="020B0609020204030204" pitchFamily="49" charset="0"/>
+                <a:cs typeface="Consolas" panose="020B0609020204030204" pitchFamily="49" charset="0"/>
+              </a:rPr>
+              <a:t>ies:isStateOf</a:t>
+            </a:r>
+            <a:endParaRPr lang="en-GB" sz="800" dirty="0">
+              <a:latin typeface="Consolas" panose="020B0609020204030204" pitchFamily="49" charset="0"/>
+              <a:cs typeface="Consolas" panose="020B0609020204030204" pitchFamily="49" charset="0"/>
+            </a:endParaRPr>
+          </a:p>
+        </p:txBody>
+      </p:sp>
+      <p:cxnSp>
+        <p:nvCxnSpPr>
+          <p:cNvPr id="23" name="Straight Arrow Connector 22">
+            <a:extLst>
+              <a:ext uri="{FF2B5EF4-FFF2-40B4-BE49-F238E27FC236}">
+                <a16:creationId xmlns:a16="http://schemas.microsoft.com/office/drawing/2014/main" id="{4E3266C6-BC86-F94E-BCC2-33392A26CEA6}"/>
+              </a:ext>
+            </a:extLst>
+          </p:cNvPr>
+          <p:cNvCxnSpPr>
+            <a:cxnSpLocks/>
+            <a:stCxn id="16" idx="2"/>
+            <a:endCxn id="22" idx="6"/>
+          </p:cNvCxnSpPr>
+          <p:nvPr/>
+        </p:nvCxnSpPr>
+        <p:spPr>
+          <a:xfrm flipH="1">
+            <a:off x="5199085" y="2866046"/>
+            <a:ext cx="1163597" cy="0"/>
+          </a:xfrm>
+          <a:prstGeom prst="straightConnector1">
+            <a:avLst/>
+          </a:prstGeom>
+          <a:ln w="22225">
+            <a:solidFill>
+              <a:schemeClr val="tx1"/>
+            </a:solidFill>
+            <a:tailEnd type="arrow"/>
+          </a:ln>
+        </p:spPr>
+        <p:style>
+          <a:lnRef idx="1">
+            <a:schemeClr val="accent1"/>
+          </a:lnRef>
+          <a:fillRef idx="0">
+            <a:schemeClr val="accent1"/>
+          </a:fillRef>
+          <a:effectRef idx="0">
+            <a:schemeClr val="accent1"/>
+          </a:effectRef>
+          <a:fontRef idx="minor">
+            <a:schemeClr val="tx1"/>
+          </a:fontRef>
+        </p:style>
+      </p:cxnSp>
+      <p:sp>
+        <p:nvSpPr>
+          <p:cNvPr id="26" name="TextBox 25">
+            <a:extLst>
+              <a:ext uri="{FF2B5EF4-FFF2-40B4-BE49-F238E27FC236}">
+                <a16:creationId xmlns:a16="http://schemas.microsoft.com/office/drawing/2014/main" id="{E0C97DCA-F6FA-DB45-B008-781BE42E7872}"/>
+              </a:ext>
+            </a:extLst>
+          </p:cNvPr>
+          <p:cNvSpPr txBox="1"/>
+          <p:nvPr/>
+        </p:nvSpPr>
+        <p:spPr>
+          <a:xfrm>
+            <a:off x="5329459" y="2695452"/>
+            <a:ext cx="970137" cy="215444"/>
+          </a:xfrm>
+          <a:prstGeom prst="rect">
+            <a:avLst/>
+          </a:prstGeom>
+          <a:noFill/>
+        </p:spPr>
+        <p:txBody>
+          <a:bodyPr wrap="none" rtlCol="0">
+            <a:spAutoFit/>
+          </a:bodyPr>
+          <a:lstStyle/>
+          <a:p>
+            <a:r>
+              <a:rPr lang="en-GB" sz="800" dirty="0" err="1">
+                <a:latin typeface="Consolas" panose="020B0609020204030204" pitchFamily="49" charset="0"/>
+                <a:cs typeface="Consolas" panose="020B0609020204030204" pitchFamily="49" charset="0"/>
+              </a:rPr>
+              <a:t>ies:inLocation</a:t>
+            </a:r>
+            <a:endParaRPr lang="en-GB" sz="800" dirty="0">
+              <a:latin typeface="Consolas" panose="020B0609020204030204" pitchFamily="49" charset="0"/>
+              <a:cs typeface="Consolas" panose="020B0609020204030204" pitchFamily="49" charset="0"/>
+            </a:endParaRPr>
+          </a:p>
+        </p:txBody>
+      </p:sp>
+      <p:sp>
+        <p:nvSpPr>
+          <p:cNvPr id="27" name="Rectangle 26">
+            <a:extLst>
+              <a:ext uri="{FF2B5EF4-FFF2-40B4-BE49-F238E27FC236}">
+                <a16:creationId xmlns:a16="http://schemas.microsoft.com/office/drawing/2014/main" id="{58B36BC8-1D7A-7F4D-834F-B05C59E397F9}"/>
+              </a:ext>
+            </a:extLst>
+          </p:cNvPr>
+          <p:cNvSpPr/>
+          <p:nvPr/>
+        </p:nvSpPr>
+        <p:spPr>
+          <a:xfrm>
+            <a:off x="8189215" y="4769175"/>
+            <a:ext cx="3740019" cy="1631216"/>
+          </a:xfrm>
+          <a:prstGeom prst="rect">
+            <a:avLst/>
+          </a:prstGeom>
+        </p:spPr>
+        <p:txBody>
+          <a:bodyPr wrap="square">
+            <a:spAutoFit/>
+          </a:bodyPr>
+          <a:lstStyle/>
+          <a:p>
+            <a:r>
+              <a:rPr lang="en-GB" sz="1200" b="1" dirty="0">
+                <a:solidFill>
+                  <a:srgbClr val="000000"/>
+                </a:solidFill>
+                <a:latin typeface="Consolas" panose="020B0609020204030204" pitchFamily="49" charset="0"/>
+              </a:rPr>
+              <a:t>KEY:</a:t>
+            </a:r>
+            <a:endParaRPr lang="en-GB" sz="1100" dirty="0">
+              <a:solidFill>
+                <a:srgbClr val="000000"/>
+              </a:solidFill>
+              <a:latin typeface="Consolas" panose="020B0609020204030204" pitchFamily="49" charset="0"/>
+            </a:endParaRPr>
+          </a:p>
+          <a:p>
+            <a:r>
+              <a:rPr lang="en-GB" sz="1100" dirty="0">
+                <a:solidFill>
+                  <a:srgbClr val="000000"/>
+                </a:solidFill>
+                <a:latin typeface="Consolas" panose="020B0609020204030204" pitchFamily="49" charset="0"/>
+              </a:rPr>
+              <a:t>As	</a:t>
+            </a:r>
+            <a:r>
+              <a:rPr lang="en-GB" sz="1100" dirty="0" err="1">
+                <a:solidFill>
+                  <a:srgbClr val="000000"/>
+                </a:solidFill>
+                <a:latin typeface="Consolas" panose="020B0609020204030204" pitchFamily="49" charset="0"/>
+              </a:rPr>
+              <a:t>ies:Assessor</a:t>
+            </a:r>
+            <a:endParaRPr lang="en-GB" sz="1100" dirty="0">
+              <a:solidFill>
+                <a:srgbClr val="000000"/>
+              </a:solidFill>
+              <a:latin typeface="Consolas" panose="020B0609020204030204" pitchFamily="49" charset="0"/>
+            </a:endParaRPr>
+          </a:p>
+          <a:p>
+            <a:r>
+              <a:rPr lang="en-GB" sz="1100" dirty="0">
+                <a:solidFill>
+                  <a:srgbClr val="000000"/>
+                </a:solidFill>
+                <a:latin typeface="Consolas" panose="020B0609020204030204" pitchFamily="49" charset="0"/>
+              </a:rPr>
+              <a:t>AT	</a:t>
+            </a:r>
+            <a:r>
+              <a:rPr lang="en-GB" sz="1100" dirty="0" err="1">
+                <a:solidFill>
+                  <a:srgbClr val="000000"/>
+                </a:solidFill>
+                <a:latin typeface="Consolas" panose="020B0609020204030204" pitchFamily="49" charset="0"/>
+              </a:rPr>
+              <a:t>ies:AssessToBeTrue</a:t>
+            </a:r>
+            <a:endParaRPr lang="en-GB" sz="1100" dirty="0">
+              <a:solidFill>
+                <a:srgbClr val="000000"/>
+              </a:solidFill>
+              <a:latin typeface="Consolas" panose="020B0609020204030204" pitchFamily="49" charset="0"/>
+            </a:endParaRPr>
+          </a:p>
+          <a:p>
+            <a:r>
+              <a:rPr lang="en-GB" sz="1100" dirty="0">
+                <a:solidFill>
+                  <a:srgbClr val="000000"/>
+                </a:solidFill>
+                <a:latin typeface="Consolas" panose="020B0609020204030204" pitchFamily="49" charset="0"/>
+              </a:rPr>
+              <a:t>BS	</a:t>
+            </a:r>
+            <a:r>
+              <a:rPr lang="en-GB" sz="1100" dirty="0" err="1">
+                <a:solidFill>
+                  <a:srgbClr val="000000"/>
+                </a:solidFill>
+                <a:latin typeface="Consolas" panose="020B0609020204030204" pitchFamily="49" charset="0"/>
+              </a:rPr>
+              <a:t>ies:BoundingState</a:t>
+            </a:r>
+            <a:endParaRPr lang="en-GB" sz="1100" dirty="0">
+              <a:solidFill>
+                <a:srgbClr val="000000"/>
+              </a:solidFill>
+              <a:latin typeface="Consolas" panose="020B0609020204030204" pitchFamily="49" charset="0"/>
+            </a:endParaRPr>
+          </a:p>
+          <a:p>
+            <a:r>
+              <a:rPr lang="en-GB" sz="1100" dirty="0">
+                <a:solidFill>
+                  <a:srgbClr val="000000"/>
+                </a:solidFill>
+                <a:latin typeface="Consolas" panose="020B0609020204030204" pitchFamily="49" charset="0"/>
+              </a:rPr>
+              <a:t>EEZ	</a:t>
+            </a:r>
+            <a:r>
+              <a:rPr lang="en-GB" sz="1100" dirty="0" err="1">
+                <a:solidFill>
+                  <a:srgbClr val="000000"/>
+                </a:solidFill>
+                <a:latin typeface="Consolas" panose="020B0609020204030204" pitchFamily="49" charset="0"/>
+              </a:rPr>
+              <a:t>ies:ExclusiveEconomicZone</a:t>
+            </a:r>
+            <a:endParaRPr lang="en-GB" sz="1100" dirty="0">
+              <a:solidFill>
+                <a:srgbClr val="000000"/>
+              </a:solidFill>
+              <a:latin typeface="Consolas" panose="020B0609020204030204" pitchFamily="49" charset="0"/>
+            </a:endParaRPr>
+          </a:p>
+          <a:p>
+            <a:r>
+              <a:rPr lang="en-GB" sz="1100" dirty="0">
+                <a:solidFill>
+                  <a:srgbClr val="000000"/>
+                </a:solidFill>
+                <a:latin typeface="Consolas" panose="020B0609020204030204" pitchFamily="49" charset="0"/>
+              </a:rPr>
+              <a:t>PP	</a:t>
+            </a:r>
+            <a:r>
+              <a:rPr lang="en-GB" sz="1100" dirty="0" err="1">
+                <a:solidFill>
+                  <a:srgbClr val="000000"/>
+                </a:solidFill>
+                <a:latin typeface="Consolas" panose="020B0609020204030204" pitchFamily="49" charset="0"/>
+              </a:rPr>
+              <a:t>ies:ParticularPeriod</a:t>
+            </a:r>
+            <a:endParaRPr lang="en-GB" sz="1100" dirty="0">
+              <a:solidFill>
+                <a:srgbClr val="000000"/>
+              </a:solidFill>
+              <a:latin typeface="Consolas" panose="020B0609020204030204" pitchFamily="49" charset="0"/>
+            </a:endParaRPr>
+          </a:p>
+          <a:p>
+            <a:r>
+              <a:rPr lang="en-GB" sz="1100" dirty="0">
+                <a:solidFill>
+                  <a:srgbClr val="000000"/>
+                </a:solidFill>
+                <a:latin typeface="Consolas" panose="020B0609020204030204" pitchFamily="49" charset="0"/>
+              </a:rPr>
+              <a:t>S	</a:t>
+            </a:r>
+            <a:r>
+              <a:rPr lang="en-GB" sz="1100" dirty="0" err="1">
+                <a:solidFill>
+                  <a:srgbClr val="000000"/>
+                </a:solidFill>
+                <a:latin typeface="Consolas" panose="020B0609020204030204" pitchFamily="49" charset="0"/>
+              </a:rPr>
+              <a:t>ies:System</a:t>
+            </a:r>
+            <a:endParaRPr lang="en-GB" sz="1100" dirty="0">
+              <a:solidFill>
+                <a:srgbClr val="000000"/>
+              </a:solidFill>
+              <a:latin typeface="Consolas" panose="020B0609020204030204" pitchFamily="49" charset="0"/>
+            </a:endParaRPr>
+          </a:p>
+          <a:p>
+            <a:r>
+              <a:rPr lang="en-GB" sz="1100" dirty="0">
+                <a:solidFill>
+                  <a:srgbClr val="000000"/>
+                </a:solidFill>
+                <a:latin typeface="Consolas" panose="020B0609020204030204" pitchFamily="49" charset="0"/>
+              </a:rPr>
+              <a:t>V	</a:t>
+            </a:r>
+            <a:r>
+              <a:rPr lang="en-GB" sz="1100" dirty="0" err="1">
+                <a:solidFill>
+                  <a:srgbClr val="000000"/>
+                </a:solidFill>
+                <a:latin typeface="Consolas" panose="020B0609020204030204" pitchFamily="49" charset="0"/>
+              </a:rPr>
+              <a:t>ies:Vessel</a:t>
+            </a:r>
+            <a:endParaRPr lang="en-GB" sz="1100" dirty="0">
+              <a:solidFill>
+                <a:srgbClr val="000000"/>
+              </a:solidFill>
+              <a:latin typeface="Consolas" panose="020B0609020204030204" pitchFamily="49" charset="0"/>
+            </a:endParaRPr>
+          </a:p>
+          <a:p>
+            <a:r>
+              <a:rPr lang="en-GB" sz="1100" dirty="0">
+                <a:solidFill>
+                  <a:srgbClr val="000000"/>
+                </a:solidFill>
+                <a:latin typeface="Consolas" panose="020B0609020204030204" pitchFamily="49" charset="0"/>
+              </a:rPr>
+              <a:t>VS	</a:t>
+            </a:r>
+            <a:r>
+              <a:rPr lang="en-GB" sz="1100" dirty="0" err="1">
+                <a:solidFill>
+                  <a:srgbClr val="000000"/>
+                </a:solidFill>
+                <a:latin typeface="Consolas" panose="020B0609020204030204" pitchFamily="49" charset="0"/>
+              </a:rPr>
+              <a:t>ies:VesselState</a:t>
+            </a:r>
+            <a:endParaRPr lang="en-GB" sz="1100" dirty="0">
+              <a:solidFill>
+                <a:srgbClr val="000000"/>
+              </a:solidFill>
+              <a:latin typeface="Consolas" panose="020B0609020204030204" pitchFamily="49" charset="0"/>
+            </a:endParaRPr>
+          </a:p>
+        </p:txBody>
+      </p:sp>
+      <p:sp>
+        <p:nvSpPr>
+          <p:cNvPr id="28" name="Rectangle 27">
+            <a:extLst>
+              <a:ext uri="{FF2B5EF4-FFF2-40B4-BE49-F238E27FC236}">
+                <a16:creationId xmlns:a16="http://schemas.microsoft.com/office/drawing/2014/main" id="{DD275DC3-F43F-5D42-9323-F5513C5AA683}"/>
+              </a:ext>
+            </a:extLst>
+          </p:cNvPr>
+          <p:cNvSpPr/>
+          <p:nvPr/>
+        </p:nvSpPr>
+        <p:spPr>
+          <a:xfrm>
+            <a:off x="224466" y="5251466"/>
+            <a:ext cx="6096000" cy="954107"/>
+          </a:xfrm>
+          <a:prstGeom prst="rect">
+            <a:avLst/>
+          </a:prstGeom>
+        </p:spPr>
+        <p:txBody>
+          <a:bodyPr>
+            <a:spAutoFit/>
+          </a:bodyPr>
+          <a:lstStyle/>
+          <a:p>
+            <a:r>
+              <a:rPr lang="en-GB" sz="1200" b="1" dirty="0">
+                <a:solidFill>
+                  <a:srgbClr val="0070C0"/>
+                </a:solidFill>
+                <a:latin typeface="Consolas" panose="020B0609020204030204" pitchFamily="49" charset="0"/>
+              </a:rPr>
+              <a:t>Namespaces:</a:t>
+            </a:r>
+          </a:p>
+          <a:p>
+            <a:r>
+              <a:rPr lang="en-GB" sz="1100" dirty="0">
+                <a:solidFill>
+                  <a:srgbClr val="0070C0"/>
+                </a:solidFill>
+                <a:latin typeface="Consolas" panose="020B0609020204030204" pitchFamily="49" charset="0"/>
+              </a:rPr>
+              <a:t>@prefix </a:t>
+            </a:r>
+            <a:r>
+              <a:rPr lang="en-GB" sz="1100" dirty="0" err="1">
+                <a:solidFill>
+                  <a:srgbClr val="0070C0"/>
+                </a:solidFill>
+                <a:latin typeface="Consolas" panose="020B0609020204030204" pitchFamily="49" charset="0"/>
+              </a:rPr>
+              <a:t>rdf</a:t>
+            </a:r>
+            <a:r>
+              <a:rPr lang="en-GB" sz="1100" dirty="0">
+                <a:solidFill>
+                  <a:srgbClr val="0070C0"/>
+                </a:solidFill>
+                <a:latin typeface="Consolas" panose="020B0609020204030204" pitchFamily="49" charset="0"/>
+              </a:rPr>
+              <a:t>: &lt;http://www.w3.org/1999/02/22-rdf-syntax-ns#&gt; .</a:t>
+            </a:r>
+          </a:p>
+          <a:p>
+            <a:r>
+              <a:rPr lang="en-GB" sz="1100" dirty="0">
+                <a:solidFill>
+                  <a:srgbClr val="0070C0"/>
+                </a:solidFill>
+                <a:latin typeface="Consolas" panose="020B0609020204030204" pitchFamily="49" charset="0"/>
+              </a:rPr>
+              <a:t>@prefix </a:t>
+            </a:r>
+            <a:r>
+              <a:rPr lang="en-GB" sz="1100" dirty="0" err="1">
+                <a:solidFill>
+                  <a:srgbClr val="0070C0"/>
+                </a:solidFill>
+                <a:latin typeface="Consolas" panose="020B0609020204030204" pitchFamily="49" charset="0"/>
+              </a:rPr>
+              <a:t>rdfs</a:t>
+            </a:r>
+            <a:r>
+              <a:rPr lang="en-GB" sz="1100" dirty="0">
+                <a:solidFill>
+                  <a:srgbClr val="0070C0"/>
+                </a:solidFill>
+                <a:latin typeface="Consolas" panose="020B0609020204030204" pitchFamily="49" charset="0"/>
+              </a:rPr>
+              <a:t>: &lt;http://www.w3.org/2000/01/rdf-schema#&gt; . </a:t>
+            </a:r>
+          </a:p>
+          <a:p>
+            <a:r>
+              <a:rPr lang="en-GB" sz="1100" dirty="0">
+                <a:solidFill>
+                  <a:srgbClr val="0070C0"/>
+                </a:solidFill>
+                <a:latin typeface="Consolas" panose="020B0609020204030204" pitchFamily="49" charset="0"/>
+              </a:rPr>
+              <a:t>@prefix </a:t>
+            </a:r>
+            <a:r>
+              <a:rPr lang="en-GB" sz="1100" dirty="0" err="1">
+                <a:solidFill>
+                  <a:srgbClr val="0070C0"/>
+                </a:solidFill>
+                <a:latin typeface="Consolas" panose="020B0609020204030204" pitchFamily="49" charset="0"/>
+              </a:rPr>
+              <a:t>ies</a:t>
+            </a:r>
+            <a:r>
+              <a:rPr lang="en-GB" sz="1100" dirty="0">
+                <a:solidFill>
+                  <a:srgbClr val="0070C0"/>
+                </a:solidFill>
+                <a:latin typeface="Consolas" panose="020B0609020204030204" pitchFamily="49" charset="0"/>
+              </a:rPr>
+              <a:t>: &lt;http://ies.data.gov.uk/ies4#&gt; . </a:t>
+            </a:r>
+          </a:p>
+          <a:p>
+            <a:r>
+              <a:rPr lang="en-GB" sz="1100" dirty="0">
+                <a:solidFill>
+                  <a:srgbClr val="0070C0"/>
+                </a:solidFill>
+                <a:latin typeface="Consolas" panose="020B0609020204030204" pitchFamily="49" charset="0"/>
+              </a:rPr>
+              <a:t>@prefix data: &lt;http://data.gov.uk/testdata#&gt; .</a:t>
+            </a:r>
+            <a:endParaRPr lang="en-GB" sz="1100" dirty="0"/>
+          </a:p>
+        </p:txBody>
+      </p:sp>
+      <p:sp>
+        <p:nvSpPr>
+          <p:cNvPr id="29" name="TextBox 28">
+            <a:extLst>
+              <a:ext uri="{FF2B5EF4-FFF2-40B4-BE49-F238E27FC236}">
+                <a16:creationId xmlns:a16="http://schemas.microsoft.com/office/drawing/2014/main" id="{AB66CBD9-BF4B-E54A-A241-96208B5A017A}"/>
+              </a:ext>
+            </a:extLst>
+          </p:cNvPr>
+          <p:cNvSpPr txBox="1"/>
+          <p:nvPr/>
+        </p:nvSpPr>
+        <p:spPr>
+          <a:xfrm>
+            <a:off x="7063299" y="569128"/>
+            <a:ext cx="780983" cy="200055"/>
+          </a:xfrm>
+          <a:prstGeom prst="rect">
+            <a:avLst/>
+          </a:prstGeom>
+          <a:noFill/>
+        </p:spPr>
+        <p:txBody>
+          <a:bodyPr wrap="none" rtlCol="0">
+            <a:spAutoFit/>
+          </a:bodyPr>
+          <a:lstStyle/>
+          <a:p>
+            <a:r>
+              <a:rPr lang="en-GB" sz="700" dirty="0" err="1">
+                <a:latin typeface="Consolas" panose="020B0609020204030204" pitchFamily="49" charset="0"/>
+                <a:cs typeface="Consolas" panose="020B0609020204030204" pitchFamily="49" charset="0"/>
+              </a:rPr>
+              <a:t>ies:assessed</a:t>
+            </a:r>
+            <a:endParaRPr lang="en-GB" sz="700" dirty="0">
+              <a:latin typeface="Consolas" panose="020B0609020204030204" pitchFamily="49" charset="0"/>
+              <a:cs typeface="Consolas" panose="020B0609020204030204" pitchFamily="49" charset="0"/>
+            </a:endParaRPr>
+          </a:p>
+        </p:txBody>
+      </p:sp>
+      <p:sp>
+        <p:nvSpPr>
+          <p:cNvPr id="30" name="Oval 29">
+            <a:extLst>
+              <a:ext uri="{FF2B5EF4-FFF2-40B4-BE49-F238E27FC236}">
+                <a16:creationId xmlns:a16="http://schemas.microsoft.com/office/drawing/2014/main" id="{338150B3-7886-4044-B156-D31E1C4197AD}"/>
+              </a:ext>
+            </a:extLst>
+          </p:cNvPr>
+          <p:cNvSpPr/>
+          <p:nvPr/>
+        </p:nvSpPr>
+        <p:spPr>
+          <a:xfrm>
+            <a:off x="6362682" y="531082"/>
+            <a:ext cx="487680" cy="473612"/>
+          </a:xfrm>
+          <a:prstGeom prst="ellipse">
+            <a:avLst/>
+          </a:prstGeom>
+          <a:solidFill>
+            <a:schemeClr val="tx1">
+              <a:lumMod val="85000"/>
+              <a:lumOff val="15000"/>
+            </a:schemeClr>
+          </a:solidFill>
+          <a:ln w="38100">
+            <a:solidFill>
+              <a:srgbClr val="00FA00"/>
+            </a:solidFill>
+          </a:ln>
+        </p:spPr>
+        <p:style>
+          <a:lnRef idx="2">
+            <a:schemeClr val="accent1">
+              <a:shade val="50000"/>
+            </a:schemeClr>
+          </a:lnRef>
+          <a:fillRef idx="1">
+            <a:schemeClr val="accent1"/>
+          </a:fillRef>
+          <a:effectRef idx="0">
+            <a:schemeClr val="accent1"/>
+          </a:effectRef>
+          <a:fontRef idx="minor">
+            <a:schemeClr val="lt1"/>
+          </a:fontRef>
+        </p:style>
+        <p:txBody>
+          <a:bodyPr lIns="0" rIns="0" rtlCol="0" anchor="ctr"/>
+          <a:lstStyle/>
+          <a:p>
+            <a:pPr algn="ctr"/>
+            <a:r>
+              <a:rPr lang="en-GB" dirty="0">
+                <a:solidFill>
+                  <a:srgbClr val="00FA00"/>
+                </a:solidFill>
+                <a:latin typeface="Consolas" panose="020B0609020204030204" pitchFamily="49" charset="0"/>
+                <a:cs typeface="Consolas" panose="020B0609020204030204" pitchFamily="49" charset="0"/>
+              </a:rPr>
+              <a:t>PW</a:t>
+            </a:r>
+          </a:p>
+        </p:txBody>
+      </p:sp>
+      <p:sp>
+        <p:nvSpPr>
+          <p:cNvPr id="31" name="Oval 30">
+            <a:extLst>
+              <a:ext uri="{FF2B5EF4-FFF2-40B4-BE49-F238E27FC236}">
+                <a16:creationId xmlns:a16="http://schemas.microsoft.com/office/drawing/2014/main" id="{21481164-67F5-074F-9A76-9347F47554B7}"/>
+              </a:ext>
+            </a:extLst>
+          </p:cNvPr>
+          <p:cNvSpPr/>
+          <p:nvPr/>
+        </p:nvSpPr>
+        <p:spPr>
+          <a:xfrm>
+            <a:off x="7865995" y="531082"/>
+            <a:ext cx="487680" cy="473612"/>
+          </a:xfrm>
+          <a:prstGeom prst="ellipse">
+            <a:avLst/>
+          </a:prstGeom>
+          <a:solidFill>
+            <a:schemeClr val="tx1">
+              <a:lumMod val="85000"/>
+              <a:lumOff val="15000"/>
+            </a:schemeClr>
+          </a:solidFill>
+          <a:ln w="38100">
+            <a:solidFill>
+              <a:srgbClr val="FEB1BF"/>
+            </a:solidFill>
+          </a:ln>
+        </p:spPr>
+        <p:style>
+          <a:lnRef idx="2">
+            <a:schemeClr val="accent1">
+              <a:shade val="50000"/>
+            </a:schemeClr>
+          </a:lnRef>
+          <a:fillRef idx="1">
+            <a:schemeClr val="accent1"/>
+          </a:fillRef>
+          <a:effectRef idx="0">
+            <a:schemeClr val="accent1"/>
+          </a:effectRef>
+          <a:fontRef idx="minor">
+            <a:schemeClr val="lt1"/>
+          </a:fontRef>
+        </p:style>
+        <p:txBody>
+          <a:bodyPr lIns="0" rIns="0" rtlCol="0" anchor="ctr"/>
+          <a:lstStyle/>
+          <a:p>
+            <a:pPr algn="ctr"/>
+            <a:r>
+              <a:rPr lang="en-GB" dirty="0">
+                <a:solidFill>
+                  <a:srgbClr val="FEB1BF"/>
+                </a:solidFill>
+                <a:latin typeface="Consolas" panose="020B0609020204030204" pitchFamily="49" charset="0"/>
+                <a:cs typeface="Consolas" panose="020B0609020204030204" pitchFamily="49" charset="0"/>
+              </a:rPr>
+              <a:t>AT</a:t>
+            </a:r>
+          </a:p>
+        </p:txBody>
+      </p:sp>
+      <p:cxnSp>
+        <p:nvCxnSpPr>
+          <p:cNvPr id="32" name="Straight Arrow Connector 31">
+            <a:extLst>
+              <a:ext uri="{FF2B5EF4-FFF2-40B4-BE49-F238E27FC236}">
+                <a16:creationId xmlns:a16="http://schemas.microsoft.com/office/drawing/2014/main" id="{036F1413-DA13-B740-97CC-85E9BE84EB2B}"/>
+              </a:ext>
+            </a:extLst>
+          </p:cNvPr>
+          <p:cNvCxnSpPr>
+            <a:cxnSpLocks/>
+            <a:stCxn id="31" idx="2"/>
+            <a:endCxn id="30" idx="6"/>
+          </p:cNvCxnSpPr>
+          <p:nvPr/>
+        </p:nvCxnSpPr>
+        <p:spPr>
+          <a:xfrm flipH="1">
+            <a:off x="6850362" y="767888"/>
+            <a:ext cx="1015633" cy="0"/>
+          </a:xfrm>
+          <a:prstGeom prst="straightConnector1">
+            <a:avLst/>
+          </a:prstGeom>
+          <a:ln w="22225">
+            <a:solidFill>
+              <a:schemeClr val="tx1"/>
+            </a:solidFill>
+            <a:tailEnd type="arrow"/>
+          </a:ln>
+        </p:spPr>
+        <p:style>
+          <a:lnRef idx="1">
+            <a:schemeClr val="accent1"/>
+          </a:lnRef>
+          <a:fillRef idx="0">
+            <a:schemeClr val="accent1"/>
+          </a:fillRef>
+          <a:effectRef idx="0">
+            <a:schemeClr val="accent1"/>
+          </a:effectRef>
+          <a:fontRef idx="minor">
+            <a:schemeClr val="tx1"/>
+          </a:fontRef>
+        </p:style>
+      </p:cxnSp>
+      <p:sp>
+        <p:nvSpPr>
+          <p:cNvPr id="33" name="Oval 32">
+            <a:extLst>
+              <a:ext uri="{FF2B5EF4-FFF2-40B4-BE49-F238E27FC236}">
+                <a16:creationId xmlns:a16="http://schemas.microsoft.com/office/drawing/2014/main" id="{EBE18BAD-960C-F441-ACDE-7850D6D00FB5}"/>
+              </a:ext>
+            </a:extLst>
+          </p:cNvPr>
+          <p:cNvSpPr/>
+          <p:nvPr/>
+        </p:nvSpPr>
+        <p:spPr>
+          <a:xfrm>
+            <a:off x="11532822" y="531082"/>
+            <a:ext cx="487680" cy="473612"/>
+          </a:xfrm>
+          <a:prstGeom prst="ellipse">
+            <a:avLst/>
+          </a:prstGeom>
+          <a:solidFill>
+            <a:schemeClr val="tx1">
+              <a:lumMod val="85000"/>
+              <a:lumOff val="15000"/>
+            </a:schemeClr>
+          </a:solidFill>
+          <a:ln w="38100">
+            <a:solidFill>
+              <a:srgbClr val="ECEC00"/>
+            </a:solidFill>
+          </a:ln>
+        </p:spPr>
+        <p:style>
+          <a:lnRef idx="2">
+            <a:schemeClr val="accent1">
+              <a:shade val="50000"/>
+            </a:schemeClr>
+          </a:lnRef>
+          <a:fillRef idx="1">
+            <a:schemeClr val="accent1"/>
+          </a:fillRef>
+          <a:effectRef idx="0">
+            <a:schemeClr val="accent1"/>
+          </a:effectRef>
+          <a:fontRef idx="minor">
+            <a:schemeClr val="lt1"/>
+          </a:fontRef>
+        </p:style>
+        <p:txBody>
+          <a:bodyPr rtlCol="0" anchor="ctr"/>
+          <a:lstStyle/>
+          <a:p>
+            <a:pPr algn="ctr"/>
+            <a:r>
+              <a:rPr lang="en-GB" dirty="0">
+                <a:solidFill>
+                  <a:srgbClr val="ECEC00"/>
+                </a:solidFill>
+                <a:latin typeface="Consolas" panose="020B0609020204030204" pitchFamily="49" charset="0"/>
+                <a:cs typeface="Consolas" panose="020B0609020204030204" pitchFamily="49" charset="0"/>
+              </a:rPr>
+              <a:t>S</a:t>
+            </a:r>
+          </a:p>
+        </p:txBody>
+      </p:sp>
+      <p:sp>
+        <p:nvSpPr>
+          <p:cNvPr id="34" name="Oval 33">
+            <a:extLst>
+              <a:ext uri="{FF2B5EF4-FFF2-40B4-BE49-F238E27FC236}">
+                <a16:creationId xmlns:a16="http://schemas.microsoft.com/office/drawing/2014/main" id="{F55790FA-73B4-1147-9845-3CB389557FF0}"/>
+              </a:ext>
+            </a:extLst>
+          </p:cNvPr>
+          <p:cNvSpPr/>
+          <p:nvPr/>
+        </p:nvSpPr>
+        <p:spPr>
+          <a:xfrm>
+            <a:off x="9756079" y="531082"/>
+            <a:ext cx="487680" cy="473612"/>
+          </a:xfrm>
+          <a:prstGeom prst="ellipse">
+            <a:avLst/>
+          </a:prstGeom>
+          <a:solidFill>
+            <a:schemeClr val="tx1">
+              <a:lumMod val="85000"/>
+              <a:lumOff val="15000"/>
+            </a:schemeClr>
+          </a:solidFill>
+          <a:ln w="38100">
+            <a:solidFill>
+              <a:srgbClr val="7B35B1"/>
+            </a:solidFill>
+          </a:ln>
+        </p:spPr>
+        <p:style>
+          <a:lnRef idx="2">
+            <a:schemeClr val="accent1">
+              <a:shade val="50000"/>
+            </a:schemeClr>
+          </a:lnRef>
+          <a:fillRef idx="1">
+            <a:schemeClr val="accent1"/>
+          </a:fillRef>
+          <a:effectRef idx="0">
+            <a:schemeClr val="accent1"/>
+          </a:effectRef>
+          <a:fontRef idx="minor">
+            <a:schemeClr val="lt1"/>
+          </a:fontRef>
+        </p:style>
+        <p:txBody>
+          <a:bodyPr lIns="0" rIns="0" rtlCol="0" anchor="ctr"/>
+          <a:lstStyle/>
+          <a:p>
+            <a:pPr algn="ctr"/>
+            <a:r>
+              <a:rPr lang="en-GB" dirty="0">
+                <a:solidFill>
+                  <a:srgbClr val="7B35B1"/>
+                </a:solidFill>
+                <a:latin typeface="Consolas" panose="020B0609020204030204" pitchFamily="49" charset="0"/>
+                <a:cs typeface="Consolas" panose="020B0609020204030204" pitchFamily="49" charset="0"/>
+              </a:rPr>
+              <a:t>As</a:t>
+            </a:r>
+          </a:p>
+        </p:txBody>
+      </p:sp>
+      <p:sp>
+        <p:nvSpPr>
+          <p:cNvPr id="35" name="TextBox 34">
+            <a:extLst>
+              <a:ext uri="{FF2B5EF4-FFF2-40B4-BE49-F238E27FC236}">
+                <a16:creationId xmlns:a16="http://schemas.microsoft.com/office/drawing/2014/main" id="{F1F4F18F-92A1-2043-8E5A-8BC5A922D414}"/>
+              </a:ext>
+            </a:extLst>
+          </p:cNvPr>
+          <p:cNvSpPr txBox="1"/>
+          <p:nvPr/>
+        </p:nvSpPr>
+        <p:spPr>
+          <a:xfrm>
+            <a:off x="10243759" y="574707"/>
+            <a:ext cx="1228221" cy="200055"/>
+          </a:xfrm>
+          <a:prstGeom prst="rect">
+            <a:avLst/>
+          </a:prstGeom>
+          <a:noFill/>
+        </p:spPr>
+        <p:txBody>
+          <a:bodyPr wrap="none" rtlCol="0">
+            <a:spAutoFit/>
+          </a:bodyPr>
+          <a:lstStyle/>
+          <a:p>
+            <a:r>
+              <a:rPr lang="en-GB" sz="700" dirty="0" err="1">
+                <a:latin typeface="Consolas" panose="020B0609020204030204" pitchFamily="49" charset="0"/>
+                <a:cs typeface="Consolas" panose="020B0609020204030204" pitchFamily="49" charset="0"/>
+              </a:rPr>
+              <a:t>ies:isParticipationOf</a:t>
+            </a:r>
+            <a:endParaRPr lang="en-GB" sz="700" dirty="0">
+              <a:latin typeface="Consolas" panose="020B0609020204030204" pitchFamily="49" charset="0"/>
+              <a:cs typeface="Consolas" panose="020B0609020204030204" pitchFamily="49" charset="0"/>
+            </a:endParaRPr>
+          </a:p>
+        </p:txBody>
+      </p:sp>
+      <p:cxnSp>
+        <p:nvCxnSpPr>
+          <p:cNvPr id="36" name="Straight Arrow Connector 35">
+            <a:extLst>
+              <a:ext uri="{FF2B5EF4-FFF2-40B4-BE49-F238E27FC236}">
+                <a16:creationId xmlns:a16="http://schemas.microsoft.com/office/drawing/2014/main" id="{C56DA479-CBB8-4744-A274-717D94116574}"/>
+              </a:ext>
+            </a:extLst>
+          </p:cNvPr>
+          <p:cNvCxnSpPr>
+            <a:cxnSpLocks/>
+            <a:stCxn id="34" idx="2"/>
+            <a:endCxn id="31" idx="6"/>
+          </p:cNvCxnSpPr>
+          <p:nvPr/>
+        </p:nvCxnSpPr>
+        <p:spPr>
+          <a:xfrm flipH="1">
+            <a:off x="8353675" y="767888"/>
+            <a:ext cx="1402404" cy="0"/>
+          </a:xfrm>
+          <a:prstGeom prst="straightConnector1">
+            <a:avLst/>
+          </a:prstGeom>
+          <a:ln w="22225">
+            <a:solidFill>
+              <a:schemeClr val="tx1"/>
+            </a:solidFill>
+            <a:tailEnd type="arrow"/>
+          </a:ln>
+        </p:spPr>
+        <p:style>
+          <a:lnRef idx="1">
+            <a:schemeClr val="accent1"/>
+          </a:lnRef>
+          <a:fillRef idx="0">
+            <a:schemeClr val="accent1"/>
+          </a:fillRef>
+          <a:effectRef idx="0">
+            <a:schemeClr val="accent1"/>
+          </a:effectRef>
+          <a:fontRef idx="minor">
+            <a:schemeClr val="tx1"/>
+          </a:fontRef>
+        </p:style>
+      </p:cxnSp>
+      <p:cxnSp>
+        <p:nvCxnSpPr>
+          <p:cNvPr id="37" name="Straight Arrow Connector 36">
+            <a:extLst>
+              <a:ext uri="{FF2B5EF4-FFF2-40B4-BE49-F238E27FC236}">
+                <a16:creationId xmlns:a16="http://schemas.microsoft.com/office/drawing/2014/main" id="{70E49CC3-AC6E-F04D-89C0-1343557DB493}"/>
+              </a:ext>
+            </a:extLst>
+          </p:cNvPr>
+          <p:cNvCxnSpPr>
+            <a:cxnSpLocks/>
+            <a:stCxn id="34" idx="6"/>
+            <a:endCxn id="33" idx="2"/>
+          </p:cNvCxnSpPr>
+          <p:nvPr/>
+        </p:nvCxnSpPr>
+        <p:spPr>
+          <a:xfrm>
+            <a:off x="10243759" y="767888"/>
+            <a:ext cx="1289063" cy="0"/>
+          </a:xfrm>
+          <a:prstGeom prst="straightConnector1">
+            <a:avLst/>
+          </a:prstGeom>
+          <a:ln w="22225">
+            <a:solidFill>
+              <a:schemeClr val="tx1"/>
+            </a:solidFill>
+            <a:tailEnd type="arrow"/>
+          </a:ln>
+        </p:spPr>
+        <p:style>
+          <a:lnRef idx="1">
+            <a:schemeClr val="accent1"/>
+          </a:lnRef>
+          <a:fillRef idx="0">
+            <a:schemeClr val="accent1"/>
+          </a:fillRef>
+          <a:effectRef idx="0">
+            <a:schemeClr val="accent1"/>
+          </a:effectRef>
+          <a:fontRef idx="minor">
+            <a:schemeClr val="tx1"/>
+          </a:fontRef>
+        </p:style>
+      </p:cxnSp>
+      <p:sp>
+        <p:nvSpPr>
+          <p:cNvPr id="38" name="TextBox 37">
+            <a:extLst>
+              <a:ext uri="{FF2B5EF4-FFF2-40B4-BE49-F238E27FC236}">
+                <a16:creationId xmlns:a16="http://schemas.microsoft.com/office/drawing/2014/main" id="{5FCA7E29-41E2-BC40-A856-6F94DA2B32C3}"/>
+              </a:ext>
+            </a:extLst>
+          </p:cNvPr>
+          <p:cNvSpPr txBox="1"/>
+          <p:nvPr/>
+        </p:nvSpPr>
+        <p:spPr>
+          <a:xfrm>
+            <a:off x="8568927" y="577343"/>
+            <a:ext cx="1128835" cy="200055"/>
+          </a:xfrm>
+          <a:prstGeom prst="rect">
+            <a:avLst/>
+          </a:prstGeom>
+          <a:noFill/>
+        </p:spPr>
+        <p:txBody>
+          <a:bodyPr wrap="none" rtlCol="0">
+            <a:spAutoFit/>
+          </a:bodyPr>
+          <a:lstStyle/>
+          <a:p>
+            <a:r>
+              <a:rPr lang="en-GB" sz="700" dirty="0" err="1">
+                <a:latin typeface="Consolas" panose="020B0609020204030204" pitchFamily="49" charset="0"/>
+                <a:cs typeface="Consolas" panose="020B0609020204030204" pitchFamily="49" charset="0"/>
+              </a:rPr>
+              <a:t>ies:isParticipantIn</a:t>
+            </a:r>
+            <a:endParaRPr lang="en-GB" sz="700" dirty="0">
+              <a:latin typeface="Consolas" panose="020B0609020204030204" pitchFamily="49" charset="0"/>
+              <a:cs typeface="Consolas" panose="020B0609020204030204" pitchFamily="49" charset="0"/>
+            </a:endParaRPr>
+          </a:p>
+        </p:txBody>
+      </p:sp>
+      <p:sp>
+        <p:nvSpPr>
+          <p:cNvPr id="39" name="Oval 38">
+            <a:extLst>
+              <a:ext uri="{FF2B5EF4-FFF2-40B4-BE49-F238E27FC236}">
+                <a16:creationId xmlns:a16="http://schemas.microsoft.com/office/drawing/2014/main" id="{08BCE40C-98EB-E74E-9C61-8AA9439849AB}"/>
+              </a:ext>
+            </a:extLst>
+          </p:cNvPr>
+          <p:cNvSpPr/>
+          <p:nvPr/>
+        </p:nvSpPr>
+        <p:spPr>
+          <a:xfrm>
+            <a:off x="7872446" y="1483424"/>
+            <a:ext cx="487680" cy="473612"/>
+          </a:xfrm>
+          <a:prstGeom prst="ellipse">
+            <a:avLst/>
+          </a:prstGeom>
+          <a:solidFill>
+            <a:schemeClr val="tx1">
+              <a:lumMod val="85000"/>
+              <a:lumOff val="15000"/>
+            </a:schemeClr>
+          </a:solidFill>
+          <a:ln w="38100">
+            <a:solidFill>
+              <a:schemeClr val="accent2"/>
+            </a:solidFill>
+          </a:ln>
+        </p:spPr>
+        <p:style>
+          <a:lnRef idx="2">
+            <a:schemeClr val="accent1">
+              <a:shade val="50000"/>
+            </a:schemeClr>
+          </a:lnRef>
+          <a:fillRef idx="1">
+            <a:schemeClr val="accent1"/>
+          </a:fillRef>
+          <a:effectRef idx="0">
+            <a:schemeClr val="accent1"/>
+          </a:effectRef>
+          <a:fontRef idx="minor">
+            <a:schemeClr val="lt1"/>
+          </a:fontRef>
+        </p:style>
+        <p:txBody>
+          <a:bodyPr lIns="0" rIns="0" rtlCol="0" anchor="ctr"/>
+          <a:lstStyle/>
+          <a:p>
+            <a:pPr algn="ctr"/>
+            <a:r>
+              <a:rPr lang="en-GB" dirty="0">
+                <a:solidFill>
+                  <a:schemeClr val="accent2"/>
+                </a:solidFill>
+                <a:latin typeface="Consolas" panose="020B0609020204030204" pitchFamily="49" charset="0"/>
+                <a:cs typeface="Consolas" panose="020B0609020204030204" pitchFamily="49" charset="0"/>
+              </a:rPr>
+              <a:t>PP</a:t>
+            </a:r>
+          </a:p>
+        </p:txBody>
+      </p:sp>
+      <p:cxnSp>
+        <p:nvCxnSpPr>
+          <p:cNvPr id="40" name="Straight Arrow Connector 39">
+            <a:extLst>
+              <a:ext uri="{FF2B5EF4-FFF2-40B4-BE49-F238E27FC236}">
+                <a16:creationId xmlns:a16="http://schemas.microsoft.com/office/drawing/2014/main" id="{9D59AC5F-952D-7A4D-84E4-33688FB1DAA6}"/>
+              </a:ext>
+            </a:extLst>
+          </p:cNvPr>
+          <p:cNvCxnSpPr>
+            <a:cxnSpLocks/>
+            <a:stCxn id="31" idx="4"/>
+            <a:endCxn id="39" idx="0"/>
+          </p:cNvCxnSpPr>
+          <p:nvPr/>
+        </p:nvCxnSpPr>
+        <p:spPr>
+          <a:xfrm>
+            <a:off x="8109835" y="1004694"/>
+            <a:ext cx="6451" cy="478730"/>
+          </a:xfrm>
+          <a:prstGeom prst="straightConnector1">
+            <a:avLst/>
+          </a:prstGeom>
+          <a:ln w="22225">
+            <a:solidFill>
+              <a:schemeClr val="tx1"/>
+            </a:solidFill>
+            <a:tailEnd type="arrow"/>
+          </a:ln>
+        </p:spPr>
+        <p:style>
+          <a:lnRef idx="1">
+            <a:schemeClr val="accent1"/>
+          </a:lnRef>
+          <a:fillRef idx="0">
+            <a:schemeClr val="accent1"/>
+          </a:fillRef>
+          <a:effectRef idx="0">
+            <a:schemeClr val="accent1"/>
+          </a:effectRef>
+          <a:fontRef idx="minor">
+            <a:schemeClr val="tx1"/>
+          </a:fontRef>
+        </p:style>
+      </p:cxnSp>
+      <p:sp>
+        <p:nvSpPr>
+          <p:cNvPr id="41" name="TextBox 40">
+            <a:extLst>
+              <a:ext uri="{FF2B5EF4-FFF2-40B4-BE49-F238E27FC236}">
+                <a16:creationId xmlns:a16="http://schemas.microsoft.com/office/drawing/2014/main" id="{315C0233-0FEB-A24C-AD9C-BB3150A85EA8}"/>
+              </a:ext>
+            </a:extLst>
+          </p:cNvPr>
+          <p:cNvSpPr txBox="1"/>
+          <p:nvPr/>
+        </p:nvSpPr>
+        <p:spPr>
+          <a:xfrm>
+            <a:off x="8060575" y="1088629"/>
+            <a:ext cx="780983" cy="200055"/>
+          </a:xfrm>
+          <a:prstGeom prst="rect">
+            <a:avLst/>
+          </a:prstGeom>
+          <a:noFill/>
+        </p:spPr>
+        <p:txBody>
+          <a:bodyPr wrap="none" rtlCol="0">
+            <a:spAutoFit/>
+          </a:bodyPr>
+          <a:lstStyle/>
+          <a:p>
+            <a:r>
+              <a:rPr lang="en-GB" sz="700" dirty="0" err="1">
+                <a:latin typeface="Consolas" panose="020B0609020204030204" pitchFamily="49" charset="0"/>
+                <a:cs typeface="Consolas" panose="020B0609020204030204" pitchFamily="49" charset="0"/>
+              </a:rPr>
+              <a:t>ies:inPeriod</a:t>
+            </a:r>
+            <a:endParaRPr lang="en-GB" sz="700" dirty="0">
+              <a:latin typeface="Consolas" panose="020B0609020204030204" pitchFamily="49" charset="0"/>
+              <a:cs typeface="Consolas" panose="020B0609020204030204" pitchFamily="49" charset="0"/>
+            </a:endParaRPr>
+          </a:p>
+        </p:txBody>
+      </p:sp>
+      <p:sp>
+        <p:nvSpPr>
+          <p:cNvPr id="42" name="TextBox 41">
+            <a:extLst>
+              <a:ext uri="{FF2B5EF4-FFF2-40B4-BE49-F238E27FC236}">
+                <a16:creationId xmlns:a16="http://schemas.microsoft.com/office/drawing/2014/main" id="{DF4C773B-E4D5-6A43-8BD8-8C284AAF5D36}"/>
+              </a:ext>
+            </a:extLst>
+          </p:cNvPr>
+          <p:cNvSpPr txBox="1"/>
+          <p:nvPr/>
+        </p:nvSpPr>
+        <p:spPr>
+          <a:xfrm>
+            <a:off x="7425275" y="1958554"/>
+            <a:ext cx="1362874" cy="215444"/>
+          </a:xfrm>
+          <a:prstGeom prst="rect">
+            <a:avLst/>
+          </a:prstGeom>
+          <a:noFill/>
+        </p:spPr>
+        <p:txBody>
+          <a:bodyPr wrap="none" rtlCol="0">
+            <a:spAutoFit/>
+          </a:bodyPr>
+          <a:lstStyle/>
+          <a:p>
+            <a:r>
+              <a:rPr lang="en-GB" sz="800" u="sng" dirty="0">
+                <a:solidFill>
+                  <a:srgbClr val="0432FF"/>
+                </a:solidFill>
+                <a:latin typeface="Consolas" panose="020B0609020204030204" pitchFamily="49" charset="0"/>
+                <a:cs typeface="Consolas" panose="020B0609020204030204" pitchFamily="49" charset="0"/>
+              </a:rPr>
+              <a:t>data:2020-04-01T18:00</a:t>
+            </a:r>
+          </a:p>
+        </p:txBody>
+      </p:sp>
+      <p:cxnSp>
+        <p:nvCxnSpPr>
+          <p:cNvPr id="45" name="Straight Arrow Connector 44">
+            <a:extLst>
+              <a:ext uri="{FF2B5EF4-FFF2-40B4-BE49-F238E27FC236}">
+                <a16:creationId xmlns:a16="http://schemas.microsoft.com/office/drawing/2014/main" id="{AF9A4A20-0DBD-1C4F-9274-E8BC9A7D1668}"/>
+              </a:ext>
+            </a:extLst>
+          </p:cNvPr>
+          <p:cNvCxnSpPr>
+            <a:cxnSpLocks/>
+            <a:stCxn id="16" idx="0"/>
+            <a:endCxn id="30" idx="4"/>
+          </p:cNvCxnSpPr>
+          <p:nvPr/>
+        </p:nvCxnSpPr>
+        <p:spPr>
+          <a:xfrm flipV="1">
+            <a:off x="6606522" y="1004694"/>
+            <a:ext cx="0" cy="1624546"/>
+          </a:xfrm>
+          <a:prstGeom prst="straightConnector1">
+            <a:avLst/>
+          </a:prstGeom>
+          <a:ln w="22225">
+            <a:solidFill>
+              <a:schemeClr val="tx1"/>
+            </a:solidFill>
+            <a:tailEnd type="arrow"/>
+          </a:ln>
+        </p:spPr>
+        <p:style>
+          <a:lnRef idx="1">
+            <a:schemeClr val="accent1"/>
+          </a:lnRef>
+          <a:fillRef idx="0">
+            <a:schemeClr val="accent1"/>
+          </a:fillRef>
+          <a:effectRef idx="0">
+            <a:schemeClr val="accent1"/>
+          </a:effectRef>
+          <a:fontRef idx="minor">
+            <a:schemeClr val="tx1"/>
+          </a:fontRef>
+        </p:style>
+      </p:cxnSp>
+      <p:sp>
+        <p:nvSpPr>
+          <p:cNvPr id="48" name="TextBox 47">
+            <a:extLst>
+              <a:ext uri="{FF2B5EF4-FFF2-40B4-BE49-F238E27FC236}">
+                <a16:creationId xmlns:a16="http://schemas.microsoft.com/office/drawing/2014/main" id="{38E7924F-8F4C-4D42-8F73-B9FCB6C50E1B}"/>
+              </a:ext>
+            </a:extLst>
+          </p:cNvPr>
+          <p:cNvSpPr txBox="1"/>
+          <p:nvPr/>
+        </p:nvSpPr>
+        <p:spPr>
+          <a:xfrm>
+            <a:off x="5793735" y="1174457"/>
+            <a:ext cx="857927" cy="215444"/>
+          </a:xfrm>
+          <a:prstGeom prst="rect">
+            <a:avLst/>
+          </a:prstGeom>
+          <a:noFill/>
+        </p:spPr>
+        <p:txBody>
+          <a:bodyPr wrap="none" rtlCol="0">
+            <a:spAutoFit/>
+          </a:bodyPr>
+          <a:lstStyle/>
+          <a:p>
+            <a:r>
+              <a:rPr lang="en-GB" sz="800" dirty="0" err="1">
+                <a:latin typeface="Consolas" panose="020B0609020204030204" pitchFamily="49" charset="0"/>
+                <a:cs typeface="Consolas" panose="020B0609020204030204" pitchFamily="49" charset="0"/>
+              </a:rPr>
+              <a:t>ies:isPartOf</a:t>
+            </a:r>
+            <a:endParaRPr lang="en-GB" sz="800" dirty="0">
+              <a:latin typeface="Consolas" panose="020B0609020204030204" pitchFamily="49" charset="0"/>
+              <a:cs typeface="Consolas" panose="020B0609020204030204" pitchFamily="49" charset="0"/>
+            </a:endParaRPr>
+          </a:p>
+        </p:txBody>
+      </p:sp>
+      <p:cxnSp>
+        <p:nvCxnSpPr>
+          <p:cNvPr id="53" name="Straight Arrow Connector 52">
+            <a:extLst>
+              <a:ext uri="{FF2B5EF4-FFF2-40B4-BE49-F238E27FC236}">
+                <a16:creationId xmlns:a16="http://schemas.microsoft.com/office/drawing/2014/main" id="{0EE4E86F-7522-F14D-A140-509896ED350B}"/>
+              </a:ext>
+            </a:extLst>
+          </p:cNvPr>
+          <p:cNvCxnSpPr>
+            <a:cxnSpLocks/>
+            <a:stCxn id="51" idx="0"/>
+            <a:endCxn id="16" idx="3"/>
+          </p:cNvCxnSpPr>
+          <p:nvPr/>
+        </p:nvCxnSpPr>
+        <p:spPr>
+          <a:xfrm flipV="1">
+            <a:off x="6058367" y="3033493"/>
+            <a:ext cx="375734" cy="551651"/>
+          </a:xfrm>
+          <a:prstGeom prst="straightConnector1">
+            <a:avLst/>
+          </a:prstGeom>
+          <a:ln w="22225">
+            <a:solidFill>
+              <a:schemeClr val="tx1"/>
+            </a:solidFill>
+            <a:tailEnd type="arrow"/>
+          </a:ln>
+        </p:spPr>
+        <p:style>
+          <a:lnRef idx="1">
+            <a:schemeClr val="accent1"/>
+          </a:lnRef>
+          <a:fillRef idx="0">
+            <a:schemeClr val="accent1"/>
+          </a:fillRef>
+          <a:effectRef idx="0">
+            <a:schemeClr val="accent1"/>
+          </a:effectRef>
+          <a:fontRef idx="minor">
+            <a:schemeClr val="tx1"/>
+          </a:fontRef>
+        </p:style>
+      </p:cxnSp>
+      <p:cxnSp>
+        <p:nvCxnSpPr>
+          <p:cNvPr id="56" name="Straight Arrow Connector 55">
+            <a:extLst>
+              <a:ext uri="{FF2B5EF4-FFF2-40B4-BE49-F238E27FC236}">
+                <a16:creationId xmlns:a16="http://schemas.microsoft.com/office/drawing/2014/main" id="{85915FDA-D69B-9E40-81C5-D22A384B36A0}"/>
+              </a:ext>
+            </a:extLst>
+          </p:cNvPr>
+          <p:cNvCxnSpPr>
+            <a:cxnSpLocks/>
+            <a:stCxn id="52" idx="0"/>
+            <a:endCxn id="16" idx="5"/>
+          </p:cNvCxnSpPr>
+          <p:nvPr/>
+        </p:nvCxnSpPr>
+        <p:spPr>
+          <a:xfrm flipH="1" flipV="1">
+            <a:off x="6778943" y="3033493"/>
+            <a:ext cx="433155" cy="551651"/>
+          </a:xfrm>
+          <a:prstGeom prst="straightConnector1">
+            <a:avLst/>
+          </a:prstGeom>
+          <a:ln w="22225">
+            <a:solidFill>
+              <a:schemeClr val="tx1"/>
+            </a:solidFill>
+            <a:tailEnd type="arrow"/>
+          </a:ln>
+        </p:spPr>
+        <p:style>
+          <a:lnRef idx="1">
+            <a:schemeClr val="accent1"/>
+          </a:lnRef>
+          <a:fillRef idx="0">
+            <a:schemeClr val="accent1"/>
+          </a:fillRef>
+          <a:effectRef idx="0">
+            <a:schemeClr val="accent1"/>
+          </a:effectRef>
+          <a:fontRef idx="minor">
+            <a:schemeClr val="tx1"/>
+          </a:fontRef>
+        </p:style>
+      </p:cxnSp>
+      <p:sp>
+        <p:nvSpPr>
+          <p:cNvPr id="59" name="TextBox 58">
+            <a:extLst>
+              <a:ext uri="{FF2B5EF4-FFF2-40B4-BE49-F238E27FC236}">
+                <a16:creationId xmlns:a16="http://schemas.microsoft.com/office/drawing/2014/main" id="{BC2A6794-B138-3C45-B23B-2FCF88AB853D}"/>
+              </a:ext>
+            </a:extLst>
+          </p:cNvPr>
+          <p:cNvSpPr txBox="1"/>
+          <p:nvPr/>
+        </p:nvSpPr>
+        <p:spPr>
+          <a:xfrm>
+            <a:off x="6877002" y="3102852"/>
+            <a:ext cx="801823" cy="215444"/>
+          </a:xfrm>
+          <a:prstGeom prst="rect">
+            <a:avLst/>
+          </a:prstGeom>
+          <a:noFill/>
+        </p:spPr>
+        <p:txBody>
+          <a:bodyPr wrap="none" rtlCol="0">
+            <a:spAutoFit/>
+          </a:bodyPr>
+          <a:lstStyle/>
+          <a:p>
+            <a:r>
+              <a:rPr lang="en-GB" sz="800" dirty="0" err="1">
+                <a:latin typeface="Consolas" panose="020B0609020204030204" pitchFamily="49" charset="0"/>
+                <a:cs typeface="Consolas" panose="020B0609020204030204" pitchFamily="49" charset="0"/>
+              </a:rPr>
+              <a:t>ies:isEndOf</a:t>
+            </a:r>
+            <a:endParaRPr lang="en-GB" sz="800" dirty="0">
+              <a:latin typeface="Consolas" panose="020B0609020204030204" pitchFamily="49" charset="0"/>
+              <a:cs typeface="Consolas" panose="020B0609020204030204" pitchFamily="49" charset="0"/>
+            </a:endParaRPr>
+          </a:p>
+        </p:txBody>
+      </p:sp>
+      <p:sp>
+        <p:nvSpPr>
+          <p:cNvPr id="60" name="TextBox 59">
+            <a:extLst>
+              <a:ext uri="{FF2B5EF4-FFF2-40B4-BE49-F238E27FC236}">
+                <a16:creationId xmlns:a16="http://schemas.microsoft.com/office/drawing/2014/main" id="{CE93FF81-0AD7-684D-80A4-915CBFE7A1DB}"/>
+              </a:ext>
+            </a:extLst>
+          </p:cNvPr>
+          <p:cNvSpPr txBox="1"/>
+          <p:nvPr/>
+        </p:nvSpPr>
+        <p:spPr>
+          <a:xfrm>
+            <a:off x="5393206" y="3099527"/>
+            <a:ext cx="914033" cy="215444"/>
+          </a:xfrm>
+          <a:prstGeom prst="rect">
+            <a:avLst/>
+          </a:prstGeom>
+          <a:noFill/>
+        </p:spPr>
+        <p:txBody>
+          <a:bodyPr wrap="none" rtlCol="0">
+            <a:spAutoFit/>
+          </a:bodyPr>
+          <a:lstStyle/>
+          <a:p>
+            <a:r>
+              <a:rPr lang="en-GB" sz="800" dirty="0" err="1">
+                <a:latin typeface="Consolas" panose="020B0609020204030204" pitchFamily="49" charset="0"/>
+                <a:cs typeface="Consolas" panose="020B0609020204030204" pitchFamily="49" charset="0"/>
+              </a:rPr>
+              <a:t>ies:isStartOf</a:t>
+            </a:r>
+            <a:endParaRPr lang="en-GB" sz="800" dirty="0">
+              <a:latin typeface="Consolas" panose="020B0609020204030204" pitchFamily="49" charset="0"/>
+              <a:cs typeface="Consolas" panose="020B0609020204030204" pitchFamily="49" charset="0"/>
+            </a:endParaRPr>
+          </a:p>
+        </p:txBody>
+      </p:sp>
+      <p:cxnSp>
+        <p:nvCxnSpPr>
+          <p:cNvPr id="63" name="Straight Arrow Connector 62">
+            <a:extLst>
+              <a:ext uri="{FF2B5EF4-FFF2-40B4-BE49-F238E27FC236}">
+                <a16:creationId xmlns:a16="http://schemas.microsoft.com/office/drawing/2014/main" id="{BCB124C6-61B6-CA40-9FEF-BFF9CFFB0C9A}"/>
+              </a:ext>
+            </a:extLst>
+          </p:cNvPr>
+          <p:cNvCxnSpPr>
+            <a:cxnSpLocks/>
+            <a:stCxn id="52" idx="4"/>
+            <a:endCxn id="61" idx="0"/>
+          </p:cNvCxnSpPr>
+          <p:nvPr/>
+        </p:nvCxnSpPr>
+        <p:spPr>
+          <a:xfrm>
+            <a:off x="7212098" y="4058756"/>
+            <a:ext cx="3327" cy="476685"/>
+          </a:xfrm>
+          <a:prstGeom prst="straightConnector1">
+            <a:avLst/>
+          </a:prstGeom>
+          <a:ln w="22225">
+            <a:solidFill>
+              <a:schemeClr val="tx1"/>
+            </a:solidFill>
+            <a:tailEnd type="arrow"/>
+          </a:ln>
+        </p:spPr>
+        <p:style>
+          <a:lnRef idx="1">
+            <a:schemeClr val="accent1"/>
+          </a:lnRef>
+          <a:fillRef idx="0">
+            <a:schemeClr val="accent1"/>
+          </a:fillRef>
+          <a:effectRef idx="0">
+            <a:schemeClr val="accent1"/>
+          </a:effectRef>
+          <a:fontRef idx="minor">
+            <a:schemeClr val="tx1"/>
+          </a:fontRef>
+        </p:style>
+      </p:cxnSp>
+      <p:cxnSp>
+        <p:nvCxnSpPr>
+          <p:cNvPr id="66" name="Straight Arrow Connector 65">
+            <a:extLst>
+              <a:ext uri="{FF2B5EF4-FFF2-40B4-BE49-F238E27FC236}">
+                <a16:creationId xmlns:a16="http://schemas.microsoft.com/office/drawing/2014/main" id="{5568DFE7-E22E-7D49-8ED2-30569C5F114F}"/>
+              </a:ext>
+            </a:extLst>
+          </p:cNvPr>
+          <p:cNvCxnSpPr>
+            <a:cxnSpLocks/>
+            <a:stCxn id="51" idx="4"/>
+            <a:endCxn id="62" idx="0"/>
+          </p:cNvCxnSpPr>
+          <p:nvPr/>
+        </p:nvCxnSpPr>
+        <p:spPr>
+          <a:xfrm>
+            <a:off x="6058367" y="4058756"/>
+            <a:ext cx="3143" cy="473613"/>
+          </a:xfrm>
+          <a:prstGeom prst="straightConnector1">
+            <a:avLst/>
+          </a:prstGeom>
+          <a:ln w="22225">
+            <a:solidFill>
+              <a:schemeClr val="tx1"/>
+            </a:solidFill>
+            <a:tailEnd type="arrow"/>
+          </a:ln>
+        </p:spPr>
+        <p:style>
+          <a:lnRef idx="1">
+            <a:schemeClr val="accent1"/>
+          </a:lnRef>
+          <a:fillRef idx="0">
+            <a:schemeClr val="accent1"/>
+          </a:fillRef>
+          <a:effectRef idx="0">
+            <a:schemeClr val="accent1"/>
+          </a:effectRef>
+          <a:fontRef idx="minor">
+            <a:schemeClr val="tx1"/>
+          </a:fontRef>
+        </p:style>
+      </p:cxnSp>
+      <p:sp>
+        <p:nvSpPr>
+          <p:cNvPr id="69" name="TextBox 68">
+            <a:extLst>
+              <a:ext uri="{FF2B5EF4-FFF2-40B4-BE49-F238E27FC236}">
+                <a16:creationId xmlns:a16="http://schemas.microsoft.com/office/drawing/2014/main" id="{321D2309-14D5-BA43-8A54-801DB9D76C76}"/>
+              </a:ext>
+            </a:extLst>
+          </p:cNvPr>
+          <p:cNvSpPr txBox="1"/>
+          <p:nvPr/>
+        </p:nvSpPr>
+        <p:spPr>
+          <a:xfrm>
+            <a:off x="5997960" y="4077132"/>
+            <a:ext cx="780983" cy="200055"/>
+          </a:xfrm>
+          <a:prstGeom prst="rect">
+            <a:avLst/>
+          </a:prstGeom>
+          <a:noFill/>
+        </p:spPr>
+        <p:txBody>
+          <a:bodyPr wrap="none" rtlCol="0">
+            <a:spAutoFit/>
+          </a:bodyPr>
+          <a:lstStyle/>
+          <a:p>
+            <a:r>
+              <a:rPr lang="en-GB" sz="700" dirty="0" err="1">
+                <a:latin typeface="Consolas" panose="020B0609020204030204" pitchFamily="49" charset="0"/>
+                <a:cs typeface="Consolas" panose="020B0609020204030204" pitchFamily="49" charset="0"/>
+              </a:rPr>
+              <a:t>ies:inPeriod</a:t>
+            </a:r>
+            <a:endParaRPr lang="en-GB" sz="700" dirty="0">
+              <a:latin typeface="Consolas" panose="020B0609020204030204" pitchFamily="49" charset="0"/>
+              <a:cs typeface="Consolas" panose="020B0609020204030204" pitchFamily="49" charset="0"/>
+            </a:endParaRPr>
+          </a:p>
+        </p:txBody>
+      </p:sp>
+      <p:sp>
+        <p:nvSpPr>
+          <p:cNvPr id="70" name="TextBox 69">
+            <a:extLst>
+              <a:ext uri="{FF2B5EF4-FFF2-40B4-BE49-F238E27FC236}">
+                <a16:creationId xmlns:a16="http://schemas.microsoft.com/office/drawing/2014/main" id="{F342FA27-DEA0-6544-A061-359D23C23ED8}"/>
+              </a:ext>
+            </a:extLst>
+          </p:cNvPr>
+          <p:cNvSpPr txBox="1"/>
+          <p:nvPr/>
+        </p:nvSpPr>
+        <p:spPr>
+          <a:xfrm>
+            <a:off x="6486510" y="4219969"/>
+            <a:ext cx="780983" cy="200055"/>
+          </a:xfrm>
+          <a:prstGeom prst="rect">
+            <a:avLst/>
+          </a:prstGeom>
+          <a:noFill/>
+        </p:spPr>
+        <p:txBody>
+          <a:bodyPr wrap="none" rtlCol="0">
+            <a:spAutoFit/>
+          </a:bodyPr>
+          <a:lstStyle/>
+          <a:p>
+            <a:r>
+              <a:rPr lang="en-GB" sz="700" dirty="0" err="1">
+                <a:latin typeface="Consolas" panose="020B0609020204030204" pitchFamily="49" charset="0"/>
+                <a:cs typeface="Consolas" panose="020B0609020204030204" pitchFamily="49" charset="0"/>
+              </a:rPr>
+              <a:t>ies:inPeriod</a:t>
+            </a:r>
+            <a:endParaRPr lang="en-GB" sz="700" dirty="0">
+              <a:latin typeface="Consolas" panose="020B0609020204030204" pitchFamily="49" charset="0"/>
+              <a:cs typeface="Consolas" panose="020B0609020204030204" pitchFamily="49" charset="0"/>
+            </a:endParaRPr>
+          </a:p>
+        </p:txBody>
+      </p:sp>
+      <p:sp>
+        <p:nvSpPr>
+          <p:cNvPr id="71" name="TextBox 70">
+            <a:extLst>
+              <a:ext uri="{FF2B5EF4-FFF2-40B4-BE49-F238E27FC236}">
+                <a16:creationId xmlns:a16="http://schemas.microsoft.com/office/drawing/2014/main" id="{65F546DE-3B8F-134A-B4E5-620051145CAD}"/>
+              </a:ext>
+            </a:extLst>
+          </p:cNvPr>
+          <p:cNvSpPr txBox="1"/>
+          <p:nvPr/>
+        </p:nvSpPr>
+        <p:spPr>
+          <a:xfrm>
+            <a:off x="5316523" y="5019756"/>
+            <a:ext cx="1362874" cy="215444"/>
+          </a:xfrm>
+          <a:prstGeom prst="rect">
+            <a:avLst/>
+          </a:prstGeom>
+          <a:noFill/>
+        </p:spPr>
+        <p:txBody>
+          <a:bodyPr wrap="none" rtlCol="0">
+            <a:spAutoFit/>
+          </a:bodyPr>
+          <a:lstStyle/>
+          <a:p>
+            <a:r>
+              <a:rPr lang="en-GB" sz="800" u="sng" dirty="0">
+                <a:solidFill>
+                  <a:srgbClr val="0432FF"/>
+                </a:solidFill>
+                <a:latin typeface="Consolas" panose="020B0609020204030204" pitchFamily="49" charset="0"/>
+                <a:cs typeface="Consolas" panose="020B0609020204030204" pitchFamily="49" charset="0"/>
+              </a:rPr>
+              <a:t>data:2020-04-01T09:30</a:t>
+            </a:r>
+          </a:p>
+        </p:txBody>
+      </p:sp>
+      <p:sp>
+        <p:nvSpPr>
+          <p:cNvPr id="72" name="TextBox 71">
+            <a:extLst>
+              <a:ext uri="{FF2B5EF4-FFF2-40B4-BE49-F238E27FC236}">
+                <a16:creationId xmlns:a16="http://schemas.microsoft.com/office/drawing/2014/main" id="{8CFDA6E9-3B04-544E-9BFB-1D0887FE33DC}"/>
+              </a:ext>
+            </a:extLst>
+          </p:cNvPr>
+          <p:cNvSpPr txBox="1"/>
+          <p:nvPr/>
+        </p:nvSpPr>
+        <p:spPr>
+          <a:xfrm>
+            <a:off x="6606522" y="5019756"/>
+            <a:ext cx="1362874" cy="215444"/>
+          </a:xfrm>
+          <a:prstGeom prst="rect">
+            <a:avLst/>
+          </a:prstGeom>
+          <a:noFill/>
+        </p:spPr>
+        <p:txBody>
+          <a:bodyPr wrap="none" rtlCol="0">
+            <a:spAutoFit/>
+          </a:bodyPr>
+          <a:lstStyle/>
+          <a:p>
+            <a:r>
+              <a:rPr lang="en-GB" sz="800" u="sng" dirty="0">
+                <a:solidFill>
+                  <a:srgbClr val="0432FF"/>
+                </a:solidFill>
+                <a:latin typeface="Consolas" panose="020B0609020204030204" pitchFamily="49" charset="0"/>
+                <a:cs typeface="Consolas" panose="020B0609020204030204" pitchFamily="49" charset="0"/>
+              </a:rPr>
+              <a:t>data:2020-04-01T14:22</a:t>
+            </a:r>
+          </a:p>
+        </p:txBody>
+      </p:sp>
+      <p:sp>
+        <p:nvSpPr>
+          <p:cNvPr id="16" name="Oval 15">
+            <a:extLst>
+              <a:ext uri="{FF2B5EF4-FFF2-40B4-BE49-F238E27FC236}">
+                <a16:creationId xmlns:a16="http://schemas.microsoft.com/office/drawing/2014/main" id="{AD6A5D5E-2402-864D-A86E-BE57A8684779}"/>
+              </a:ext>
+            </a:extLst>
+          </p:cNvPr>
+          <p:cNvSpPr/>
+          <p:nvPr/>
+        </p:nvSpPr>
+        <p:spPr>
+          <a:xfrm>
+            <a:off x="6362682" y="2629240"/>
+            <a:ext cx="487680" cy="473612"/>
+          </a:xfrm>
+          <a:prstGeom prst="ellipse">
+            <a:avLst/>
+          </a:prstGeom>
+          <a:solidFill>
+            <a:schemeClr val="tx1">
+              <a:lumMod val="85000"/>
+              <a:lumOff val="15000"/>
+            </a:schemeClr>
+          </a:solidFill>
+          <a:ln w="38100">
+            <a:solidFill>
+              <a:schemeClr val="accent4"/>
+            </a:solidFill>
+          </a:ln>
+        </p:spPr>
+        <p:style>
+          <a:lnRef idx="2">
+            <a:schemeClr val="accent1">
+              <a:shade val="50000"/>
+            </a:schemeClr>
+          </a:lnRef>
+          <a:fillRef idx="1">
+            <a:schemeClr val="accent1"/>
+          </a:fillRef>
+          <a:effectRef idx="0">
+            <a:schemeClr val="accent1"/>
+          </a:effectRef>
+          <a:fontRef idx="minor">
+            <a:schemeClr val="lt1"/>
+          </a:fontRef>
+        </p:style>
+        <p:txBody>
+          <a:bodyPr lIns="0" rIns="0" rtlCol="0" anchor="ctr"/>
+          <a:lstStyle/>
+          <a:p>
+            <a:pPr algn="ctr"/>
+            <a:r>
+              <a:rPr lang="en-GB" dirty="0">
+                <a:solidFill>
+                  <a:schemeClr val="accent4"/>
+                </a:solidFill>
+                <a:latin typeface="Consolas" panose="020B0609020204030204" pitchFamily="49" charset="0"/>
+                <a:cs typeface="Consolas" panose="020B0609020204030204" pitchFamily="49" charset="0"/>
+              </a:rPr>
+              <a:t>VS</a:t>
+            </a:r>
+          </a:p>
+        </p:txBody>
+      </p:sp>
+      <p:sp>
+        <p:nvSpPr>
+          <p:cNvPr id="15" name="Oval 14">
+            <a:extLst>
+              <a:ext uri="{FF2B5EF4-FFF2-40B4-BE49-F238E27FC236}">
+                <a16:creationId xmlns:a16="http://schemas.microsoft.com/office/drawing/2014/main" id="{7FA8E660-CB72-3648-81BD-DEAA4EF158C1}"/>
+              </a:ext>
+            </a:extLst>
+          </p:cNvPr>
+          <p:cNvSpPr/>
+          <p:nvPr/>
+        </p:nvSpPr>
+        <p:spPr>
+          <a:xfrm>
+            <a:off x="8081247" y="2629240"/>
+            <a:ext cx="487680" cy="473612"/>
+          </a:xfrm>
+          <a:prstGeom prst="ellipse">
+            <a:avLst/>
+          </a:prstGeom>
+          <a:solidFill>
+            <a:schemeClr val="tx1">
+              <a:lumMod val="85000"/>
+              <a:lumOff val="15000"/>
+            </a:schemeClr>
+          </a:solidFill>
+          <a:ln w="38100">
+            <a:solidFill>
+              <a:srgbClr val="ECEC00"/>
+            </a:solidFill>
+          </a:ln>
+        </p:spPr>
+        <p:style>
+          <a:lnRef idx="2">
+            <a:schemeClr val="accent1">
+              <a:shade val="50000"/>
+            </a:schemeClr>
+          </a:lnRef>
+          <a:fillRef idx="1">
+            <a:schemeClr val="accent1"/>
+          </a:fillRef>
+          <a:effectRef idx="0">
+            <a:schemeClr val="accent1"/>
+          </a:effectRef>
+          <a:fontRef idx="minor">
+            <a:schemeClr val="lt1"/>
+          </a:fontRef>
+        </p:style>
+        <p:txBody>
+          <a:bodyPr lIns="0" rIns="0" rtlCol="0" anchor="ctr"/>
+          <a:lstStyle/>
+          <a:p>
+            <a:pPr algn="ctr"/>
+            <a:r>
+              <a:rPr lang="en-GB" dirty="0">
+                <a:solidFill>
+                  <a:srgbClr val="ECEC00"/>
+                </a:solidFill>
+                <a:latin typeface="Consolas" panose="020B0609020204030204" pitchFamily="49" charset="0"/>
+                <a:cs typeface="Consolas" panose="020B0609020204030204" pitchFamily="49" charset="0"/>
+              </a:rPr>
+              <a:t>V</a:t>
+            </a:r>
+          </a:p>
+        </p:txBody>
+      </p:sp>
+      <p:sp>
+        <p:nvSpPr>
+          <p:cNvPr id="22" name="Oval 21">
+            <a:extLst>
+              <a:ext uri="{FF2B5EF4-FFF2-40B4-BE49-F238E27FC236}">
+                <a16:creationId xmlns:a16="http://schemas.microsoft.com/office/drawing/2014/main" id="{FE700073-9764-4D4A-A2EA-22FE3D5BB724}"/>
+              </a:ext>
+            </a:extLst>
+          </p:cNvPr>
+          <p:cNvSpPr/>
+          <p:nvPr/>
+        </p:nvSpPr>
+        <p:spPr>
+          <a:xfrm>
+            <a:off x="4711405" y="2629240"/>
+            <a:ext cx="487680" cy="473612"/>
+          </a:xfrm>
+          <a:prstGeom prst="ellipse">
+            <a:avLst/>
+          </a:prstGeom>
+          <a:solidFill>
+            <a:schemeClr val="tx1">
+              <a:lumMod val="85000"/>
+              <a:lumOff val="15000"/>
+            </a:schemeClr>
+          </a:solidFill>
+          <a:ln w="38100">
+            <a:solidFill>
+              <a:srgbClr val="ECEC00"/>
+            </a:solidFill>
+          </a:ln>
+        </p:spPr>
+        <p:style>
+          <a:lnRef idx="2">
+            <a:schemeClr val="accent1">
+              <a:shade val="50000"/>
+            </a:schemeClr>
+          </a:lnRef>
+          <a:fillRef idx="1">
+            <a:schemeClr val="accent1"/>
+          </a:fillRef>
+          <a:effectRef idx="0">
+            <a:schemeClr val="accent1"/>
+          </a:effectRef>
+          <a:fontRef idx="minor">
+            <a:schemeClr val="lt1"/>
+          </a:fontRef>
+        </p:style>
+        <p:txBody>
+          <a:bodyPr lIns="0" rIns="0" rtlCol="0" anchor="ctr"/>
+          <a:lstStyle/>
+          <a:p>
+            <a:pPr algn="ctr"/>
+            <a:r>
+              <a:rPr lang="en-GB" sz="1600" dirty="0">
+                <a:solidFill>
+                  <a:srgbClr val="ECEC00"/>
+                </a:solidFill>
+                <a:latin typeface="Consolas" panose="020B0609020204030204" pitchFamily="49" charset="0"/>
+                <a:cs typeface="Consolas" panose="020B0609020204030204" pitchFamily="49" charset="0"/>
+              </a:rPr>
+              <a:t>EEZ</a:t>
+            </a:r>
+          </a:p>
+        </p:txBody>
+      </p:sp>
+      <p:sp>
+        <p:nvSpPr>
+          <p:cNvPr id="51" name="Oval 50">
+            <a:extLst>
+              <a:ext uri="{FF2B5EF4-FFF2-40B4-BE49-F238E27FC236}">
+                <a16:creationId xmlns:a16="http://schemas.microsoft.com/office/drawing/2014/main" id="{3A637CCC-AF42-0A40-ADD1-185109BBFD08}"/>
+              </a:ext>
+            </a:extLst>
+          </p:cNvPr>
+          <p:cNvSpPr/>
+          <p:nvPr/>
+        </p:nvSpPr>
+        <p:spPr>
+          <a:xfrm>
+            <a:off x="5814527" y="3585144"/>
+            <a:ext cx="487680" cy="473612"/>
+          </a:xfrm>
+          <a:prstGeom prst="ellipse">
+            <a:avLst/>
+          </a:prstGeom>
+          <a:solidFill>
+            <a:schemeClr val="tx1">
+              <a:lumMod val="85000"/>
+              <a:lumOff val="15000"/>
+            </a:schemeClr>
+          </a:solidFill>
+          <a:ln w="38100">
+            <a:solidFill>
+              <a:schemeClr val="accent4"/>
+            </a:solidFill>
+          </a:ln>
+        </p:spPr>
+        <p:style>
+          <a:lnRef idx="2">
+            <a:schemeClr val="accent1">
+              <a:shade val="50000"/>
+            </a:schemeClr>
+          </a:lnRef>
+          <a:fillRef idx="1">
+            <a:schemeClr val="accent1"/>
+          </a:fillRef>
+          <a:effectRef idx="0">
+            <a:schemeClr val="accent1"/>
+          </a:effectRef>
+          <a:fontRef idx="minor">
+            <a:schemeClr val="lt1"/>
+          </a:fontRef>
+        </p:style>
+        <p:txBody>
+          <a:bodyPr lIns="0" rIns="0" rtlCol="0" anchor="ctr"/>
+          <a:lstStyle/>
+          <a:p>
+            <a:pPr algn="ctr"/>
+            <a:r>
+              <a:rPr lang="en-GB" dirty="0">
+                <a:solidFill>
+                  <a:schemeClr val="accent4"/>
+                </a:solidFill>
+                <a:latin typeface="Consolas" panose="020B0609020204030204" pitchFamily="49" charset="0"/>
+                <a:cs typeface="Consolas" panose="020B0609020204030204" pitchFamily="49" charset="0"/>
+              </a:rPr>
+              <a:t>BS</a:t>
+            </a:r>
+          </a:p>
+        </p:txBody>
+      </p:sp>
+      <p:sp>
+        <p:nvSpPr>
+          <p:cNvPr id="52" name="Oval 51">
+            <a:extLst>
+              <a:ext uri="{FF2B5EF4-FFF2-40B4-BE49-F238E27FC236}">
+                <a16:creationId xmlns:a16="http://schemas.microsoft.com/office/drawing/2014/main" id="{5D708ADE-AD4A-1F4E-B530-11227E5463D8}"/>
+              </a:ext>
+            </a:extLst>
+          </p:cNvPr>
+          <p:cNvSpPr/>
+          <p:nvPr/>
+        </p:nvSpPr>
+        <p:spPr>
+          <a:xfrm>
+            <a:off x="6968258" y="3585144"/>
+            <a:ext cx="487680" cy="473612"/>
+          </a:xfrm>
+          <a:prstGeom prst="ellipse">
+            <a:avLst/>
+          </a:prstGeom>
+          <a:solidFill>
+            <a:schemeClr val="tx1">
+              <a:lumMod val="85000"/>
+              <a:lumOff val="15000"/>
+            </a:schemeClr>
+          </a:solidFill>
+          <a:ln w="38100">
+            <a:solidFill>
+              <a:schemeClr val="accent4"/>
+            </a:solidFill>
+          </a:ln>
+        </p:spPr>
+        <p:style>
+          <a:lnRef idx="2">
+            <a:schemeClr val="accent1">
+              <a:shade val="50000"/>
+            </a:schemeClr>
+          </a:lnRef>
+          <a:fillRef idx="1">
+            <a:schemeClr val="accent1"/>
+          </a:fillRef>
+          <a:effectRef idx="0">
+            <a:schemeClr val="accent1"/>
+          </a:effectRef>
+          <a:fontRef idx="minor">
+            <a:schemeClr val="lt1"/>
+          </a:fontRef>
+        </p:style>
+        <p:txBody>
+          <a:bodyPr lIns="0" rIns="0" rtlCol="0" anchor="ctr"/>
+          <a:lstStyle/>
+          <a:p>
+            <a:pPr algn="ctr"/>
+            <a:r>
+              <a:rPr lang="en-GB" dirty="0">
+                <a:solidFill>
+                  <a:schemeClr val="accent4"/>
+                </a:solidFill>
+                <a:latin typeface="Consolas" panose="020B0609020204030204" pitchFamily="49" charset="0"/>
+                <a:cs typeface="Consolas" panose="020B0609020204030204" pitchFamily="49" charset="0"/>
+              </a:rPr>
+              <a:t>BS</a:t>
+            </a:r>
+          </a:p>
+        </p:txBody>
+      </p:sp>
+      <p:sp>
+        <p:nvSpPr>
+          <p:cNvPr id="61" name="Oval 60">
+            <a:extLst>
+              <a:ext uri="{FF2B5EF4-FFF2-40B4-BE49-F238E27FC236}">
+                <a16:creationId xmlns:a16="http://schemas.microsoft.com/office/drawing/2014/main" id="{93E54BA6-F5DC-374A-868B-60403A92C176}"/>
+              </a:ext>
+            </a:extLst>
+          </p:cNvPr>
+          <p:cNvSpPr/>
+          <p:nvPr/>
+        </p:nvSpPr>
+        <p:spPr>
+          <a:xfrm>
+            <a:off x="6971585" y="4535441"/>
+            <a:ext cx="487680" cy="473612"/>
+          </a:xfrm>
+          <a:prstGeom prst="ellipse">
+            <a:avLst/>
+          </a:prstGeom>
+          <a:solidFill>
+            <a:schemeClr val="tx1">
+              <a:lumMod val="85000"/>
+              <a:lumOff val="15000"/>
+            </a:schemeClr>
+          </a:solidFill>
+          <a:ln w="38100">
+            <a:solidFill>
+              <a:schemeClr val="accent2"/>
+            </a:solidFill>
+          </a:ln>
+        </p:spPr>
+        <p:style>
+          <a:lnRef idx="2">
+            <a:schemeClr val="accent1">
+              <a:shade val="50000"/>
+            </a:schemeClr>
+          </a:lnRef>
+          <a:fillRef idx="1">
+            <a:schemeClr val="accent1"/>
+          </a:fillRef>
+          <a:effectRef idx="0">
+            <a:schemeClr val="accent1"/>
+          </a:effectRef>
+          <a:fontRef idx="minor">
+            <a:schemeClr val="lt1"/>
+          </a:fontRef>
+        </p:style>
+        <p:txBody>
+          <a:bodyPr lIns="0" rIns="0" rtlCol="0" anchor="ctr"/>
+          <a:lstStyle/>
+          <a:p>
+            <a:pPr algn="ctr"/>
+            <a:r>
+              <a:rPr lang="en-GB" dirty="0">
+                <a:solidFill>
+                  <a:schemeClr val="accent2"/>
+                </a:solidFill>
+                <a:latin typeface="Consolas" panose="020B0609020204030204" pitchFamily="49" charset="0"/>
+                <a:cs typeface="Consolas" panose="020B0609020204030204" pitchFamily="49" charset="0"/>
+              </a:rPr>
+              <a:t>PP</a:t>
+            </a:r>
+          </a:p>
+        </p:txBody>
+      </p:sp>
+      <p:sp>
+        <p:nvSpPr>
+          <p:cNvPr id="62" name="Oval 61">
+            <a:extLst>
+              <a:ext uri="{FF2B5EF4-FFF2-40B4-BE49-F238E27FC236}">
+                <a16:creationId xmlns:a16="http://schemas.microsoft.com/office/drawing/2014/main" id="{E054D60B-71CE-9D4A-A1B5-BEDF4C4810CC}"/>
+              </a:ext>
+            </a:extLst>
+          </p:cNvPr>
+          <p:cNvSpPr/>
+          <p:nvPr/>
+        </p:nvSpPr>
+        <p:spPr>
+          <a:xfrm>
+            <a:off x="5817670" y="4532369"/>
+            <a:ext cx="487680" cy="473612"/>
+          </a:xfrm>
+          <a:prstGeom prst="ellipse">
+            <a:avLst/>
+          </a:prstGeom>
+          <a:solidFill>
+            <a:schemeClr val="tx1">
+              <a:lumMod val="85000"/>
+              <a:lumOff val="15000"/>
+            </a:schemeClr>
+          </a:solidFill>
+          <a:ln w="38100">
+            <a:solidFill>
+              <a:schemeClr val="accent2"/>
+            </a:solidFill>
+          </a:ln>
+        </p:spPr>
+        <p:style>
+          <a:lnRef idx="2">
+            <a:schemeClr val="accent1">
+              <a:shade val="50000"/>
+            </a:schemeClr>
+          </a:lnRef>
+          <a:fillRef idx="1">
+            <a:schemeClr val="accent1"/>
+          </a:fillRef>
+          <a:effectRef idx="0">
+            <a:schemeClr val="accent1"/>
+          </a:effectRef>
+          <a:fontRef idx="minor">
+            <a:schemeClr val="lt1"/>
+          </a:fontRef>
+        </p:style>
+        <p:txBody>
+          <a:bodyPr lIns="0" rIns="0" rtlCol="0" anchor="ctr"/>
+          <a:lstStyle/>
+          <a:p>
+            <a:pPr algn="ctr"/>
+            <a:r>
+              <a:rPr lang="en-GB" dirty="0">
+                <a:solidFill>
+                  <a:schemeClr val="accent2"/>
+                </a:solidFill>
+                <a:latin typeface="Consolas" panose="020B0609020204030204" pitchFamily="49" charset="0"/>
+                <a:cs typeface="Consolas" panose="020B0609020204030204" pitchFamily="49" charset="0"/>
+              </a:rPr>
+              <a:t>PP</a:t>
+            </a:r>
+          </a:p>
+        </p:txBody>
+      </p:sp>
+      <p:sp>
+        <p:nvSpPr>
+          <p:cNvPr id="73" name="TextBox 72">
+            <a:extLst>
+              <a:ext uri="{FF2B5EF4-FFF2-40B4-BE49-F238E27FC236}">
+                <a16:creationId xmlns:a16="http://schemas.microsoft.com/office/drawing/2014/main" id="{6F3BAA91-FFCC-B042-8F86-A6625EA3941A}"/>
+              </a:ext>
+            </a:extLst>
+          </p:cNvPr>
+          <p:cNvSpPr txBox="1"/>
+          <p:nvPr/>
+        </p:nvSpPr>
+        <p:spPr>
+          <a:xfrm>
+            <a:off x="273807" y="3352668"/>
+            <a:ext cx="5079153" cy="1661993"/>
+          </a:xfrm>
+          <a:prstGeom prst="rect">
+            <a:avLst/>
+          </a:prstGeom>
+          <a:noFill/>
+        </p:spPr>
+        <p:txBody>
+          <a:bodyPr wrap="square" rtlCol="0">
+            <a:spAutoFit/>
+          </a:bodyPr>
+          <a:lstStyle/>
+          <a:p>
+            <a:r>
+              <a:rPr lang="en-GB" dirty="0">
+                <a:latin typeface="Roboto" panose="02000000000000000000" pitchFamily="2" charset="0"/>
+                <a:ea typeface="Roboto" panose="02000000000000000000" pitchFamily="2" charset="0"/>
+              </a:rPr>
+              <a:t>This is a fairly simple pattern. There is a state of the vessel when it is in the EEZ. That state has a begin and end (two bounding states). Finally, we put the state in a possible world as link it to the system that made the inference. </a:t>
+            </a:r>
+            <a:endParaRPr lang="en-GB" dirty="0"/>
+          </a:p>
+          <a:p>
+            <a:endParaRPr lang="en-GB" sz="1200" dirty="0"/>
+          </a:p>
+        </p:txBody>
+      </p:sp>
+    </p:spTree>
+    <p:extLst>
+      <p:ext uri="{BB962C8B-B14F-4D97-AF65-F5344CB8AC3E}">
+        <p14:creationId xmlns:p14="http://schemas.microsoft.com/office/powerpoint/2010/main" val="2970925086"/>
+      </p:ext>
+    </p:extLst>
+  </p:cSld>
+  <p:clrMapOvr>
+    <a:masterClrMapping/>
+  </p:clrMapOvr>
+</p:sld>
+</file>
+
+<file path=ppt/slides/slide23.xml><?xml version="1.0" encoding="utf-8"?>
+<p:sld xmlns:a="http://schemas.openxmlformats.org/drawingml/2006/main" xmlns:r="http://schemas.openxmlformats.org/officeDocument/2006/relationships" xmlns:p="http://schemas.openxmlformats.org/presentationml/2006/main">
+  <p:cSld>
+    <p:spTree>
+      <p:nvGrpSpPr>
+        <p:cNvPr id="1" name=""/>
+        <p:cNvGrpSpPr/>
+        <p:nvPr/>
+      </p:nvGrpSpPr>
+      <p:grpSpPr>
+        <a:xfrm>
+          <a:off x="0" y="0"/>
+          <a:ext cx="0" cy="0"/>
+          <a:chOff x="0" y="0"/>
+          <a:chExt cx="0" cy="0"/>
+        </a:xfrm>
+      </p:grpSpPr>
+      <p:pic>
+        <p:nvPicPr>
+          <p:cNvPr id="1026" name="Picture 2" descr="Vehicle Diagram">
+            <a:extLst>
+              <a:ext uri="{FF2B5EF4-FFF2-40B4-BE49-F238E27FC236}">
+                <a16:creationId xmlns:a16="http://schemas.microsoft.com/office/drawing/2014/main" id="{177E59A6-B07E-4347-AD97-85561825F71B}"/>
+              </a:ext>
+            </a:extLst>
+          </p:cNvPr>
+          <p:cNvPicPr>
+            <a:picLocks noChangeAspect="1" noChangeArrowheads="1"/>
+          </p:cNvPicPr>
+          <p:nvPr/>
+        </p:nvPicPr>
+        <p:blipFill rotWithShape="1">
+          <a:blip r:embed="rId2">
+            <a:extLst>
+              <a:ext uri="{28A0092B-C50C-407E-A947-70E740481C1C}">
+                <a14:useLocalDpi xmlns:a14="http://schemas.microsoft.com/office/drawing/2010/main" val="0"/>
+              </a:ext>
+            </a:extLst>
+          </a:blip>
+          <a:srcRect b="46816"/>
+          <a:stretch/>
+        </p:blipFill>
+        <p:spPr bwMode="auto">
+          <a:xfrm>
+            <a:off x="161047" y="802015"/>
+            <a:ext cx="4810125" cy="3647383"/>
+          </a:xfrm>
+          <a:prstGeom prst="rect">
+            <a:avLst/>
+          </a:prstGeom>
+          <a:noFill/>
+          <a:extLst>
+            <a:ext uri="{909E8E84-426E-40DD-AFC4-6F175D3DCCD1}">
+              <a14:hiddenFill xmlns:a14="http://schemas.microsoft.com/office/drawing/2010/main">
+                <a:solidFill>
+                  <a:srgbClr val="FFFFFF"/>
+                </a:solidFill>
+              </a14:hiddenFill>
+            </a:ext>
+          </a:extLst>
+        </p:spPr>
+      </p:pic>
+      <p:sp>
+        <p:nvSpPr>
+          <p:cNvPr id="19" name="Rectangle 18">
+            <a:extLst>
+              <a:ext uri="{FF2B5EF4-FFF2-40B4-BE49-F238E27FC236}">
+                <a16:creationId xmlns:a16="http://schemas.microsoft.com/office/drawing/2014/main" id="{58F91C2E-62A8-4D42-9082-FFA3EE67B6E7}"/>
+              </a:ext>
+            </a:extLst>
+          </p:cNvPr>
+          <p:cNvSpPr/>
+          <p:nvPr/>
+        </p:nvSpPr>
+        <p:spPr>
+          <a:xfrm>
+            <a:off x="2623514" y="2986156"/>
+            <a:ext cx="1603791" cy="901242"/>
+          </a:xfrm>
+          <a:prstGeom prst="rect">
+            <a:avLst/>
+          </a:prstGeom>
+          <a:solidFill>
+            <a:schemeClr val="bg1"/>
+          </a:solidFill>
+          <a:ln>
+            <a:noFill/>
+          </a:ln>
+        </p:spPr>
+        <p:style>
+          <a:lnRef idx="2">
+            <a:schemeClr val="accent1">
+              <a:shade val="50000"/>
+            </a:schemeClr>
+          </a:lnRef>
+          <a:fillRef idx="1">
+            <a:schemeClr val="accent1"/>
+          </a:fillRef>
+          <a:effectRef idx="0">
+            <a:schemeClr val="accent1"/>
+          </a:effectRef>
+          <a:fontRef idx="minor">
+            <a:schemeClr val="lt1"/>
+          </a:fontRef>
+        </p:style>
+        <p:txBody>
+          <a:bodyPr rtlCol="0" anchor="ctr"/>
+          <a:lstStyle/>
+          <a:p>
+            <a:pPr algn="ctr"/>
+            <a:endParaRPr lang="en-GB"/>
+          </a:p>
+        </p:txBody>
+      </p:sp>
+      <p:sp>
+        <p:nvSpPr>
+          <p:cNvPr id="2" name="TextBox 1">
+            <a:extLst>
+              <a:ext uri="{FF2B5EF4-FFF2-40B4-BE49-F238E27FC236}">
+                <a16:creationId xmlns:a16="http://schemas.microsoft.com/office/drawing/2014/main" id="{00E26050-3128-7043-AD8B-D2951C404EA3}"/>
+              </a:ext>
+            </a:extLst>
+          </p:cNvPr>
+          <p:cNvSpPr txBox="1"/>
+          <p:nvPr/>
+        </p:nvSpPr>
+        <p:spPr>
+          <a:xfrm>
+            <a:off x="263309" y="239371"/>
+            <a:ext cx="2876108" cy="461665"/>
+          </a:xfrm>
+          <a:prstGeom prst="rect">
+            <a:avLst/>
+          </a:prstGeom>
+          <a:noFill/>
+        </p:spPr>
+        <p:txBody>
+          <a:bodyPr wrap="none" rtlCol="0">
+            <a:spAutoFit/>
+          </a:bodyPr>
+          <a:lstStyle/>
+          <a:p>
+            <a:r>
+              <a:rPr lang="en-GB" sz="2400" dirty="0">
+                <a:solidFill>
+                  <a:srgbClr val="0070C0"/>
+                </a:solidFill>
+                <a:latin typeface="Roboto Thin" panose="02000000000000000000" pitchFamily="2" charset="0"/>
+                <a:ea typeface="Roboto Thin" panose="02000000000000000000" pitchFamily="2" charset="0"/>
+              </a:rPr>
+              <a:t>Flag of Convenience</a:t>
+            </a:r>
+          </a:p>
+        </p:txBody>
+      </p:sp>
+      <p:sp>
+        <p:nvSpPr>
+          <p:cNvPr id="27" name="Rectangle 26">
+            <a:extLst>
+              <a:ext uri="{FF2B5EF4-FFF2-40B4-BE49-F238E27FC236}">
+                <a16:creationId xmlns:a16="http://schemas.microsoft.com/office/drawing/2014/main" id="{58B36BC8-1D7A-7F4D-834F-B05C59E397F9}"/>
+              </a:ext>
+            </a:extLst>
+          </p:cNvPr>
+          <p:cNvSpPr/>
+          <p:nvPr/>
+        </p:nvSpPr>
+        <p:spPr>
+          <a:xfrm>
+            <a:off x="8812802" y="1646352"/>
+            <a:ext cx="3740019" cy="1123384"/>
+          </a:xfrm>
+          <a:prstGeom prst="rect">
+            <a:avLst/>
+          </a:prstGeom>
+        </p:spPr>
+        <p:txBody>
+          <a:bodyPr wrap="square">
+            <a:spAutoFit/>
+          </a:bodyPr>
+          <a:lstStyle/>
+          <a:p>
+            <a:r>
+              <a:rPr lang="en-GB" sz="1200" b="1" dirty="0">
+                <a:solidFill>
+                  <a:srgbClr val="000000"/>
+                </a:solidFill>
+                <a:latin typeface="Consolas" panose="020B0609020204030204" pitchFamily="49" charset="0"/>
+              </a:rPr>
+              <a:t>KEY:</a:t>
+            </a:r>
+            <a:endParaRPr lang="en-GB" sz="1100" dirty="0">
+              <a:solidFill>
+                <a:srgbClr val="000000"/>
+              </a:solidFill>
+              <a:latin typeface="Consolas" panose="020B0609020204030204" pitchFamily="49" charset="0"/>
+            </a:endParaRPr>
+          </a:p>
+          <a:p>
+            <a:r>
+              <a:rPr lang="en-GB" sz="1100" dirty="0">
+                <a:solidFill>
+                  <a:srgbClr val="000000"/>
+                </a:solidFill>
+                <a:latin typeface="Consolas" panose="020B0609020204030204" pitchFamily="49" charset="0"/>
+              </a:rPr>
+              <a:t>C	</a:t>
+            </a:r>
+            <a:r>
+              <a:rPr lang="en-GB" sz="1100" dirty="0" err="1">
+                <a:solidFill>
+                  <a:srgbClr val="000000"/>
+                </a:solidFill>
+                <a:latin typeface="Consolas" panose="020B0609020204030204" pitchFamily="49" charset="0"/>
+              </a:rPr>
+              <a:t>ies:Country</a:t>
+            </a:r>
+            <a:endParaRPr lang="en-GB" sz="1100" dirty="0">
+              <a:solidFill>
+                <a:srgbClr val="000000"/>
+              </a:solidFill>
+              <a:latin typeface="Consolas" panose="020B0609020204030204" pitchFamily="49" charset="0"/>
+            </a:endParaRPr>
+          </a:p>
+          <a:p>
+            <a:r>
+              <a:rPr lang="en-GB" sz="1100" dirty="0">
+                <a:solidFill>
+                  <a:srgbClr val="000000"/>
+                </a:solidFill>
+                <a:latin typeface="Consolas" panose="020B0609020204030204" pitchFamily="49" charset="0"/>
+              </a:rPr>
+              <a:t>PW	</a:t>
+            </a:r>
+            <a:r>
+              <a:rPr lang="en-GB" sz="1100" dirty="0" err="1">
+                <a:solidFill>
+                  <a:srgbClr val="000000"/>
+                </a:solidFill>
+                <a:latin typeface="Consolas" panose="020B0609020204030204" pitchFamily="49" charset="0"/>
+              </a:rPr>
+              <a:t>ies:PossibleWorld</a:t>
+            </a:r>
+            <a:endParaRPr lang="en-GB" sz="1100" dirty="0">
+              <a:solidFill>
+                <a:srgbClr val="000000"/>
+              </a:solidFill>
+              <a:latin typeface="Consolas" panose="020B0609020204030204" pitchFamily="49" charset="0"/>
+            </a:endParaRPr>
+          </a:p>
+          <a:p>
+            <a:r>
+              <a:rPr lang="en-GB" sz="1100" dirty="0">
+                <a:solidFill>
+                  <a:srgbClr val="000000"/>
+                </a:solidFill>
+                <a:latin typeface="Consolas" panose="020B0609020204030204" pitchFamily="49" charset="0"/>
+              </a:rPr>
+              <a:t>UFC	</a:t>
+            </a:r>
+            <a:r>
+              <a:rPr lang="en-GB" sz="1100" dirty="0" err="1">
+                <a:solidFill>
+                  <a:srgbClr val="000000"/>
+                </a:solidFill>
+                <a:latin typeface="Consolas" panose="020B0609020204030204" pitchFamily="49" charset="0"/>
+              </a:rPr>
+              <a:t>ies:UnderFlagOfConvenience</a:t>
+            </a:r>
+            <a:endParaRPr lang="en-GB" sz="1100" dirty="0">
+              <a:solidFill>
+                <a:srgbClr val="000000"/>
+              </a:solidFill>
+              <a:latin typeface="Consolas" panose="020B0609020204030204" pitchFamily="49" charset="0"/>
+            </a:endParaRPr>
+          </a:p>
+          <a:p>
+            <a:r>
+              <a:rPr lang="en-GB" sz="1100" dirty="0">
+                <a:solidFill>
+                  <a:srgbClr val="000000"/>
+                </a:solidFill>
+                <a:latin typeface="Consolas" panose="020B0609020204030204" pitchFamily="49" charset="0"/>
+              </a:rPr>
+              <a:t>V	</a:t>
+            </a:r>
+            <a:r>
+              <a:rPr lang="en-GB" sz="1100" dirty="0" err="1">
+                <a:solidFill>
+                  <a:srgbClr val="000000"/>
+                </a:solidFill>
+                <a:latin typeface="Consolas" panose="020B0609020204030204" pitchFamily="49" charset="0"/>
+              </a:rPr>
+              <a:t>ies:Vessel</a:t>
+            </a:r>
+            <a:endParaRPr lang="en-GB" sz="1100" dirty="0">
+              <a:solidFill>
+                <a:srgbClr val="000000"/>
+              </a:solidFill>
+              <a:latin typeface="Consolas" panose="020B0609020204030204" pitchFamily="49" charset="0"/>
+            </a:endParaRPr>
+          </a:p>
+          <a:p>
+            <a:r>
+              <a:rPr lang="en-GB" sz="1100" dirty="0">
+                <a:solidFill>
+                  <a:srgbClr val="000000"/>
+                </a:solidFill>
+                <a:latin typeface="Consolas" panose="020B0609020204030204" pitchFamily="49" charset="0"/>
+              </a:rPr>
+              <a:t>VS	</a:t>
+            </a:r>
+            <a:r>
+              <a:rPr lang="en-GB" sz="1100" dirty="0" err="1">
+                <a:solidFill>
+                  <a:srgbClr val="000000"/>
+                </a:solidFill>
+                <a:latin typeface="Consolas" panose="020B0609020204030204" pitchFamily="49" charset="0"/>
+              </a:rPr>
+              <a:t>ies:VesselState</a:t>
+            </a:r>
+            <a:endParaRPr lang="en-GB" sz="1100" dirty="0">
+              <a:solidFill>
+                <a:srgbClr val="000000"/>
+              </a:solidFill>
+              <a:latin typeface="Consolas" panose="020B0609020204030204" pitchFamily="49" charset="0"/>
+            </a:endParaRPr>
+          </a:p>
+        </p:txBody>
+      </p:sp>
+      <p:sp>
+        <p:nvSpPr>
+          <p:cNvPr id="28" name="Rectangle 27">
+            <a:extLst>
+              <a:ext uri="{FF2B5EF4-FFF2-40B4-BE49-F238E27FC236}">
+                <a16:creationId xmlns:a16="http://schemas.microsoft.com/office/drawing/2014/main" id="{DD275DC3-F43F-5D42-9323-F5513C5AA683}"/>
+              </a:ext>
+            </a:extLst>
+          </p:cNvPr>
+          <p:cNvSpPr/>
+          <p:nvPr/>
+        </p:nvSpPr>
+        <p:spPr>
+          <a:xfrm>
+            <a:off x="224466" y="5251466"/>
+            <a:ext cx="6096000" cy="954107"/>
+          </a:xfrm>
+          <a:prstGeom prst="rect">
+            <a:avLst/>
+          </a:prstGeom>
+        </p:spPr>
+        <p:txBody>
+          <a:bodyPr>
+            <a:spAutoFit/>
+          </a:bodyPr>
+          <a:lstStyle/>
+          <a:p>
+            <a:r>
+              <a:rPr lang="en-GB" sz="1200" b="1" dirty="0">
+                <a:solidFill>
+                  <a:srgbClr val="0070C0"/>
+                </a:solidFill>
+                <a:latin typeface="Consolas" panose="020B0609020204030204" pitchFamily="49" charset="0"/>
+              </a:rPr>
+              <a:t>Namespaces:</a:t>
+            </a:r>
+          </a:p>
+          <a:p>
+            <a:r>
+              <a:rPr lang="en-GB" sz="1100" dirty="0">
+                <a:solidFill>
+                  <a:srgbClr val="0070C0"/>
+                </a:solidFill>
+                <a:latin typeface="Consolas" panose="020B0609020204030204" pitchFamily="49" charset="0"/>
+              </a:rPr>
+              <a:t>@prefix </a:t>
+            </a:r>
+            <a:r>
+              <a:rPr lang="en-GB" sz="1100" dirty="0" err="1">
+                <a:solidFill>
+                  <a:srgbClr val="0070C0"/>
+                </a:solidFill>
+                <a:latin typeface="Consolas" panose="020B0609020204030204" pitchFamily="49" charset="0"/>
+              </a:rPr>
+              <a:t>rdf</a:t>
+            </a:r>
+            <a:r>
+              <a:rPr lang="en-GB" sz="1100" dirty="0">
+                <a:solidFill>
+                  <a:srgbClr val="0070C0"/>
+                </a:solidFill>
+                <a:latin typeface="Consolas" panose="020B0609020204030204" pitchFamily="49" charset="0"/>
+              </a:rPr>
+              <a:t>: &lt;http://www.w3.org/1999/02/22-rdf-syntax-ns#&gt; .</a:t>
+            </a:r>
+          </a:p>
+          <a:p>
+            <a:r>
+              <a:rPr lang="en-GB" sz="1100" dirty="0">
+                <a:solidFill>
+                  <a:srgbClr val="0070C0"/>
+                </a:solidFill>
+                <a:latin typeface="Consolas" panose="020B0609020204030204" pitchFamily="49" charset="0"/>
+              </a:rPr>
+              <a:t>@prefix </a:t>
+            </a:r>
+            <a:r>
+              <a:rPr lang="en-GB" sz="1100" dirty="0" err="1">
+                <a:solidFill>
+                  <a:srgbClr val="0070C0"/>
+                </a:solidFill>
+                <a:latin typeface="Consolas" panose="020B0609020204030204" pitchFamily="49" charset="0"/>
+              </a:rPr>
+              <a:t>rdfs</a:t>
+            </a:r>
+            <a:r>
+              <a:rPr lang="en-GB" sz="1100" dirty="0">
+                <a:solidFill>
+                  <a:srgbClr val="0070C0"/>
+                </a:solidFill>
+                <a:latin typeface="Consolas" panose="020B0609020204030204" pitchFamily="49" charset="0"/>
+              </a:rPr>
+              <a:t>: &lt;http://www.w3.org/2000/01/rdf-schema#&gt; . </a:t>
+            </a:r>
+          </a:p>
+          <a:p>
+            <a:r>
+              <a:rPr lang="en-GB" sz="1100" dirty="0">
+                <a:solidFill>
+                  <a:srgbClr val="0070C0"/>
+                </a:solidFill>
+                <a:latin typeface="Consolas" panose="020B0609020204030204" pitchFamily="49" charset="0"/>
+              </a:rPr>
+              <a:t>@prefix </a:t>
+            </a:r>
+            <a:r>
+              <a:rPr lang="en-GB" sz="1100" dirty="0" err="1">
+                <a:solidFill>
+                  <a:srgbClr val="0070C0"/>
+                </a:solidFill>
+                <a:latin typeface="Consolas" panose="020B0609020204030204" pitchFamily="49" charset="0"/>
+              </a:rPr>
+              <a:t>ies</a:t>
+            </a:r>
+            <a:r>
+              <a:rPr lang="en-GB" sz="1100" dirty="0">
+                <a:solidFill>
+                  <a:srgbClr val="0070C0"/>
+                </a:solidFill>
+                <a:latin typeface="Consolas" panose="020B0609020204030204" pitchFamily="49" charset="0"/>
+              </a:rPr>
+              <a:t>: &lt;http://ies.data.gov.uk/ies4#&gt; . </a:t>
+            </a:r>
+          </a:p>
+          <a:p>
+            <a:r>
+              <a:rPr lang="en-GB" sz="1100" dirty="0">
+                <a:solidFill>
+                  <a:srgbClr val="0070C0"/>
+                </a:solidFill>
+                <a:latin typeface="Consolas" panose="020B0609020204030204" pitchFamily="49" charset="0"/>
+              </a:rPr>
+              <a:t>@prefix data: &lt;http://data.gov.uk/testdata#&gt; .</a:t>
+            </a:r>
+            <a:endParaRPr lang="en-GB" sz="1100" dirty="0"/>
+          </a:p>
+        </p:txBody>
+      </p:sp>
+      <p:sp>
+        <p:nvSpPr>
+          <p:cNvPr id="73" name="TextBox 72">
+            <a:extLst>
+              <a:ext uri="{FF2B5EF4-FFF2-40B4-BE49-F238E27FC236}">
+                <a16:creationId xmlns:a16="http://schemas.microsoft.com/office/drawing/2014/main" id="{6F3BAA91-FFCC-B042-8F86-A6625EA3941A}"/>
+              </a:ext>
+            </a:extLst>
+          </p:cNvPr>
+          <p:cNvSpPr txBox="1"/>
+          <p:nvPr/>
+        </p:nvSpPr>
+        <p:spPr>
+          <a:xfrm>
+            <a:off x="5223827" y="239371"/>
+            <a:ext cx="6888142" cy="1384995"/>
+          </a:xfrm>
+          <a:prstGeom prst="rect">
+            <a:avLst/>
+          </a:prstGeom>
+          <a:noFill/>
+        </p:spPr>
+        <p:txBody>
+          <a:bodyPr wrap="square" rtlCol="0">
+            <a:spAutoFit/>
+          </a:bodyPr>
+          <a:lstStyle/>
+          <a:p>
+            <a:r>
+              <a:rPr lang="en-GB" dirty="0">
+                <a:latin typeface="Roboto" panose="02000000000000000000" pitchFamily="2" charset="0"/>
+                <a:ea typeface="Roboto" panose="02000000000000000000" pitchFamily="2" charset="0"/>
+              </a:rPr>
+              <a:t>As the IES model currently stands, </a:t>
+            </a:r>
+            <a:r>
+              <a:rPr lang="en-GB" dirty="0" err="1">
+                <a:latin typeface="Roboto" panose="02000000000000000000" pitchFamily="2" charset="0"/>
+                <a:ea typeface="Roboto" panose="02000000000000000000" pitchFamily="2" charset="0"/>
+              </a:rPr>
+              <a:t>countryOfRegistration</a:t>
+            </a:r>
+            <a:r>
+              <a:rPr lang="en-GB" dirty="0">
+                <a:latin typeface="Roboto" panose="02000000000000000000" pitchFamily="2" charset="0"/>
+                <a:ea typeface="Roboto" panose="02000000000000000000" pitchFamily="2" charset="0"/>
+              </a:rPr>
+              <a:t> links a Vehicle to a Country. This seems to be a mistake – it should link a </a:t>
+            </a:r>
+            <a:r>
+              <a:rPr lang="en-GB" dirty="0" err="1">
+                <a:latin typeface="Roboto" panose="02000000000000000000" pitchFamily="2" charset="0"/>
+                <a:ea typeface="Roboto" panose="02000000000000000000" pitchFamily="2" charset="0"/>
+              </a:rPr>
+              <a:t>VehicleState</a:t>
+            </a:r>
+            <a:r>
+              <a:rPr lang="en-GB" dirty="0">
+                <a:latin typeface="Roboto" panose="02000000000000000000" pitchFamily="2" charset="0"/>
+                <a:ea typeface="Roboto" panose="02000000000000000000" pitchFamily="2" charset="0"/>
+              </a:rPr>
+              <a:t> to a Country. It is then a simple case of modelling the registration of the vessel. </a:t>
+            </a:r>
+            <a:endParaRPr lang="en-GB" dirty="0"/>
+          </a:p>
+          <a:p>
+            <a:endParaRPr lang="en-GB" sz="1200" dirty="0"/>
+          </a:p>
+        </p:txBody>
+      </p:sp>
+      <p:cxnSp>
+        <p:nvCxnSpPr>
+          <p:cNvPr id="54" name="Straight Arrow Connector 53">
+            <a:extLst>
+              <a:ext uri="{FF2B5EF4-FFF2-40B4-BE49-F238E27FC236}">
+                <a16:creationId xmlns:a16="http://schemas.microsoft.com/office/drawing/2014/main" id="{51AC9153-59AB-5B4C-88B9-D8DE2773C80A}"/>
+              </a:ext>
+            </a:extLst>
+          </p:cNvPr>
+          <p:cNvCxnSpPr>
+            <a:cxnSpLocks/>
+            <a:stCxn id="57" idx="2"/>
+            <a:endCxn id="58" idx="6"/>
+          </p:cNvCxnSpPr>
+          <p:nvPr/>
+        </p:nvCxnSpPr>
+        <p:spPr>
+          <a:xfrm flipH="1">
+            <a:off x="5665775" y="2043596"/>
+            <a:ext cx="1086523" cy="0"/>
+          </a:xfrm>
+          <a:prstGeom prst="straightConnector1">
+            <a:avLst/>
+          </a:prstGeom>
+          <a:ln w="22225">
+            <a:solidFill>
+              <a:schemeClr val="tx1"/>
+            </a:solidFill>
+            <a:tailEnd type="arrow"/>
+          </a:ln>
+        </p:spPr>
+        <p:style>
+          <a:lnRef idx="1">
+            <a:schemeClr val="accent1"/>
+          </a:lnRef>
+          <a:fillRef idx="0">
+            <a:schemeClr val="accent1"/>
+          </a:fillRef>
+          <a:effectRef idx="0">
+            <a:schemeClr val="accent1"/>
+          </a:effectRef>
+          <a:fontRef idx="minor">
+            <a:schemeClr val="tx1"/>
+          </a:fontRef>
+        </p:style>
+      </p:cxnSp>
+      <p:sp>
+        <p:nvSpPr>
+          <p:cNvPr id="55" name="TextBox 54">
+            <a:extLst>
+              <a:ext uri="{FF2B5EF4-FFF2-40B4-BE49-F238E27FC236}">
+                <a16:creationId xmlns:a16="http://schemas.microsoft.com/office/drawing/2014/main" id="{FD0F26E5-67C3-3442-8665-46739D30B377}"/>
+              </a:ext>
+            </a:extLst>
+          </p:cNvPr>
+          <p:cNvSpPr txBox="1"/>
+          <p:nvPr/>
+        </p:nvSpPr>
+        <p:spPr>
+          <a:xfrm>
+            <a:off x="5830857" y="1856411"/>
+            <a:ext cx="914033" cy="215444"/>
+          </a:xfrm>
+          <a:prstGeom prst="rect">
+            <a:avLst/>
+          </a:prstGeom>
+          <a:noFill/>
+        </p:spPr>
+        <p:txBody>
+          <a:bodyPr wrap="none" rtlCol="0">
+            <a:spAutoFit/>
+          </a:bodyPr>
+          <a:lstStyle/>
+          <a:p>
+            <a:r>
+              <a:rPr lang="en-GB" sz="800" dirty="0" err="1">
+                <a:latin typeface="Consolas" panose="020B0609020204030204" pitchFamily="49" charset="0"/>
+                <a:cs typeface="Consolas" panose="020B0609020204030204" pitchFamily="49" charset="0"/>
+              </a:rPr>
+              <a:t>ies:isStateOf</a:t>
+            </a:r>
+            <a:endParaRPr lang="en-GB" sz="800" dirty="0">
+              <a:latin typeface="Consolas" panose="020B0609020204030204" pitchFamily="49" charset="0"/>
+              <a:cs typeface="Consolas" panose="020B0609020204030204" pitchFamily="49" charset="0"/>
+            </a:endParaRPr>
+          </a:p>
+        </p:txBody>
+      </p:sp>
+      <p:sp>
+        <p:nvSpPr>
+          <p:cNvPr id="57" name="Oval 56">
+            <a:extLst>
+              <a:ext uri="{FF2B5EF4-FFF2-40B4-BE49-F238E27FC236}">
+                <a16:creationId xmlns:a16="http://schemas.microsoft.com/office/drawing/2014/main" id="{397116DF-5B3F-814C-B65A-6FD20F702FBD}"/>
+              </a:ext>
+            </a:extLst>
+          </p:cNvPr>
+          <p:cNvSpPr/>
+          <p:nvPr/>
+        </p:nvSpPr>
+        <p:spPr>
+          <a:xfrm>
+            <a:off x="6752298" y="1806790"/>
+            <a:ext cx="487680" cy="473612"/>
+          </a:xfrm>
+          <a:prstGeom prst="ellipse">
+            <a:avLst/>
+          </a:prstGeom>
+          <a:solidFill>
+            <a:schemeClr val="tx1">
+              <a:lumMod val="85000"/>
+              <a:lumOff val="15000"/>
+            </a:schemeClr>
+          </a:solidFill>
+          <a:ln w="38100">
+            <a:solidFill>
+              <a:schemeClr val="accent4"/>
+            </a:solidFill>
+          </a:ln>
+        </p:spPr>
+        <p:style>
+          <a:lnRef idx="2">
+            <a:schemeClr val="accent1">
+              <a:shade val="50000"/>
+            </a:schemeClr>
+          </a:lnRef>
+          <a:fillRef idx="1">
+            <a:schemeClr val="accent1"/>
+          </a:fillRef>
+          <a:effectRef idx="0">
+            <a:schemeClr val="accent1"/>
+          </a:effectRef>
+          <a:fontRef idx="minor">
+            <a:schemeClr val="lt1"/>
+          </a:fontRef>
+        </p:style>
+        <p:txBody>
+          <a:bodyPr lIns="0" rIns="0" rtlCol="0" anchor="ctr"/>
+          <a:lstStyle/>
+          <a:p>
+            <a:pPr algn="ctr"/>
+            <a:r>
+              <a:rPr lang="en-GB" sz="1600" dirty="0">
+                <a:solidFill>
+                  <a:schemeClr val="accent4"/>
+                </a:solidFill>
+                <a:latin typeface="Consolas" panose="020B0609020204030204" pitchFamily="49" charset="0"/>
+                <a:cs typeface="Consolas" panose="020B0609020204030204" pitchFamily="49" charset="0"/>
+              </a:rPr>
+              <a:t>UFC</a:t>
+            </a:r>
+          </a:p>
+        </p:txBody>
+      </p:sp>
+      <p:sp>
+        <p:nvSpPr>
+          <p:cNvPr id="58" name="Oval 57">
+            <a:extLst>
+              <a:ext uri="{FF2B5EF4-FFF2-40B4-BE49-F238E27FC236}">
+                <a16:creationId xmlns:a16="http://schemas.microsoft.com/office/drawing/2014/main" id="{DEFF3C59-4C64-CF45-B8DC-0DFF841BBA8A}"/>
+              </a:ext>
+            </a:extLst>
+          </p:cNvPr>
+          <p:cNvSpPr/>
+          <p:nvPr/>
+        </p:nvSpPr>
+        <p:spPr>
+          <a:xfrm>
+            <a:off x="5178095" y="1806790"/>
+            <a:ext cx="487680" cy="473612"/>
+          </a:xfrm>
+          <a:prstGeom prst="ellipse">
+            <a:avLst/>
+          </a:prstGeom>
+          <a:solidFill>
+            <a:schemeClr val="tx1">
+              <a:lumMod val="85000"/>
+              <a:lumOff val="15000"/>
+            </a:schemeClr>
+          </a:solidFill>
+          <a:ln w="38100">
+            <a:solidFill>
+              <a:srgbClr val="ECEC00"/>
+            </a:solidFill>
+          </a:ln>
+        </p:spPr>
+        <p:style>
+          <a:lnRef idx="2">
+            <a:schemeClr val="accent1">
+              <a:shade val="50000"/>
+            </a:schemeClr>
+          </a:lnRef>
+          <a:fillRef idx="1">
+            <a:schemeClr val="accent1"/>
+          </a:fillRef>
+          <a:effectRef idx="0">
+            <a:schemeClr val="accent1"/>
+          </a:effectRef>
+          <a:fontRef idx="minor">
+            <a:schemeClr val="lt1"/>
+          </a:fontRef>
+        </p:style>
+        <p:txBody>
+          <a:bodyPr lIns="0" rIns="0" rtlCol="0" anchor="ctr"/>
+          <a:lstStyle/>
+          <a:p>
+            <a:pPr algn="ctr"/>
+            <a:r>
+              <a:rPr lang="en-GB" dirty="0">
+                <a:solidFill>
+                  <a:srgbClr val="ECEC00"/>
+                </a:solidFill>
+                <a:latin typeface="Consolas" panose="020B0609020204030204" pitchFamily="49" charset="0"/>
+                <a:cs typeface="Consolas" panose="020B0609020204030204" pitchFamily="49" charset="0"/>
+              </a:rPr>
+              <a:t>V</a:t>
+            </a:r>
+          </a:p>
+        </p:txBody>
+      </p:sp>
+      <p:sp>
+        <p:nvSpPr>
+          <p:cNvPr id="64" name="Oval 63">
+            <a:extLst>
+              <a:ext uri="{FF2B5EF4-FFF2-40B4-BE49-F238E27FC236}">
+                <a16:creationId xmlns:a16="http://schemas.microsoft.com/office/drawing/2014/main" id="{FA5F287C-ADD6-C943-98FE-6749089F215D}"/>
+              </a:ext>
+            </a:extLst>
+          </p:cNvPr>
+          <p:cNvSpPr/>
+          <p:nvPr/>
+        </p:nvSpPr>
+        <p:spPr>
+          <a:xfrm>
+            <a:off x="6750919" y="2900844"/>
+            <a:ext cx="487680" cy="473612"/>
+          </a:xfrm>
+          <a:prstGeom prst="ellipse">
+            <a:avLst/>
+          </a:prstGeom>
+          <a:solidFill>
+            <a:schemeClr val="tx1">
+              <a:lumMod val="85000"/>
+              <a:lumOff val="15000"/>
+            </a:schemeClr>
+          </a:solidFill>
+          <a:ln w="38100">
+            <a:solidFill>
+              <a:srgbClr val="ECEC00"/>
+            </a:solidFill>
+          </a:ln>
+        </p:spPr>
+        <p:style>
+          <a:lnRef idx="2">
+            <a:schemeClr val="accent1">
+              <a:shade val="50000"/>
+            </a:schemeClr>
+          </a:lnRef>
+          <a:fillRef idx="1">
+            <a:schemeClr val="accent1"/>
+          </a:fillRef>
+          <a:effectRef idx="0">
+            <a:schemeClr val="accent1"/>
+          </a:effectRef>
+          <a:fontRef idx="minor">
+            <a:schemeClr val="lt1"/>
+          </a:fontRef>
+        </p:style>
+        <p:txBody>
+          <a:bodyPr lIns="0" rIns="0" rtlCol="0" anchor="ctr"/>
+          <a:lstStyle/>
+          <a:p>
+            <a:pPr algn="ctr"/>
+            <a:r>
+              <a:rPr lang="en-GB" dirty="0">
+                <a:solidFill>
+                  <a:srgbClr val="ECEC00"/>
+                </a:solidFill>
+                <a:latin typeface="Consolas" panose="020B0609020204030204" pitchFamily="49" charset="0"/>
+                <a:cs typeface="Consolas" panose="020B0609020204030204" pitchFamily="49" charset="0"/>
+              </a:rPr>
+              <a:t>C</a:t>
+            </a:r>
+          </a:p>
+        </p:txBody>
+      </p:sp>
+      <p:cxnSp>
+        <p:nvCxnSpPr>
+          <p:cNvPr id="65" name="Straight Arrow Connector 64">
+            <a:extLst>
+              <a:ext uri="{FF2B5EF4-FFF2-40B4-BE49-F238E27FC236}">
+                <a16:creationId xmlns:a16="http://schemas.microsoft.com/office/drawing/2014/main" id="{249697E2-6873-B24C-8AA7-38F72EF43EE2}"/>
+              </a:ext>
+            </a:extLst>
+          </p:cNvPr>
+          <p:cNvCxnSpPr>
+            <a:cxnSpLocks/>
+            <a:stCxn id="57" idx="4"/>
+            <a:endCxn id="64" idx="0"/>
+          </p:cNvCxnSpPr>
+          <p:nvPr/>
+        </p:nvCxnSpPr>
+        <p:spPr>
+          <a:xfrm flipH="1">
+            <a:off x="6994759" y="2280402"/>
+            <a:ext cx="1379" cy="620442"/>
+          </a:xfrm>
+          <a:prstGeom prst="straightConnector1">
+            <a:avLst/>
+          </a:prstGeom>
+          <a:ln w="22225">
+            <a:solidFill>
+              <a:schemeClr val="tx1"/>
+            </a:solidFill>
+            <a:tailEnd type="arrow"/>
+          </a:ln>
+        </p:spPr>
+        <p:style>
+          <a:lnRef idx="1">
+            <a:schemeClr val="accent1"/>
+          </a:lnRef>
+          <a:fillRef idx="0">
+            <a:schemeClr val="accent1"/>
+          </a:fillRef>
+          <a:effectRef idx="0">
+            <a:schemeClr val="accent1"/>
+          </a:effectRef>
+          <a:fontRef idx="minor">
+            <a:schemeClr val="tx1"/>
+          </a:fontRef>
+        </p:style>
+      </p:cxnSp>
+      <p:sp>
+        <p:nvSpPr>
+          <p:cNvPr id="67" name="TextBox 66">
+            <a:extLst>
+              <a:ext uri="{FF2B5EF4-FFF2-40B4-BE49-F238E27FC236}">
+                <a16:creationId xmlns:a16="http://schemas.microsoft.com/office/drawing/2014/main" id="{C361BEBF-FF3D-AF4F-AF82-834B4942485D}"/>
+              </a:ext>
+            </a:extLst>
+          </p:cNvPr>
+          <p:cNvSpPr txBox="1"/>
+          <p:nvPr/>
+        </p:nvSpPr>
+        <p:spPr>
+          <a:xfrm>
+            <a:off x="5421935" y="2566414"/>
+            <a:ext cx="1587294" cy="215444"/>
+          </a:xfrm>
+          <a:prstGeom prst="rect">
+            <a:avLst/>
+          </a:prstGeom>
+          <a:noFill/>
+        </p:spPr>
+        <p:txBody>
+          <a:bodyPr wrap="none" rtlCol="0">
+            <a:spAutoFit/>
+          </a:bodyPr>
+          <a:lstStyle/>
+          <a:p>
+            <a:r>
+              <a:rPr lang="en-GB" sz="800" dirty="0" err="1">
+                <a:latin typeface="Consolas" panose="020B0609020204030204" pitchFamily="49" charset="0"/>
+                <a:cs typeface="Consolas" panose="020B0609020204030204" pitchFamily="49" charset="0"/>
+              </a:rPr>
+              <a:t>ies:countryOfRegistration</a:t>
+            </a:r>
+            <a:endParaRPr lang="en-GB" sz="800" dirty="0">
+              <a:latin typeface="Consolas" panose="020B0609020204030204" pitchFamily="49" charset="0"/>
+              <a:cs typeface="Consolas" panose="020B0609020204030204" pitchFamily="49" charset="0"/>
+            </a:endParaRPr>
+          </a:p>
+        </p:txBody>
+      </p:sp>
+      <p:sp>
+        <p:nvSpPr>
+          <p:cNvPr id="68" name="TextBox 67">
+            <a:extLst>
+              <a:ext uri="{FF2B5EF4-FFF2-40B4-BE49-F238E27FC236}">
+                <a16:creationId xmlns:a16="http://schemas.microsoft.com/office/drawing/2014/main" id="{FAC9B376-C6F4-8C49-A133-35371D9ECA8B}"/>
+              </a:ext>
+            </a:extLst>
+          </p:cNvPr>
+          <p:cNvSpPr txBox="1"/>
+          <p:nvPr/>
+        </p:nvSpPr>
+        <p:spPr>
+          <a:xfrm>
+            <a:off x="4841203" y="3425772"/>
+            <a:ext cx="6888142" cy="3046988"/>
+          </a:xfrm>
+          <a:prstGeom prst="rect">
+            <a:avLst/>
+          </a:prstGeom>
+          <a:noFill/>
+        </p:spPr>
+        <p:txBody>
+          <a:bodyPr wrap="square" rtlCol="0">
+            <a:spAutoFit/>
+          </a:bodyPr>
+          <a:lstStyle/>
+          <a:p>
+            <a:r>
+              <a:rPr lang="en-GB" dirty="0">
+                <a:latin typeface="Roboto" panose="02000000000000000000" pitchFamily="2" charset="0"/>
+                <a:ea typeface="Roboto" panose="02000000000000000000" pitchFamily="2" charset="0"/>
+              </a:rPr>
+              <a:t>The flag of convenience aspect raises a question though – is this a blanket classification – e.g. all Panamanian registered ships are under a FoC ?  These seems prone to problems as a tug operating only the Panama canal would be registered in Panama for reasons other than convenience. Hence we need a special type of state (</a:t>
+            </a:r>
+            <a:r>
+              <a:rPr lang="en-GB" dirty="0" err="1">
+                <a:latin typeface="Roboto" panose="02000000000000000000" pitchFamily="2" charset="0"/>
+                <a:ea typeface="Roboto" panose="02000000000000000000" pitchFamily="2" charset="0"/>
+              </a:rPr>
+              <a:t>UnderFlagOfConvenience</a:t>
+            </a:r>
+            <a:r>
+              <a:rPr lang="en-GB" dirty="0">
+                <a:latin typeface="Roboto" panose="02000000000000000000" pitchFamily="2" charset="0"/>
+                <a:ea typeface="Roboto" panose="02000000000000000000" pitchFamily="2" charset="0"/>
+              </a:rPr>
+              <a:t>) and a link to a possible world, as someone has assessed this to be true.</a:t>
+            </a:r>
+          </a:p>
+          <a:p>
+            <a:endParaRPr lang="en-GB" dirty="0">
+              <a:latin typeface="Roboto" panose="02000000000000000000" pitchFamily="2" charset="0"/>
+              <a:ea typeface="Roboto" panose="02000000000000000000" pitchFamily="2" charset="0"/>
+            </a:endParaRPr>
+          </a:p>
+          <a:p>
+            <a:r>
+              <a:rPr lang="en-GB" i="1" dirty="0">
+                <a:latin typeface="Roboto" panose="02000000000000000000" pitchFamily="2" charset="0"/>
+                <a:ea typeface="Roboto" panose="02000000000000000000" pitchFamily="2" charset="0"/>
+              </a:rPr>
+              <a:t>I’ve left off the details of begin / end states, and about the assessment, but it’s the same pattern as in previous examples. </a:t>
+            </a:r>
+            <a:endParaRPr lang="en-GB" i="1" dirty="0"/>
+          </a:p>
+          <a:p>
+            <a:endParaRPr lang="en-GB" sz="1200" dirty="0"/>
+          </a:p>
+        </p:txBody>
+      </p:sp>
+      <p:sp>
+        <p:nvSpPr>
+          <p:cNvPr id="74" name="Rounded Rectangle 73">
+            <a:extLst>
+              <a:ext uri="{FF2B5EF4-FFF2-40B4-BE49-F238E27FC236}">
+                <a16:creationId xmlns:a16="http://schemas.microsoft.com/office/drawing/2014/main" id="{D16BD094-10C1-4D44-B85A-4C1CBBFFFED5}"/>
+              </a:ext>
+            </a:extLst>
+          </p:cNvPr>
+          <p:cNvSpPr/>
+          <p:nvPr/>
+        </p:nvSpPr>
+        <p:spPr>
+          <a:xfrm>
+            <a:off x="2886823" y="3862220"/>
+            <a:ext cx="1077171" cy="252313"/>
+          </a:xfrm>
+          <a:prstGeom prst="roundRect">
+            <a:avLst>
+              <a:gd name="adj" fmla="val 3508"/>
+            </a:avLst>
+          </a:prstGeom>
+          <a:solidFill>
+            <a:schemeClr val="accent4"/>
+          </a:solidFill>
+          <a:ln>
+            <a:solidFill>
+              <a:schemeClr val="tx1">
+                <a:lumMod val="85000"/>
+                <a:lumOff val="15000"/>
+              </a:schemeClr>
+            </a:solidFill>
+          </a:ln>
+        </p:spPr>
+        <p:style>
+          <a:lnRef idx="2">
+            <a:schemeClr val="accent1">
+              <a:shade val="50000"/>
+            </a:schemeClr>
+          </a:lnRef>
+          <a:fillRef idx="1">
+            <a:schemeClr val="accent1"/>
+          </a:fillRef>
+          <a:effectRef idx="0">
+            <a:schemeClr val="accent1"/>
+          </a:effectRef>
+          <a:fontRef idx="minor">
+            <a:schemeClr val="lt1"/>
+          </a:fontRef>
+        </p:style>
+        <p:txBody>
+          <a:bodyPr lIns="0" rIns="0" rtlCol="0" anchor="ctr"/>
+          <a:lstStyle/>
+          <a:p>
+            <a:pPr algn="ctr"/>
+            <a:r>
+              <a:rPr lang="en-GB" sz="500" dirty="0">
+                <a:solidFill>
+                  <a:schemeClr val="tx1">
+                    <a:lumMod val="85000"/>
+                    <a:lumOff val="15000"/>
+                  </a:schemeClr>
+                </a:solidFill>
+                <a:latin typeface="Consolas" panose="020B0609020204030204" pitchFamily="49" charset="0"/>
+                <a:cs typeface="Consolas" panose="020B0609020204030204" pitchFamily="49" charset="0"/>
+              </a:rPr>
+              <a:t>&lt;&lt;</a:t>
+            </a:r>
+            <a:r>
+              <a:rPr lang="en-GB" sz="500" dirty="0" err="1">
+                <a:solidFill>
+                  <a:schemeClr val="tx1">
+                    <a:lumMod val="85000"/>
+                    <a:lumOff val="15000"/>
+                  </a:schemeClr>
+                </a:solidFill>
+                <a:latin typeface="Consolas" panose="020B0609020204030204" pitchFamily="49" charset="0"/>
+                <a:cs typeface="Consolas" panose="020B0609020204030204" pitchFamily="49" charset="0"/>
+              </a:rPr>
+              <a:t>rdfsClass</a:t>
+            </a:r>
+            <a:r>
+              <a:rPr lang="en-GB" sz="500" dirty="0">
+                <a:solidFill>
+                  <a:schemeClr val="tx1">
+                    <a:lumMod val="85000"/>
+                    <a:lumOff val="15000"/>
+                  </a:schemeClr>
+                </a:solidFill>
+                <a:latin typeface="Consolas" panose="020B0609020204030204" pitchFamily="49" charset="0"/>
+                <a:cs typeface="Consolas" panose="020B0609020204030204" pitchFamily="49" charset="0"/>
+              </a:rPr>
+              <a:t>&gt;&gt;</a:t>
+            </a:r>
+          </a:p>
+          <a:p>
+            <a:pPr algn="ctr"/>
+            <a:r>
+              <a:rPr lang="en-GB" sz="600" b="1" dirty="0" err="1">
+                <a:solidFill>
+                  <a:schemeClr val="tx1">
+                    <a:lumMod val="85000"/>
+                    <a:lumOff val="15000"/>
+                  </a:schemeClr>
+                </a:solidFill>
+                <a:latin typeface="Consolas" panose="020B0609020204030204" pitchFamily="49" charset="0"/>
+                <a:cs typeface="Consolas" panose="020B0609020204030204" pitchFamily="49" charset="0"/>
+              </a:rPr>
+              <a:t>UnderFlagOfConvenience</a:t>
+            </a:r>
+            <a:endParaRPr lang="en-GB" sz="600" b="1" dirty="0">
+              <a:solidFill>
+                <a:schemeClr val="tx1">
+                  <a:lumMod val="85000"/>
+                  <a:lumOff val="15000"/>
+                </a:schemeClr>
+              </a:solidFill>
+              <a:latin typeface="Consolas" panose="020B0609020204030204" pitchFamily="49" charset="0"/>
+              <a:cs typeface="Consolas" panose="020B0609020204030204" pitchFamily="49" charset="0"/>
+            </a:endParaRPr>
+          </a:p>
+        </p:txBody>
+      </p:sp>
+      <p:sp>
+        <p:nvSpPr>
+          <p:cNvPr id="75" name="Rounded Rectangle 74">
+            <a:extLst>
+              <a:ext uri="{FF2B5EF4-FFF2-40B4-BE49-F238E27FC236}">
+                <a16:creationId xmlns:a16="http://schemas.microsoft.com/office/drawing/2014/main" id="{EF196459-7677-344C-8153-113764B56939}"/>
+              </a:ext>
+            </a:extLst>
+          </p:cNvPr>
+          <p:cNvSpPr/>
+          <p:nvPr/>
+        </p:nvSpPr>
+        <p:spPr>
+          <a:xfrm>
+            <a:off x="2623514" y="3248299"/>
+            <a:ext cx="813284" cy="252313"/>
+          </a:xfrm>
+          <a:prstGeom prst="roundRect">
+            <a:avLst>
+              <a:gd name="adj" fmla="val 3508"/>
+            </a:avLst>
+          </a:prstGeom>
+          <a:solidFill>
+            <a:schemeClr val="accent4"/>
+          </a:solidFill>
+          <a:ln>
+            <a:solidFill>
+              <a:schemeClr val="tx1">
+                <a:lumMod val="85000"/>
+                <a:lumOff val="15000"/>
+              </a:schemeClr>
+            </a:solidFill>
+          </a:ln>
+        </p:spPr>
+        <p:style>
+          <a:lnRef idx="2">
+            <a:schemeClr val="accent1">
+              <a:shade val="50000"/>
+            </a:schemeClr>
+          </a:lnRef>
+          <a:fillRef idx="1">
+            <a:schemeClr val="accent1"/>
+          </a:fillRef>
+          <a:effectRef idx="0">
+            <a:schemeClr val="accent1"/>
+          </a:effectRef>
+          <a:fontRef idx="minor">
+            <a:schemeClr val="lt1"/>
+          </a:fontRef>
+        </p:style>
+        <p:txBody>
+          <a:bodyPr lIns="0" rIns="0" rtlCol="0" anchor="ctr"/>
+          <a:lstStyle/>
+          <a:p>
+            <a:pPr algn="ctr"/>
+            <a:r>
+              <a:rPr lang="en-GB" sz="500" dirty="0">
+                <a:solidFill>
+                  <a:schemeClr val="tx1">
+                    <a:lumMod val="85000"/>
+                    <a:lumOff val="15000"/>
+                  </a:schemeClr>
+                </a:solidFill>
+                <a:latin typeface="Consolas" panose="020B0609020204030204" pitchFamily="49" charset="0"/>
+                <a:cs typeface="Consolas" panose="020B0609020204030204" pitchFamily="49" charset="0"/>
+              </a:rPr>
+              <a:t>&lt;&lt;</a:t>
+            </a:r>
+            <a:r>
+              <a:rPr lang="en-GB" sz="500" dirty="0" err="1">
+                <a:solidFill>
+                  <a:schemeClr val="tx1">
+                    <a:lumMod val="85000"/>
+                    <a:lumOff val="15000"/>
+                  </a:schemeClr>
+                </a:solidFill>
+                <a:latin typeface="Consolas" panose="020B0609020204030204" pitchFamily="49" charset="0"/>
+                <a:cs typeface="Consolas" panose="020B0609020204030204" pitchFamily="49" charset="0"/>
+              </a:rPr>
+              <a:t>rdfsClass</a:t>
+            </a:r>
+            <a:r>
+              <a:rPr lang="en-GB" sz="500" dirty="0">
+                <a:solidFill>
+                  <a:schemeClr val="tx1">
+                    <a:lumMod val="85000"/>
+                    <a:lumOff val="15000"/>
+                  </a:schemeClr>
+                </a:solidFill>
+                <a:latin typeface="Consolas" panose="020B0609020204030204" pitchFamily="49" charset="0"/>
+                <a:cs typeface="Consolas" panose="020B0609020204030204" pitchFamily="49" charset="0"/>
+              </a:rPr>
+              <a:t>&gt;&gt;</a:t>
+            </a:r>
+          </a:p>
+          <a:p>
+            <a:pPr algn="ctr"/>
+            <a:r>
+              <a:rPr lang="en-GB" sz="600" b="1" dirty="0" err="1">
+                <a:solidFill>
+                  <a:schemeClr val="tx1">
+                    <a:lumMod val="85000"/>
+                    <a:lumOff val="15000"/>
+                  </a:schemeClr>
+                </a:solidFill>
+                <a:latin typeface="Consolas" panose="020B0609020204030204" pitchFamily="49" charset="0"/>
+                <a:cs typeface="Consolas" panose="020B0609020204030204" pitchFamily="49" charset="0"/>
+              </a:rPr>
+              <a:t>VesselState</a:t>
+            </a:r>
+            <a:endParaRPr lang="en-GB" sz="600" b="1" dirty="0">
+              <a:solidFill>
+                <a:schemeClr val="tx1">
+                  <a:lumMod val="85000"/>
+                  <a:lumOff val="15000"/>
+                </a:schemeClr>
+              </a:solidFill>
+              <a:latin typeface="Consolas" panose="020B0609020204030204" pitchFamily="49" charset="0"/>
+              <a:cs typeface="Consolas" panose="020B0609020204030204" pitchFamily="49" charset="0"/>
+            </a:endParaRPr>
+          </a:p>
+        </p:txBody>
+      </p:sp>
+      <p:sp>
+        <p:nvSpPr>
+          <p:cNvPr id="76" name="Triangle 75">
+            <a:extLst>
+              <a:ext uri="{FF2B5EF4-FFF2-40B4-BE49-F238E27FC236}">
+                <a16:creationId xmlns:a16="http://schemas.microsoft.com/office/drawing/2014/main" id="{01713EA5-08CE-524B-B766-36A299797346}"/>
+              </a:ext>
+            </a:extLst>
+          </p:cNvPr>
+          <p:cNvSpPr/>
+          <p:nvPr/>
+        </p:nvSpPr>
+        <p:spPr>
+          <a:xfrm>
+            <a:off x="2996600" y="3509593"/>
+            <a:ext cx="67112" cy="109270"/>
+          </a:xfrm>
+          <a:prstGeom prst="triangle">
+            <a:avLst/>
+          </a:prstGeom>
+          <a:solidFill>
+            <a:schemeClr val="bg1">
+              <a:lumMod val="75000"/>
+            </a:schemeClr>
+          </a:solidFill>
+          <a:ln w="19050">
+            <a:solidFill>
+              <a:srgbClr val="0432FF"/>
+            </a:solidFill>
+          </a:ln>
+        </p:spPr>
+        <p:style>
+          <a:lnRef idx="2">
+            <a:schemeClr val="accent1">
+              <a:shade val="50000"/>
+            </a:schemeClr>
+          </a:lnRef>
+          <a:fillRef idx="1">
+            <a:schemeClr val="accent1"/>
+          </a:fillRef>
+          <a:effectRef idx="0">
+            <a:schemeClr val="accent1"/>
+          </a:effectRef>
+          <a:fontRef idx="minor">
+            <a:schemeClr val="lt1"/>
+          </a:fontRef>
+        </p:style>
+        <p:txBody>
+          <a:bodyPr rtlCol="0" anchor="ctr"/>
+          <a:lstStyle/>
+          <a:p>
+            <a:pPr algn="ctr"/>
+            <a:endParaRPr lang="en-GB" dirty="0"/>
+          </a:p>
+        </p:txBody>
+      </p:sp>
+      <p:cxnSp>
+        <p:nvCxnSpPr>
+          <p:cNvPr id="77" name="Elbow Connector 14">
+            <a:extLst>
+              <a:ext uri="{FF2B5EF4-FFF2-40B4-BE49-F238E27FC236}">
+                <a16:creationId xmlns:a16="http://schemas.microsoft.com/office/drawing/2014/main" id="{174C870F-12D8-944E-8CA2-F7F7F0B27650}"/>
+              </a:ext>
+            </a:extLst>
+          </p:cNvPr>
+          <p:cNvCxnSpPr>
+            <a:cxnSpLocks/>
+            <a:stCxn id="76" idx="3"/>
+            <a:endCxn id="74" idx="0"/>
+          </p:cNvCxnSpPr>
+          <p:nvPr/>
+        </p:nvCxnSpPr>
+        <p:spPr>
+          <a:xfrm rot="16200000" flipH="1">
+            <a:off x="3106104" y="3542914"/>
+            <a:ext cx="243357" cy="395253"/>
+          </a:xfrm>
+          <a:prstGeom prst="bentConnector3">
+            <a:avLst>
+              <a:gd name="adj1" fmla="val 50000"/>
+            </a:avLst>
+          </a:prstGeom>
+          <a:solidFill>
+            <a:schemeClr val="bg1">
+              <a:lumMod val="75000"/>
+            </a:schemeClr>
+          </a:solidFill>
+          <a:ln w="12700">
+            <a:solidFill>
+              <a:srgbClr val="0432FF"/>
+            </a:solidFill>
+          </a:ln>
+        </p:spPr>
+        <p:style>
+          <a:lnRef idx="2">
+            <a:schemeClr val="accent1">
+              <a:shade val="50000"/>
+            </a:schemeClr>
+          </a:lnRef>
+          <a:fillRef idx="1">
+            <a:schemeClr val="accent1"/>
+          </a:fillRef>
+          <a:effectRef idx="0">
+            <a:schemeClr val="accent1"/>
+          </a:effectRef>
+          <a:fontRef idx="minor">
+            <a:schemeClr val="lt1"/>
+          </a:fontRef>
+        </p:style>
+      </p:cxnSp>
+      <p:sp>
+        <p:nvSpPr>
+          <p:cNvPr id="78" name="TextBox 77">
+            <a:extLst>
+              <a:ext uri="{FF2B5EF4-FFF2-40B4-BE49-F238E27FC236}">
+                <a16:creationId xmlns:a16="http://schemas.microsoft.com/office/drawing/2014/main" id="{B9A9E1F5-B6D5-E44B-B5A4-AA2C6B0A2437}"/>
+              </a:ext>
+            </a:extLst>
+          </p:cNvPr>
+          <p:cNvSpPr txBox="1"/>
+          <p:nvPr/>
+        </p:nvSpPr>
+        <p:spPr>
+          <a:xfrm>
+            <a:off x="7277083" y="1864105"/>
+            <a:ext cx="780983" cy="200055"/>
+          </a:xfrm>
+          <a:prstGeom prst="rect">
+            <a:avLst/>
+          </a:prstGeom>
+          <a:noFill/>
+        </p:spPr>
+        <p:txBody>
+          <a:bodyPr wrap="none" rtlCol="0">
+            <a:spAutoFit/>
+          </a:bodyPr>
+          <a:lstStyle/>
+          <a:p>
+            <a:r>
+              <a:rPr lang="en-GB" sz="700" dirty="0" err="1">
+                <a:latin typeface="Consolas" panose="020B0609020204030204" pitchFamily="49" charset="0"/>
+                <a:cs typeface="Consolas" panose="020B0609020204030204" pitchFamily="49" charset="0"/>
+              </a:rPr>
+              <a:t>ies:isPartOf</a:t>
+            </a:r>
+            <a:endParaRPr lang="en-GB" sz="700" dirty="0">
+              <a:latin typeface="Consolas" panose="020B0609020204030204" pitchFamily="49" charset="0"/>
+              <a:cs typeface="Consolas" panose="020B0609020204030204" pitchFamily="49" charset="0"/>
+            </a:endParaRPr>
+          </a:p>
+        </p:txBody>
+      </p:sp>
+      <p:sp>
+        <p:nvSpPr>
+          <p:cNvPr id="79" name="Oval 78">
+            <a:extLst>
+              <a:ext uri="{FF2B5EF4-FFF2-40B4-BE49-F238E27FC236}">
+                <a16:creationId xmlns:a16="http://schemas.microsoft.com/office/drawing/2014/main" id="{074A92CD-6CDE-2048-BB8E-326B7EB73F4B}"/>
+              </a:ext>
+            </a:extLst>
+          </p:cNvPr>
+          <p:cNvSpPr/>
+          <p:nvPr/>
+        </p:nvSpPr>
+        <p:spPr>
+          <a:xfrm>
+            <a:off x="8222283" y="1806327"/>
+            <a:ext cx="487680" cy="473612"/>
+          </a:xfrm>
+          <a:prstGeom prst="ellipse">
+            <a:avLst/>
+          </a:prstGeom>
+          <a:solidFill>
+            <a:schemeClr val="tx1">
+              <a:lumMod val="85000"/>
+              <a:lumOff val="15000"/>
+            </a:schemeClr>
+          </a:solidFill>
+          <a:ln w="38100">
+            <a:solidFill>
+              <a:srgbClr val="00FA00"/>
+            </a:solidFill>
+          </a:ln>
+        </p:spPr>
+        <p:style>
+          <a:lnRef idx="2">
+            <a:schemeClr val="accent1">
+              <a:shade val="50000"/>
+            </a:schemeClr>
+          </a:lnRef>
+          <a:fillRef idx="1">
+            <a:schemeClr val="accent1"/>
+          </a:fillRef>
+          <a:effectRef idx="0">
+            <a:schemeClr val="accent1"/>
+          </a:effectRef>
+          <a:fontRef idx="minor">
+            <a:schemeClr val="lt1"/>
+          </a:fontRef>
+        </p:style>
+        <p:txBody>
+          <a:bodyPr lIns="0" rIns="0" rtlCol="0" anchor="ctr"/>
+          <a:lstStyle/>
+          <a:p>
+            <a:pPr algn="ctr"/>
+            <a:r>
+              <a:rPr lang="en-GB" dirty="0">
+                <a:solidFill>
+                  <a:srgbClr val="00FA00"/>
+                </a:solidFill>
+                <a:latin typeface="Consolas" panose="020B0609020204030204" pitchFamily="49" charset="0"/>
+                <a:cs typeface="Consolas" panose="020B0609020204030204" pitchFamily="49" charset="0"/>
+              </a:rPr>
+              <a:t>PW</a:t>
+            </a:r>
+          </a:p>
+        </p:txBody>
+      </p:sp>
+      <p:cxnSp>
+        <p:nvCxnSpPr>
+          <p:cNvPr id="81" name="Straight Arrow Connector 80">
+            <a:extLst>
+              <a:ext uri="{FF2B5EF4-FFF2-40B4-BE49-F238E27FC236}">
+                <a16:creationId xmlns:a16="http://schemas.microsoft.com/office/drawing/2014/main" id="{0C098105-CBD0-B342-8FCB-EC4187D99891}"/>
+              </a:ext>
+            </a:extLst>
+          </p:cNvPr>
+          <p:cNvCxnSpPr>
+            <a:cxnSpLocks/>
+            <a:stCxn id="57" idx="6"/>
+            <a:endCxn id="79" idx="2"/>
+          </p:cNvCxnSpPr>
+          <p:nvPr/>
+        </p:nvCxnSpPr>
+        <p:spPr>
+          <a:xfrm flipV="1">
+            <a:off x="7239978" y="2043133"/>
+            <a:ext cx="982305" cy="463"/>
+          </a:xfrm>
+          <a:prstGeom prst="straightConnector1">
+            <a:avLst/>
+          </a:prstGeom>
+          <a:ln w="22225">
+            <a:solidFill>
+              <a:schemeClr val="tx1"/>
+            </a:solidFill>
+            <a:tailEnd type="arrow"/>
+          </a:ln>
+        </p:spPr>
+        <p:style>
+          <a:lnRef idx="1">
+            <a:schemeClr val="accent1"/>
+          </a:lnRef>
+          <a:fillRef idx="0">
+            <a:schemeClr val="accent1"/>
+          </a:fillRef>
+          <a:effectRef idx="0">
+            <a:schemeClr val="accent1"/>
+          </a:effectRef>
+          <a:fontRef idx="minor">
+            <a:schemeClr val="tx1"/>
+          </a:fontRef>
+        </p:style>
+      </p:cxnSp>
+    </p:spTree>
+    <p:extLst>
+      <p:ext uri="{BB962C8B-B14F-4D97-AF65-F5344CB8AC3E}">
+        <p14:creationId xmlns:p14="http://schemas.microsoft.com/office/powerpoint/2010/main" val="2593875880"/>
       </p:ext>
     </p:extLst>
   </p:cSld>

</xml_diff>

<commit_message>
Added ADSS Image modelling
</commit_message>
<xml_diff>
--- a/Schema Extensions/IES Model Extension Documentation.pptx
+++ b/Schema Extensions/IES Model Extension Documentation.pptx
@@ -26,58 +26,59 @@
     <p:sldId id="279" r:id="rId20"/>
     <p:sldId id="280" r:id="rId21"/>
     <p:sldId id="281" r:id="rId22"/>
-    <p:sldId id="282" r:id="rId23"/>
-    <p:sldId id="283" r:id="rId24"/>
+    <p:sldId id="284" r:id="rId23"/>
+    <p:sldId id="282" r:id="rId24"/>
+    <p:sldId id="283" r:id="rId25"/>
   </p:sldIdLst>
   <p:sldSz cx="12192000" cy="6858000"/>
   <p:notesSz cx="6858000" cy="9144000"/>
   <p:embeddedFontLst>
     <p:embeddedFont>
       <p:font typeface="Calibri" panose="020F0502020204030204" pitchFamily="34" charset="0"/>
-      <p:regular r:id="rId25"/>
-      <p:bold r:id="rId26"/>
-      <p:italic r:id="rId27"/>
-      <p:boldItalic r:id="rId28"/>
+      <p:regular r:id="rId26"/>
+      <p:bold r:id="rId27"/>
+      <p:italic r:id="rId28"/>
+      <p:boldItalic r:id="rId29"/>
     </p:embeddedFont>
     <p:embeddedFont>
       <p:font typeface="Calibri Light" panose="020F0302020204030204" pitchFamily="34" charset="0"/>
-      <p:regular r:id="rId29"/>
-      <p:italic r:id="rId30"/>
+      <p:regular r:id="rId30"/>
+      <p:italic r:id="rId31"/>
     </p:embeddedFont>
     <p:embeddedFont>
       <p:font typeface="Consolas" panose="020B0609020204030204" pitchFamily="49" charset="0"/>
-      <p:regular r:id="rId31"/>
-      <p:bold r:id="rId32"/>
-      <p:italic r:id="rId33"/>
-      <p:boldItalic r:id="rId34"/>
+      <p:regular r:id="rId32"/>
+      <p:bold r:id="rId33"/>
+      <p:italic r:id="rId34"/>
+      <p:boldItalic r:id="rId35"/>
     </p:embeddedFont>
     <p:embeddedFont>
       <p:font typeface="Libre Barcode 39 Text" pitchFamily="2" charset="0"/>
-      <p:regular r:id="rId35"/>
+      <p:regular r:id="rId36"/>
     </p:embeddedFont>
     <p:embeddedFont>
       <p:font typeface="Roboto" panose="02000000000000000000" pitchFamily="2" charset="0"/>
-      <p:regular r:id="rId36"/>
-      <p:bold r:id="rId37"/>
-      <p:italic r:id="rId38"/>
-      <p:boldItalic r:id="rId39"/>
+      <p:regular r:id="rId37"/>
+      <p:bold r:id="rId38"/>
+      <p:italic r:id="rId39"/>
+      <p:boldItalic r:id="rId40"/>
     </p:embeddedFont>
     <p:embeddedFont>
       <p:font typeface="Roboto Light" panose="02000000000000000000" pitchFamily="2" charset="0"/>
-      <p:regular r:id="rId40"/>
-      <p:italic r:id="rId41"/>
+      <p:regular r:id="rId41"/>
+      <p:italic r:id="rId42"/>
     </p:embeddedFont>
     <p:embeddedFont>
       <p:font typeface="Roboto Mono" pitchFamily="2" charset="0"/>
-      <p:regular r:id="rId42"/>
-      <p:bold r:id="rId43"/>
-      <p:italic r:id="rId44"/>
-      <p:boldItalic r:id="rId45"/>
+      <p:regular r:id="rId43"/>
+      <p:bold r:id="rId44"/>
+      <p:italic r:id="rId45"/>
+      <p:boldItalic r:id="rId46"/>
     </p:embeddedFont>
     <p:embeddedFont>
       <p:font typeface="Roboto Thin" panose="02000000000000000000" pitchFamily="2" charset="0"/>
-      <p:regular r:id="rId46"/>
-      <p:italic r:id="rId47"/>
+      <p:regular r:id="rId47"/>
+      <p:italic r:id="rId48"/>
     </p:embeddedFont>
   </p:embeddedFontLst>
   <p:defaultTextStyle>
@@ -330,7 +331,7 @@
           <a:p>
             <a:fld id="{9C217E9C-8F4D-924D-9E3C-AB228D9DE283}" type="datetimeFigureOut">
               <a:rPr lang="en-GB" smtClean="0"/>
-              <a:t>05/05/2021</a:t>
+              <a:t>26/05/2021</a:t>
             </a:fld>
             <a:endParaRPr lang="en-GB"/>
           </a:p>
@@ -528,7 +529,7 @@
           <a:p>
             <a:fld id="{9C217E9C-8F4D-924D-9E3C-AB228D9DE283}" type="datetimeFigureOut">
               <a:rPr lang="en-GB" smtClean="0"/>
-              <a:t>05/05/2021</a:t>
+              <a:t>26/05/2021</a:t>
             </a:fld>
             <a:endParaRPr lang="en-GB"/>
           </a:p>
@@ -736,7 +737,7 @@
           <a:p>
             <a:fld id="{9C217E9C-8F4D-924D-9E3C-AB228D9DE283}" type="datetimeFigureOut">
               <a:rPr lang="en-GB" smtClean="0"/>
-              <a:t>05/05/2021</a:t>
+              <a:t>26/05/2021</a:t>
             </a:fld>
             <a:endParaRPr lang="en-GB"/>
           </a:p>
@@ -934,7 +935,7 @@
           <a:p>
             <a:fld id="{9C217E9C-8F4D-924D-9E3C-AB228D9DE283}" type="datetimeFigureOut">
               <a:rPr lang="en-GB" smtClean="0"/>
-              <a:t>05/05/2021</a:t>
+              <a:t>26/05/2021</a:t>
             </a:fld>
             <a:endParaRPr lang="en-GB"/>
           </a:p>
@@ -1209,7 +1210,7 @@
           <a:p>
             <a:fld id="{9C217E9C-8F4D-924D-9E3C-AB228D9DE283}" type="datetimeFigureOut">
               <a:rPr lang="en-GB" smtClean="0"/>
-              <a:t>05/05/2021</a:t>
+              <a:t>26/05/2021</a:t>
             </a:fld>
             <a:endParaRPr lang="en-GB"/>
           </a:p>
@@ -1474,7 +1475,7 @@
           <a:p>
             <a:fld id="{9C217E9C-8F4D-924D-9E3C-AB228D9DE283}" type="datetimeFigureOut">
               <a:rPr lang="en-GB" smtClean="0"/>
-              <a:t>05/05/2021</a:t>
+              <a:t>26/05/2021</a:t>
             </a:fld>
             <a:endParaRPr lang="en-GB"/>
           </a:p>
@@ -1886,7 +1887,7 @@
           <a:p>
             <a:fld id="{9C217E9C-8F4D-924D-9E3C-AB228D9DE283}" type="datetimeFigureOut">
               <a:rPr lang="en-GB" smtClean="0"/>
-              <a:t>05/05/2021</a:t>
+              <a:t>26/05/2021</a:t>
             </a:fld>
             <a:endParaRPr lang="en-GB"/>
           </a:p>
@@ -2027,7 +2028,7 @@
           <a:p>
             <a:fld id="{9C217E9C-8F4D-924D-9E3C-AB228D9DE283}" type="datetimeFigureOut">
               <a:rPr lang="en-GB" smtClean="0"/>
-              <a:t>05/05/2021</a:t>
+              <a:t>26/05/2021</a:t>
             </a:fld>
             <a:endParaRPr lang="en-GB"/>
           </a:p>
@@ -2140,7 +2141,7 @@
           <a:p>
             <a:fld id="{9C217E9C-8F4D-924D-9E3C-AB228D9DE283}" type="datetimeFigureOut">
               <a:rPr lang="en-GB" smtClean="0"/>
-              <a:t>05/05/2021</a:t>
+              <a:t>26/05/2021</a:t>
             </a:fld>
             <a:endParaRPr lang="en-GB"/>
           </a:p>
@@ -2451,7 +2452,7 @@
           <a:p>
             <a:fld id="{9C217E9C-8F4D-924D-9E3C-AB228D9DE283}" type="datetimeFigureOut">
               <a:rPr lang="en-GB" smtClean="0"/>
-              <a:t>05/05/2021</a:t>
+              <a:t>26/05/2021</a:t>
             </a:fld>
             <a:endParaRPr lang="en-GB"/>
           </a:p>
@@ -2739,7 +2740,7 @@
           <a:p>
             <a:fld id="{9C217E9C-8F4D-924D-9E3C-AB228D9DE283}" type="datetimeFigureOut">
               <a:rPr lang="en-GB" smtClean="0"/>
-              <a:t>05/05/2021</a:t>
+              <a:t>26/05/2021</a:t>
             </a:fld>
             <a:endParaRPr lang="en-GB"/>
           </a:p>
@@ -2980,7 +2981,7 @@
           <a:p>
             <a:fld id="{9C217E9C-8F4D-924D-9E3C-AB228D9DE283}" type="datetimeFigureOut">
               <a:rPr lang="en-GB" smtClean="0"/>
-              <a:t>05/05/2021</a:t>
+              <a:t>26/05/2021</a:t>
             </a:fld>
             <a:endParaRPr lang="en-GB"/>
           </a:p>
@@ -3422,7 +3423,7 @@
           </a:ln>
           <a:extLst>
             <a:ext uri="{C572A759-6A51-4108-AA02-DFA0A04FC94B}">
-              <ma14:wrappingTextBoxFlag xmlns="" xmlns:ma14="http://schemas.microsoft.com/office/mac/drawingml/2011/main" val="1"/>
+              <ma14:wrappingTextBoxFlag xmlns:ma14="http://schemas.microsoft.com/office/mac/drawingml/2011/main" xmlns="" val="1"/>
             </a:ext>
           </a:extLst>
         </p:spPr>
@@ -27584,6 +27585,777 @@
           <p:cNvPr id="2" name="TextBox 1">
             <a:extLst>
               <a:ext uri="{FF2B5EF4-FFF2-40B4-BE49-F238E27FC236}">
+                <a16:creationId xmlns:a16="http://schemas.microsoft.com/office/drawing/2014/main" id="{22DB0895-D1F0-B74E-BCAD-0BA4A492501D}"/>
+              </a:ext>
+            </a:extLst>
+          </p:cNvPr>
+          <p:cNvSpPr txBox="1"/>
+          <p:nvPr/>
+        </p:nvSpPr>
+        <p:spPr>
+          <a:xfrm>
+            <a:off x="263310" y="761653"/>
+            <a:ext cx="5127342" cy="1477328"/>
+          </a:xfrm>
+          <a:prstGeom prst="rect">
+            <a:avLst/>
+          </a:prstGeom>
+          <a:noFill/>
+        </p:spPr>
+        <p:txBody>
+          <a:bodyPr wrap="square" rtlCol="0">
+            <a:spAutoFit/>
+          </a:bodyPr>
+          <a:lstStyle/>
+          <a:p>
+            <a:r>
+              <a:rPr lang="en-GB" dirty="0">
+                <a:latin typeface="Roboto" panose="02000000000000000000" pitchFamily="2" charset="0"/>
+                <a:ea typeface="Roboto" panose="02000000000000000000" pitchFamily="2" charset="0"/>
+              </a:rPr>
+              <a:t>IES is sometimes missing really obvious classes – this is an effect of the rule that “someone has to ask for it” for it to be in the model. No-one had asked for images…until now. So, the model would be:</a:t>
+            </a:r>
+          </a:p>
+        </p:txBody>
+      </p:sp>
+      <p:sp>
+        <p:nvSpPr>
+          <p:cNvPr id="3" name="TextBox 2">
+            <a:extLst>
+              <a:ext uri="{FF2B5EF4-FFF2-40B4-BE49-F238E27FC236}">
+                <a16:creationId xmlns:a16="http://schemas.microsoft.com/office/drawing/2014/main" id="{26E4E862-9DF0-064D-974D-1C66BB44F742}"/>
+              </a:ext>
+            </a:extLst>
+          </p:cNvPr>
+          <p:cNvSpPr txBox="1"/>
+          <p:nvPr/>
+        </p:nvSpPr>
+        <p:spPr>
+          <a:xfrm>
+            <a:off x="263309" y="239371"/>
+            <a:ext cx="6497291" cy="461665"/>
+          </a:xfrm>
+          <a:prstGeom prst="rect">
+            <a:avLst/>
+          </a:prstGeom>
+          <a:noFill/>
+        </p:spPr>
+        <p:txBody>
+          <a:bodyPr wrap="none" rtlCol="0">
+            <a:spAutoFit/>
+          </a:bodyPr>
+          <a:lstStyle/>
+          <a:p>
+            <a:r>
+              <a:rPr lang="en-GB" sz="2400" dirty="0">
+                <a:solidFill>
+                  <a:srgbClr val="0070C0"/>
+                </a:solidFill>
+                <a:latin typeface="Roboto Thin" panose="02000000000000000000" pitchFamily="2" charset="0"/>
+                <a:ea typeface="Roboto Thin" panose="02000000000000000000" pitchFamily="2" charset="0"/>
+              </a:rPr>
+              <a:t>ADSS -&gt; IES Mapping – extend model for image</a:t>
+            </a:r>
+          </a:p>
+        </p:txBody>
+      </p:sp>
+      <p:pic>
+        <p:nvPicPr>
+          <p:cNvPr id="1026" name="Picture 2" descr="Data Object Diagram">
+            <a:extLst>
+              <a:ext uri="{FF2B5EF4-FFF2-40B4-BE49-F238E27FC236}">
+                <a16:creationId xmlns:a16="http://schemas.microsoft.com/office/drawing/2014/main" id="{0593D73D-697E-0B4E-BA6F-77654CD08A63}"/>
+              </a:ext>
+            </a:extLst>
+          </p:cNvPr>
+          <p:cNvPicPr>
+            <a:picLocks noChangeAspect="1" noChangeArrowheads="1"/>
+          </p:cNvPicPr>
+          <p:nvPr/>
+        </p:nvPicPr>
+        <p:blipFill rotWithShape="1">
+          <a:blip r:embed="rId2">
+            <a:extLst>
+              <a:ext uri="{28A0092B-C50C-407E-A947-70E740481C1C}">
+                <a14:useLocalDpi xmlns:a14="http://schemas.microsoft.com/office/drawing/2010/main" val="0"/>
+              </a:ext>
+            </a:extLst>
+          </a:blip>
+          <a:srcRect t="2451" r="23658" b="43207"/>
+          <a:stretch/>
+        </p:blipFill>
+        <p:spPr bwMode="auto">
+          <a:xfrm>
+            <a:off x="263309" y="2281304"/>
+            <a:ext cx="4135069" cy="3726798"/>
+          </a:xfrm>
+          <a:prstGeom prst="rect">
+            <a:avLst/>
+          </a:prstGeom>
+          <a:noFill/>
+          <a:extLst>
+            <a:ext uri="{909E8E84-426E-40DD-AFC4-6F175D3DCCD1}">
+              <a14:hiddenFill xmlns:a14="http://schemas.microsoft.com/office/drawing/2010/main">
+                <a:solidFill>
+                  <a:srgbClr val="FFFFFF"/>
+                </a:solidFill>
+              </a14:hiddenFill>
+            </a:ext>
+          </a:extLst>
+        </p:spPr>
+      </p:pic>
+      <p:sp>
+        <p:nvSpPr>
+          <p:cNvPr id="5" name="Rounded Rectangle 4">
+            <a:extLst>
+              <a:ext uri="{FF2B5EF4-FFF2-40B4-BE49-F238E27FC236}">
+                <a16:creationId xmlns:a16="http://schemas.microsoft.com/office/drawing/2014/main" id="{9ABB1834-2138-0541-9D71-F4CA1954EC6A}"/>
+              </a:ext>
+            </a:extLst>
+          </p:cNvPr>
+          <p:cNvSpPr/>
+          <p:nvPr/>
+        </p:nvSpPr>
+        <p:spPr>
+          <a:xfrm>
+            <a:off x="1797168" y="6390946"/>
+            <a:ext cx="856950" cy="302752"/>
+          </a:xfrm>
+          <a:prstGeom prst="roundRect">
+            <a:avLst/>
+          </a:prstGeom>
+          <a:solidFill>
+            <a:srgbClr val="00CCFF"/>
+          </a:solidFill>
+          <a:ln>
+            <a:solidFill>
+              <a:srgbClr val="ECEC00"/>
+            </a:solidFill>
+          </a:ln>
+        </p:spPr>
+        <p:style>
+          <a:lnRef idx="2">
+            <a:schemeClr val="accent1">
+              <a:shade val="50000"/>
+            </a:schemeClr>
+          </a:lnRef>
+          <a:fillRef idx="1">
+            <a:schemeClr val="accent1"/>
+          </a:fillRef>
+          <a:effectRef idx="0">
+            <a:schemeClr val="accent1"/>
+          </a:effectRef>
+          <a:fontRef idx="minor">
+            <a:schemeClr val="lt1"/>
+          </a:fontRef>
+        </p:style>
+        <p:txBody>
+          <a:bodyPr lIns="0" rIns="0" rtlCol="0" anchor="ctr"/>
+          <a:lstStyle/>
+          <a:p>
+            <a:pPr algn="ctr"/>
+            <a:r>
+              <a:rPr lang="en-GB" sz="600" b="1" dirty="0">
+                <a:solidFill>
+                  <a:schemeClr val="tx1">
+                    <a:lumMod val="65000"/>
+                    <a:lumOff val="35000"/>
+                  </a:schemeClr>
+                </a:solidFill>
+                <a:latin typeface="Consolas" panose="020B0609020204030204" pitchFamily="49" charset="0"/>
+                <a:cs typeface="Consolas" panose="020B0609020204030204" pitchFamily="49" charset="0"/>
+              </a:rPr>
+              <a:t>&lt;&lt;</a:t>
+            </a:r>
+            <a:r>
+              <a:rPr lang="en-GB" sz="600" b="1" dirty="0" err="1">
+                <a:solidFill>
+                  <a:schemeClr val="tx1">
+                    <a:lumMod val="65000"/>
+                    <a:lumOff val="35000"/>
+                  </a:schemeClr>
+                </a:solidFill>
+                <a:latin typeface="Consolas" panose="020B0609020204030204" pitchFamily="49" charset="0"/>
+                <a:cs typeface="Consolas" panose="020B0609020204030204" pitchFamily="49" charset="0"/>
+              </a:rPr>
+              <a:t>rdfsClass</a:t>
+            </a:r>
+            <a:r>
+              <a:rPr lang="en-GB" sz="600" b="1" dirty="0">
+                <a:solidFill>
+                  <a:schemeClr val="tx1">
+                    <a:lumMod val="65000"/>
+                    <a:lumOff val="35000"/>
+                  </a:schemeClr>
+                </a:solidFill>
+                <a:latin typeface="Consolas" panose="020B0609020204030204" pitchFamily="49" charset="0"/>
+                <a:cs typeface="Consolas" panose="020B0609020204030204" pitchFamily="49" charset="0"/>
+              </a:rPr>
+              <a:t>&gt;&gt;</a:t>
+            </a:r>
+          </a:p>
+          <a:p>
+            <a:pPr algn="ctr"/>
+            <a:r>
+              <a:rPr lang="en-GB" sz="600" b="1" dirty="0" err="1">
+                <a:solidFill>
+                  <a:schemeClr val="tx1">
+                    <a:lumMod val="65000"/>
+                    <a:lumOff val="35000"/>
+                  </a:schemeClr>
+                </a:solidFill>
+                <a:latin typeface="Consolas" panose="020B0609020204030204" pitchFamily="49" charset="0"/>
+                <a:cs typeface="Consolas" panose="020B0609020204030204" pitchFamily="49" charset="0"/>
+              </a:rPr>
+              <a:t>ImageFile</a:t>
+            </a:r>
+            <a:endParaRPr lang="en-GB" sz="600" b="1" dirty="0">
+              <a:solidFill>
+                <a:schemeClr val="tx1">
+                  <a:lumMod val="65000"/>
+                  <a:lumOff val="35000"/>
+                </a:schemeClr>
+              </a:solidFill>
+              <a:latin typeface="Consolas" panose="020B0609020204030204" pitchFamily="49" charset="0"/>
+              <a:cs typeface="Consolas" panose="020B0609020204030204" pitchFamily="49" charset="0"/>
+            </a:endParaRPr>
+          </a:p>
+        </p:txBody>
+      </p:sp>
+      <p:cxnSp>
+        <p:nvCxnSpPr>
+          <p:cNvPr id="6" name="Elbow Connector 14">
+            <a:extLst>
+              <a:ext uri="{FF2B5EF4-FFF2-40B4-BE49-F238E27FC236}">
+                <a16:creationId xmlns:a16="http://schemas.microsoft.com/office/drawing/2014/main" id="{19F7E1EE-4EA1-0945-902D-EB445F6175A7}"/>
+              </a:ext>
+            </a:extLst>
+          </p:cNvPr>
+          <p:cNvCxnSpPr>
+            <a:cxnSpLocks/>
+            <a:stCxn id="5" idx="0"/>
+            <a:endCxn id="7" idx="3"/>
+          </p:cNvCxnSpPr>
+          <p:nvPr/>
+        </p:nvCxnSpPr>
+        <p:spPr>
+          <a:xfrm rot="16200000" flipV="1">
+            <a:off x="2080778" y="6246080"/>
+            <a:ext cx="287598" cy="2133"/>
+          </a:xfrm>
+          <a:prstGeom prst="bentConnector3">
+            <a:avLst>
+              <a:gd name="adj1" fmla="val 50000"/>
+            </a:avLst>
+          </a:prstGeom>
+          <a:solidFill>
+            <a:schemeClr val="bg1">
+              <a:lumMod val="75000"/>
+            </a:schemeClr>
+          </a:solidFill>
+          <a:ln w="12700">
+            <a:solidFill>
+              <a:srgbClr val="0432FF"/>
+            </a:solidFill>
+          </a:ln>
+        </p:spPr>
+        <p:style>
+          <a:lnRef idx="2">
+            <a:schemeClr val="accent1">
+              <a:shade val="50000"/>
+            </a:schemeClr>
+          </a:lnRef>
+          <a:fillRef idx="1">
+            <a:schemeClr val="accent1"/>
+          </a:fillRef>
+          <a:effectRef idx="0">
+            <a:schemeClr val="accent1"/>
+          </a:effectRef>
+          <a:fontRef idx="minor">
+            <a:schemeClr val="lt1"/>
+          </a:fontRef>
+        </p:style>
+      </p:cxnSp>
+      <p:sp>
+        <p:nvSpPr>
+          <p:cNvPr id="7" name="Triangle 6">
+            <a:extLst>
+              <a:ext uri="{FF2B5EF4-FFF2-40B4-BE49-F238E27FC236}">
+                <a16:creationId xmlns:a16="http://schemas.microsoft.com/office/drawing/2014/main" id="{7518684B-30B4-EB4B-BBF7-D43B564F55A5}"/>
+              </a:ext>
+            </a:extLst>
+          </p:cNvPr>
+          <p:cNvSpPr/>
+          <p:nvPr/>
+        </p:nvSpPr>
+        <p:spPr>
+          <a:xfrm>
+            <a:off x="2187347" y="5998399"/>
+            <a:ext cx="72326" cy="104949"/>
+          </a:xfrm>
+          <a:prstGeom prst="triangle">
+            <a:avLst/>
+          </a:prstGeom>
+          <a:solidFill>
+            <a:schemeClr val="bg1">
+              <a:lumMod val="85000"/>
+            </a:schemeClr>
+          </a:solidFill>
+          <a:ln w="19050">
+            <a:solidFill>
+              <a:srgbClr val="0432FF"/>
+            </a:solidFill>
+          </a:ln>
+        </p:spPr>
+        <p:style>
+          <a:lnRef idx="2">
+            <a:schemeClr val="accent1">
+              <a:shade val="50000"/>
+            </a:schemeClr>
+          </a:lnRef>
+          <a:fillRef idx="1">
+            <a:schemeClr val="accent1"/>
+          </a:fillRef>
+          <a:effectRef idx="0">
+            <a:schemeClr val="accent1"/>
+          </a:effectRef>
+          <a:fontRef idx="minor">
+            <a:schemeClr val="lt1"/>
+          </a:fontRef>
+        </p:style>
+        <p:txBody>
+          <a:bodyPr rtlCol="0" anchor="ctr"/>
+          <a:lstStyle/>
+          <a:p>
+            <a:pPr algn="ctr"/>
+            <a:endParaRPr lang="en-GB" dirty="0"/>
+          </a:p>
+        </p:txBody>
+      </p:sp>
+      <p:sp>
+        <p:nvSpPr>
+          <p:cNvPr id="10" name="Oval 9">
+            <a:extLst>
+              <a:ext uri="{FF2B5EF4-FFF2-40B4-BE49-F238E27FC236}">
+                <a16:creationId xmlns:a16="http://schemas.microsoft.com/office/drawing/2014/main" id="{875C7DC7-ED5E-1340-94F7-B7F051FC511D}"/>
+              </a:ext>
+            </a:extLst>
+          </p:cNvPr>
+          <p:cNvSpPr/>
+          <p:nvPr/>
+        </p:nvSpPr>
+        <p:spPr>
+          <a:xfrm>
+            <a:off x="9316724" y="2332974"/>
+            <a:ext cx="487680" cy="473612"/>
+          </a:xfrm>
+          <a:prstGeom prst="ellipse">
+            <a:avLst/>
+          </a:prstGeom>
+          <a:solidFill>
+            <a:schemeClr val="tx1">
+              <a:lumMod val="85000"/>
+              <a:lumOff val="15000"/>
+            </a:schemeClr>
+          </a:solidFill>
+          <a:ln w="38100">
+            <a:solidFill>
+              <a:srgbClr val="7B35B1"/>
+            </a:solidFill>
+          </a:ln>
+        </p:spPr>
+        <p:style>
+          <a:lnRef idx="2">
+            <a:schemeClr val="accent1">
+              <a:shade val="50000"/>
+            </a:schemeClr>
+          </a:lnRef>
+          <a:fillRef idx="1">
+            <a:schemeClr val="accent1"/>
+          </a:fillRef>
+          <a:effectRef idx="0">
+            <a:schemeClr val="accent1"/>
+          </a:effectRef>
+          <a:fontRef idx="minor">
+            <a:schemeClr val="lt1"/>
+          </a:fontRef>
+        </p:style>
+        <p:txBody>
+          <a:bodyPr lIns="0" rIns="0" rtlCol="0" anchor="ctr"/>
+          <a:lstStyle/>
+          <a:p>
+            <a:pPr algn="ctr"/>
+            <a:r>
+              <a:rPr lang="en-GB" sz="1400" dirty="0">
+                <a:solidFill>
+                  <a:srgbClr val="7B35B1"/>
+                </a:solidFill>
+                <a:latin typeface="Consolas" panose="020B0609020204030204" pitchFamily="49" charset="0"/>
+                <a:cs typeface="Consolas" panose="020B0609020204030204" pitchFamily="49" charset="0"/>
+              </a:rPr>
+              <a:t>OT/VS</a:t>
+            </a:r>
+          </a:p>
+        </p:txBody>
+      </p:sp>
+      <p:sp>
+        <p:nvSpPr>
+          <p:cNvPr id="11" name="TextBox 10">
+            <a:extLst>
+              <a:ext uri="{FF2B5EF4-FFF2-40B4-BE49-F238E27FC236}">
+                <a16:creationId xmlns:a16="http://schemas.microsoft.com/office/drawing/2014/main" id="{911E77D9-2B9A-3E4F-88BD-05D71FF60A73}"/>
+              </a:ext>
+            </a:extLst>
+          </p:cNvPr>
+          <p:cNvSpPr txBox="1"/>
+          <p:nvPr/>
+        </p:nvSpPr>
+        <p:spPr>
+          <a:xfrm>
+            <a:off x="8695628" y="2761229"/>
+            <a:ext cx="1643399" cy="215444"/>
+          </a:xfrm>
+          <a:prstGeom prst="rect">
+            <a:avLst/>
+          </a:prstGeom>
+          <a:noFill/>
+        </p:spPr>
+        <p:txBody>
+          <a:bodyPr wrap="none" rtlCol="0">
+            <a:spAutoFit/>
+          </a:bodyPr>
+          <a:lstStyle/>
+          <a:p>
+            <a:r>
+              <a:rPr lang="en-GB" sz="800" u="sng" dirty="0">
+                <a:solidFill>
+                  <a:srgbClr val="0432FF"/>
+                </a:solidFill>
+                <a:latin typeface="Consolas" panose="020B0609020204030204" pitchFamily="49" charset="0"/>
+                <a:cs typeface="Consolas" panose="020B0609020204030204" pitchFamily="49" charset="0"/>
+              </a:rPr>
+              <a:t>data:ADSS1352445_Observed</a:t>
+            </a:r>
+          </a:p>
+        </p:txBody>
+      </p:sp>
+      <p:sp>
+        <p:nvSpPr>
+          <p:cNvPr id="13" name="Oval 12">
+            <a:extLst>
+              <a:ext uri="{FF2B5EF4-FFF2-40B4-BE49-F238E27FC236}">
+                <a16:creationId xmlns:a16="http://schemas.microsoft.com/office/drawing/2014/main" id="{7CCDD5AB-9C00-064E-AC38-4F3C1D4EE09D}"/>
+              </a:ext>
+            </a:extLst>
+          </p:cNvPr>
+          <p:cNvSpPr/>
+          <p:nvPr/>
+        </p:nvSpPr>
+        <p:spPr>
+          <a:xfrm>
+            <a:off x="7435647" y="2332974"/>
+            <a:ext cx="487680" cy="473612"/>
+          </a:xfrm>
+          <a:prstGeom prst="ellipse">
+            <a:avLst/>
+          </a:prstGeom>
+          <a:solidFill>
+            <a:srgbClr val="00CCFF"/>
+          </a:solidFill>
+          <a:ln w="38100">
+            <a:solidFill>
+              <a:srgbClr val="ECEC00"/>
+            </a:solidFill>
+          </a:ln>
+        </p:spPr>
+        <p:style>
+          <a:lnRef idx="2">
+            <a:schemeClr val="accent1">
+              <a:shade val="50000"/>
+            </a:schemeClr>
+          </a:lnRef>
+          <a:fillRef idx="1">
+            <a:schemeClr val="accent1"/>
+          </a:fillRef>
+          <a:effectRef idx="0">
+            <a:schemeClr val="accent1"/>
+          </a:effectRef>
+          <a:fontRef idx="minor">
+            <a:schemeClr val="lt1"/>
+          </a:fontRef>
+        </p:style>
+        <p:txBody>
+          <a:bodyPr lIns="0" rIns="0" rtlCol="0" anchor="ctr"/>
+          <a:lstStyle/>
+          <a:p>
+            <a:pPr algn="ctr"/>
+            <a:r>
+              <a:rPr lang="en-GB" sz="1600" dirty="0">
+                <a:solidFill>
+                  <a:schemeClr val="tx1">
+                    <a:lumMod val="85000"/>
+                    <a:lumOff val="15000"/>
+                  </a:schemeClr>
+                </a:solidFill>
+                <a:latin typeface="Consolas" panose="020B0609020204030204" pitchFamily="49" charset="0"/>
+                <a:cs typeface="Consolas" panose="020B0609020204030204" pitchFamily="49" charset="0"/>
+              </a:rPr>
+              <a:t>IF</a:t>
+            </a:r>
+          </a:p>
+        </p:txBody>
+      </p:sp>
+      <p:cxnSp>
+        <p:nvCxnSpPr>
+          <p:cNvPr id="14" name="Straight Arrow Connector 13">
+            <a:extLst>
+              <a:ext uri="{FF2B5EF4-FFF2-40B4-BE49-F238E27FC236}">
+                <a16:creationId xmlns:a16="http://schemas.microsoft.com/office/drawing/2014/main" id="{28ABA5E2-BE7F-B14C-B009-C7E55846EED3}"/>
+              </a:ext>
+            </a:extLst>
+          </p:cNvPr>
+          <p:cNvCxnSpPr>
+            <a:cxnSpLocks/>
+            <a:stCxn id="10" idx="2"/>
+            <a:endCxn id="13" idx="6"/>
+          </p:cNvCxnSpPr>
+          <p:nvPr/>
+        </p:nvCxnSpPr>
+        <p:spPr>
+          <a:xfrm flipH="1">
+            <a:off x="7923327" y="2569780"/>
+            <a:ext cx="1393397" cy="0"/>
+          </a:xfrm>
+          <a:prstGeom prst="straightConnector1">
+            <a:avLst/>
+          </a:prstGeom>
+          <a:ln w="22225">
+            <a:solidFill>
+              <a:schemeClr val="tx1"/>
+            </a:solidFill>
+            <a:tailEnd type="arrow"/>
+          </a:ln>
+        </p:spPr>
+        <p:style>
+          <a:lnRef idx="1">
+            <a:schemeClr val="accent1"/>
+          </a:lnRef>
+          <a:fillRef idx="0">
+            <a:schemeClr val="accent1"/>
+          </a:fillRef>
+          <a:effectRef idx="0">
+            <a:schemeClr val="accent1"/>
+          </a:effectRef>
+          <a:fontRef idx="minor">
+            <a:schemeClr val="tx1"/>
+          </a:fontRef>
+        </p:style>
+      </p:cxnSp>
+      <p:sp>
+        <p:nvSpPr>
+          <p:cNvPr id="15" name="TextBox 14">
+            <a:extLst>
+              <a:ext uri="{FF2B5EF4-FFF2-40B4-BE49-F238E27FC236}">
+                <a16:creationId xmlns:a16="http://schemas.microsoft.com/office/drawing/2014/main" id="{67EB0696-E8C7-CC4E-A25A-9AF036D59F41}"/>
+              </a:ext>
+            </a:extLst>
+          </p:cNvPr>
+          <p:cNvSpPr txBox="1"/>
+          <p:nvPr/>
+        </p:nvSpPr>
+        <p:spPr>
+          <a:xfrm>
+            <a:off x="7959856" y="2354336"/>
+            <a:ext cx="1250663" cy="215444"/>
+          </a:xfrm>
+          <a:prstGeom prst="rect">
+            <a:avLst/>
+          </a:prstGeom>
+          <a:noFill/>
+        </p:spPr>
+        <p:txBody>
+          <a:bodyPr wrap="none" rtlCol="0">
+            <a:spAutoFit/>
+          </a:bodyPr>
+          <a:lstStyle/>
+          <a:p>
+            <a:r>
+              <a:rPr lang="en-GB" sz="800" dirty="0" err="1">
+                <a:latin typeface="Consolas" panose="020B0609020204030204" pitchFamily="49" charset="0"/>
+                <a:cs typeface="Consolas" panose="020B0609020204030204" pitchFamily="49" charset="0"/>
+              </a:rPr>
+              <a:t>ies:isRepresentedAs</a:t>
+            </a:r>
+            <a:endParaRPr lang="en-GB" sz="800" dirty="0">
+              <a:latin typeface="Consolas" panose="020B0609020204030204" pitchFamily="49" charset="0"/>
+              <a:cs typeface="Consolas" panose="020B0609020204030204" pitchFamily="49" charset="0"/>
+            </a:endParaRPr>
+          </a:p>
+        </p:txBody>
+      </p:sp>
+      <p:sp>
+        <p:nvSpPr>
+          <p:cNvPr id="18" name="TextBox 17">
+            <a:extLst>
+              <a:ext uri="{FF2B5EF4-FFF2-40B4-BE49-F238E27FC236}">
+                <a16:creationId xmlns:a16="http://schemas.microsoft.com/office/drawing/2014/main" id="{095DA3C7-B00C-3A40-ACD1-CA051497CA68}"/>
+              </a:ext>
+            </a:extLst>
+          </p:cNvPr>
+          <p:cNvSpPr txBox="1"/>
+          <p:nvPr/>
+        </p:nvSpPr>
+        <p:spPr>
+          <a:xfrm>
+            <a:off x="7188120" y="2806586"/>
+            <a:ext cx="914033" cy="215444"/>
+          </a:xfrm>
+          <a:prstGeom prst="rect">
+            <a:avLst/>
+          </a:prstGeom>
+          <a:noFill/>
+        </p:spPr>
+        <p:txBody>
+          <a:bodyPr wrap="none" rtlCol="0">
+            <a:spAutoFit/>
+          </a:bodyPr>
+          <a:lstStyle/>
+          <a:p>
+            <a:r>
+              <a:rPr lang="en-GB" sz="800" u="sng" dirty="0" err="1">
+                <a:solidFill>
+                  <a:srgbClr val="0432FF"/>
+                </a:solidFill>
+                <a:latin typeface="Consolas" panose="020B0609020204030204" pitchFamily="49" charset="0"/>
+                <a:cs typeface="Consolas" panose="020B0609020204030204" pitchFamily="49" charset="0"/>
+              </a:rPr>
+              <a:t>uriOfTheImage</a:t>
+            </a:r>
+            <a:endParaRPr lang="en-GB" sz="800" u="sng" dirty="0">
+              <a:solidFill>
+                <a:srgbClr val="0432FF"/>
+              </a:solidFill>
+              <a:latin typeface="Consolas" panose="020B0609020204030204" pitchFamily="49" charset="0"/>
+              <a:cs typeface="Consolas" panose="020B0609020204030204" pitchFamily="49" charset="0"/>
+            </a:endParaRPr>
+          </a:p>
+        </p:txBody>
+      </p:sp>
+      <p:sp>
+        <p:nvSpPr>
+          <p:cNvPr id="19" name="TextBox 18">
+            <a:extLst>
+              <a:ext uri="{FF2B5EF4-FFF2-40B4-BE49-F238E27FC236}">
+                <a16:creationId xmlns:a16="http://schemas.microsoft.com/office/drawing/2014/main" id="{E9862FA0-A806-844D-9591-7562C1F7F5DC}"/>
+              </a:ext>
+            </a:extLst>
+          </p:cNvPr>
+          <p:cNvSpPr txBox="1"/>
+          <p:nvPr/>
+        </p:nvSpPr>
+        <p:spPr>
+          <a:xfrm>
+            <a:off x="6392821" y="3168121"/>
+            <a:ext cx="5127342" cy="923330"/>
+          </a:xfrm>
+          <a:prstGeom prst="rect">
+            <a:avLst/>
+          </a:prstGeom>
+          <a:noFill/>
+        </p:spPr>
+        <p:txBody>
+          <a:bodyPr wrap="square" rtlCol="0">
+            <a:spAutoFit/>
+          </a:bodyPr>
+          <a:lstStyle/>
+          <a:p>
+            <a:r>
+              <a:rPr lang="en-GB" dirty="0">
+                <a:latin typeface="Roboto" panose="02000000000000000000" pitchFamily="2" charset="0"/>
+                <a:ea typeface="Roboto" panose="02000000000000000000" pitchFamily="2" charset="0"/>
+              </a:rPr>
+              <a:t>In the ADSS case we just add the </a:t>
+            </a:r>
+            <a:r>
+              <a:rPr lang="en-GB" dirty="0" err="1">
+                <a:latin typeface="Roboto" panose="02000000000000000000" pitchFamily="2" charset="0"/>
+                <a:ea typeface="Roboto" panose="02000000000000000000" pitchFamily="2" charset="0"/>
+              </a:rPr>
+              <a:t>ImageFile</a:t>
+            </a:r>
+            <a:r>
+              <a:rPr lang="en-GB" dirty="0">
+                <a:latin typeface="Roboto" panose="02000000000000000000" pitchFamily="2" charset="0"/>
+                <a:ea typeface="Roboto" panose="02000000000000000000" pitchFamily="2" charset="0"/>
+              </a:rPr>
+              <a:t> and link it to the </a:t>
+            </a:r>
+            <a:r>
+              <a:rPr lang="en-GB" dirty="0" err="1">
+                <a:latin typeface="Roboto" panose="02000000000000000000" pitchFamily="2" charset="0"/>
+                <a:ea typeface="Roboto" panose="02000000000000000000" pitchFamily="2" charset="0"/>
+              </a:rPr>
+              <a:t>ObservedTarget</a:t>
+            </a:r>
+            <a:r>
+              <a:rPr lang="en-GB" dirty="0">
+                <a:latin typeface="Roboto" panose="02000000000000000000" pitchFamily="2" charset="0"/>
+                <a:ea typeface="Roboto" panose="02000000000000000000" pitchFamily="2" charset="0"/>
+              </a:rPr>
+              <a:t>. The URI of the image is the URI of the </a:t>
+            </a:r>
+            <a:r>
+              <a:rPr lang="en-GB" dirty="0" err="1">
+                <a:latin typeface="Roboto" panose="02000000000000000000" pitchFamily="2" charset="0"/>
+                <a:ea typeface="Roboto" panose="02000000000000000000" pitchFamily="2" charset="0"/>
+              </a:rPr>
+              <a:t>ImageFile</a:t>
+            </a:r>
+            <a:r>
+              <a:rPr lang="en-GB" dirty="0">
+                <a:latin typeface="Roboto" panose="02000000000000000000" pitchFamily="2" charset="0"/>
+                <a:ea typeface="Roboto" panose="02000000000000000000" pitchFamily="2" charset="0"/>
+              </a:rPr>
+              <a:t> instance.</a:t>
+            </a:r>
+          </a:p>
+        </p:txBody>
+      </p:sp>
+    </p:spTree>
+    <p:extLst>
+      <p:ext uri="{BB962C8B-B14F-4D97-AF65-F5344CB8AC3E}">
+        <p14:creationId xmlns:p14="http://schemas.microsoft.com/office/powerpoint/2010/main" val="1340915177"/>
+      </p:ext>
+    </p:extLst>
+  </p:cSld>
+  <p:clrMapOvr>
+    <a:masterClrMapping/>
+  </p:clrMapOvr>
+</p:sld>
+</file>
+
+<file path=ppt/slides/slide23.xml><?xml version="1.0" encoding="utf-8"?>
+<p:sld xmlns:a="http://schemas.openxmlformats.org/drawingml/2006/main" xmlns:r="http://schemas.openxmlformats.org/officeDocument/2006/relationships" xmlns:p="http://schemas.openxmlformats.org/presentationml/2006/main">
+  <p:cSld>
+    <p:spTree>
+      <p:nvGrpSpPr>
+        <p:cNvPr id="1" name=""/>
+        <p:cNvGrpSpPr/>
+        <p:nvPr/>
+      </p:nvGrpSpPr>
+      <p:grpSpPr>
+        <a:xfrm>
+          <a:off x="0" y="0"/>
+          <a:ext cx="0" cy="0"/>
+          <a:chOff x="0" y="0"/>
+          <a:chExt cx="0" cy="0"/>
+        </a:xfrm>
+      </p:grpSpPr>
+      <p:sp>
+        <p:nvSpPr>
+          <p:cNvPr id="2" name="TextBox 1">
+            <a:extLst>
+              <a:ext uri="{FF2B5EF4-FFF2-40B4-BE49-F238E27FC236}">
                 <a16:creationId xmlns:a16="http://schemas.microsoft.com/office/drawing/2014/main" id="{00E26050-3128-7043-AD8B-D2951C404EA3}"/>
               </a:ext>
             </a:extLst>
@@ -30573,7 +31345,7 @@
 </p:sld>
 </file>
 
-<file path=ppt/slides/slide23.xml><?xml version="1.0" encoding="utf-8"?>
+<file path=ppt/slides/slide24.xml><?xml version="1.0" encoding="utf-8"?>
 <p:sld xmlns:a="http://schemas.openxmlformats.org/drawingml/2006/main" xmlns:r="http://schemas.openxmlformats.org/officeDocument/2006/relationships" xmlns:p="http://schemas.openxmlformats.org/presentationml/2006/main">
   <p:cSld>
     <p:spTree>

</xml_diff>

<commit_message>
Added k-stream.py - streams AIS events to Kafka
</commit_message>
<xml_diff>
--- a/Schema Extensions/IES Model Extension Documentation.pptx
+++ b/Schema Extensions/IES Model Extension Documentation.pptx
@@ -29,56 +29,57 @@
     <p:sldId id="284" r:id="rId23"/>
     <p:sldId id="282" r:id="rId24"/>
     <p:sldId id="283" r:id="rId25"/>
+    <p:sldId id="285" r:id="rId26"/>
   </p:sldIdLst>
   <p:sldSz cx="12192000" cy="6858000"/>
   <p:notesSz cx="6858000" cy="9144000"/>
   <p:embeddedFontLst>
     <p:embeddedFont>
       <p:font typeface="Calibri" panose="020F0502020204030204" pitchFamily="34" charset="0"/>
-      <p:regular r:id="rId26"/>
-      <p:bold r:id="rId27"/>
-      <p:italic r:id="rId28"/>
-      <p:boldItalic r:id="rId29"/>
+      <p:regular r:id="rId27"/>
+      <p:bold r:id="rId28"/>
+      <p:italic r:id="rId29"/>
+      <p:boldItalic r:id="rId30"/>
     </p:embeddedFont>
     <p:embeddedFont>
       <p:font typeface="Calibri Light" panose="020F0302020204030204" pitchFamily="34" charset="0"/>
-      <p:regular r:id="rId30"/>
-      <p:italic r:id="rId31"/>
+      <p:regular r:id="rId31"/>
+      <p:italic r:id="rId32"/>
     </p:embeddedFont>
     <p:embeddedFont>
       <p:font typeface="Consolas" panose="020B0609020204030204" pitchFamily="49" charset="0"/>
-      <p:regular r:id="rId32"/>
-      <p:bold r:id="rId33"/>
-      <p:italic r:id="rId34"/>
-      <p:boldItalic r:id="rId35"/>
+      <p:regular r:id="rId33"/>
+      <p:bold r:id="rId34"/>
+      <p:italic r:id="rId35"/>
+      <p:boldItalic r:id="rId36"/>
     </p:embeddedFont>
     <p:embeddedFont>
       <p:font typeface="Libre Barcode 39 Text" pitchFamily="2" charset="0"/>
-      <p:regular r:id="rId36"/>
+      <p:regular r:id="rId37"/>
     </p:embeddedFont>
     <p:embeddedFont>
       <p:font typeface="Roboto" panose="02000000000000000000" pitchFamily="2" charset="0"/>
-      <p:regular r:id="rId37"/>
-      <p:bold r:id="rId38"/>
-      <p:italic r:id="rId39"/>
-      <p:boldItalic r:id="rId40"/>
+      <p:regular r:id="rId38"/>
+      <p:bold r:id="rId39"/>
+      <p:italic r:id="rId40"/>
+      <p:boldItalic r:id="rId41"/>
     </p:embeddedFont>
     <p:embeddedFont>
       <p:font typeface="Roboto Light" panose="02000000000000000000" pitchFamily="2" charset="0"/>
-      <p:regular r:id="rId41"/>
-      <p:italic r:id="rId42"/>
+      <p:regular r:id="rId42"/>
+      <p:italic r:id="rId43"/>
     </p:embeddedFont>
     <p:embeddedFont>
       <p:font typeface="Roboto Mono" pitchFamily="2" charset="0"/>
-      <p:regular r:id="rId43"/>
-      <p:bold r:id="rId44"/>
-      <p:italic r:id="rId45"/>
-      <p:boldItalic r:id="rId46"/>
+      <p:regular r:id="rId44"/>
+      <p:bold r:id="rId45"/>
+      <p:italic r:id="rId46"/>
+      <p:boldItalic r:id="rId47"/>
     </p:embeddedFont>
     <p:embeddedFont>
       <p:font typeface="Roboto Thin" panose="02000000000000000000" pitchFamily="2" charset="0"/>
-      <p:regular r:id="rId47"/>
-      <p:italic r:id="rId48"/>
+      <p:regular r:id="rId48"/>
+      <p:italic r:id="rId49"/>
     </p:embeddedFont>
   </p:embeddedFontLst>
   <p:defaultTextStyle>
@@ -331,7 +332,7 @@
           <a:p>
             <a:fld id="{9C217E9C-8F4D-924D-9E3C-AB228D9DE283}" type="datetimeFigureOut">
               <a:rPr lang="en-GB" smtClean="0"/>
-              <a:t>26/05/2021</a:t>
+              <a:t>06/06/2021</a:t>
             </a:fld>
             <a:endParaRPr lang="en-GB"/>
           </a:p>
@@ -529,7 +530,7 @@
           <a:p>
             <a:fld id="{9C217E9C-8F4D-924D-9E3C-AB228D9DE283}" type="datetimeFigureOut">
               <a:rPr lang="en-GB" smtClean="0"/>
-              <a:t>26/05/2021</a:t>
+              <a:t>06/06/2021</a:t>
             </a:fld>
             <a:endParaRPr lang="en-GB"/>
           </a:p>
@@ -737,7 +738,7 @@
           <a:p>
             <a:fld id="{9C217E9C-8F4D-924D-9E3C-AB228D9DE283}" type="datetimeFigureOut">
               <a:rPr lang="en-GB" smtClean="0"/>
-              <a:t>26/05/2021</a:t>
+              <a:t>06/06/2021</a:t>
             </a:fld>
             <a:endParaRPr lang="en-GB"/>
           </a:p>
@@ -935,7 +936,7 @@
           <a:p>
             <a:fld id="{9C217E9C-8F4D-924D-9E3C-AB228D9DE283}" type="datetimeFigureOut">
               <a:rPr lang="en-GB" smtClean="0"/>
-              <a:t>26/05/2021</a:t>
+              <a:t>06/06/2021</a:t>
             </a:fld>
             <a:endParaRPr lang="en-GB"/>
           </a:p>
@@ -1210,7 +1211,7 @@
           <a:p>
             <a:fld id="{9C217E9C-8F4D-924D-9E3C-AB228D9DE283}" type="datetimeFigureOut">
               <a:rPr lang="en-GB" smtClean="0"/>
-              <a:t>26/05/2021</a:t>
+              <a:t>06/06/2021</a:t>
             </a:fld>
             <a:endParaRPr lang="en-GB"/>
           </a:p>
@@ -1475,7 +1476,7 @@
           <a:p>
             <a:fld id="{9C217E9C-8F4D-924D-9E3C-AB228D9DE283}" type="datetimeFigureOut">
               <a:rPr lang="en-GB" smtClean="0"/>
-              <a:t>26/05/2021</a:t>
+              <a:t>06/06/2021</a:t>
             </a:fld>
             <a:endParaRPr lang="en-GB"/>
           </a:p>
@@ -1887,7 +1888,7 @@
           <a:p>
             <a:fld id="{9C217E9C-8F4D-924D-9E3C-AB228D9DE283}" type="datetimeFigureOut">
               <a:rPr lang="en-GB" smtClean="0"/>
-              <a:t>26/05/2021</a:t>
+              <a:t>06/06/2021</a:t>
             </a:fld>
             <a:endParaRPr lang="en-GB"/>
           </a:p>
@@ -2028,7 +2029,7 @@
           <a:p>
             <a:fld id="{9C217E9C-8F4D-924D-9E3C-AB228D9DE283}" type="datetimeFigureOut">
               <a:rPr lang="en-GB" smtClean="0"/>
-              <a:t>26/05/2021</a:t>
+              <a:t>06/06/2021</a:t>
             </a:fld>
             <a:endParaRPr lang="en-GB"/>
           </a:p>
@@ -2141,7 +2142,7 @@
           <a:p>
             <a:fld id="{9C217E9C-8F4D-924D-9E3C-AB228D9DE283}" type="datetimeFigureOut">
               <a:rPr lang="en-GB" smtClean="0"/>
-              <a:t>26/05/2021</a:t>
+              <a:t>06/06/2021</a:t>
             </a:fld>
             <a:endParaRPr lang="en-GB"/>
           </a:p>
@@ -2452,7 +2453,7 @@
           <a:p>
             <a:fld id="{9C217E9C-8F4D-924D-9E3C-AB228D9DE283}" type="datetimeFigureOut">
               <a:rPr lang="en-GB" smtClean="0"/>
-              <a:t>26/05/2021</a:t>
+              <a:t>06/06/2021</a:t>
             </a:fld>
             <a:endParaRPr lang="en-GB"/>
           </a:p>
@@ -2740,7 +2741,7 @@
           <a:p>
             <a:fld id="{9C217E9C-8F4D-924D-9E3C-AB228D9DE283}" type="datetimeFigureOut">
               <a:rPr lang="en-GB" smtClean="0"/>
-              <a:t>26/05/2021</a:t>
+              <a:t>06/06/2021</a:t>
             </a:fld>
             <a:endParaRPr lang="en-GB"/>
           </a:p>
@@ -2981,7 +2982,7 @@
           <a:p>
             <a:fld id="{9C217E9C-8F4D-924D-9E3C-AB228D9DE283}" type="datetimeFigureOut">
               <a:rPr lang="en-GB" smtClean="0"/>
-              <a:t>26/05/2021</a:t>
+              <a:t>06/06/2021</a:t>
             </a:fld>
             <a:endParaRPr lang="en-GB"/>
           </a:p>
@@ -3423,7 +3424,7 @@
           </a:ln>
           <a:extLst>
             <a:ext uri="{C572A759-6A51-4108-AA02-DFA0A04FC94B}">
-              <ma14:wrappingTextBoxFlag xmlns:ma14="http://schemas.microsoft.com/office/mac/drawingml/2011/main" xmlns="" val="1"/>
+              <ma14:wrappingTextBoxFlag xmlns="" xmlns:ma14="http://schemas.microsoft.com/office/mac/drawingml/2011/main" val="1"/>
             </a:ext>
           </a:extLst>
         </p:spPr>
@@ -32842,6 +32843,36 @@
     <p:extLst>
       <p:ext uri="{BB962C8B-B14F-4D97-AF65-F5344CB8AC3E}">
         <p14:creationId xmlns:p14="http://schemas.microsoft.com/office/powerpoint/2010/main" val="2593875880"/>
+      </p:ext>
+    </p:extLst>
+  </p:cSld>
+  <p:clrMapOvr>
+    <a:masterClrMapping/>
+  </p:clrMapOvr>
+</p:sld>
+</file>
+
+<file path=ppt/slides/slide25.xml><?xml version="1.0" encoding="utf-8"?>
+<p:sld xmlns:a="http://schemas.openxmlformats.org/drawingml/2006/main" xmlns:r="http://schemas.openxmlformats.org/officeDocument/2006/relationships" xmlns:p="http://schemas.openxmlformats.org/presentationml/2006/main">
+  <p:cSld>
+    <p:spTree>
+      <p:nvGrpSpPr>
+        <p:cNvPr id="1" name=""/>
+        <p:cNvGrpSpPr/>
+        <p:nvPr/>
+      </p:nvGrpSpPr>
+      <p:grpSpPr>
+        <a:xfrm>
+          <a:off x="0" y="0"/>
+          <a:ext cx="0" cy="0"/>
+          <a:chOff x="0" y="0"/>
+          <a:chExt cx="0" cy="0"/>
+        </a:xfrm>
+      </p:grpSpPr>
+    </p:spTree>
+    <p:extLst>
+      <p:ext uri="{BB962C8B-B14F-4D97-AF65-F5344CB8AC3E}">
+        <p14:creationId xmlns:p14="http://schemas.microsoft.com/office/powerpoint/2010/main" val="2120949385"/>
       </p:ext>
     </p:extLst>
   </p:cSld>

</xml_diff>